<commit_message>
Wrote sample chaining examples
</commit_message>
<xml_diff>
--- a/Slides/Practical FParsec V2.pptx
+++ b/Slides/Practical FParsec V2.pptx
@@ -5,7 +5,7 @@
     <p:sldMasterId id="2147483648" r:id="rId1"/>
   </p:sldMasterIdLst>
   <p:notesMasterIdLst>
-    <p:notesMasterId r:id="rId18"/>
+    <p:notesMasterId r:id="rId14"/>
   </p:notesMasterIdLst>
   <p:sldIdLst>
     <p:sldId id="256" r:id="rId2"/>
@@ -13,17 +13,13 @@
     <p:sldId id="265" r:id="rId4"/>
     <p:sldId id="266" r:id="rId5"/>
     <p:sldId id="267" r:id="rId6"/>
-    <p:sldId id="269" r:id="rId7"/>
-    <p:sldId id="268" r:id="rId8"/>
-    <p:sldId id="258" r:id="rId9"/>
-    <p:sldId id="270" r:id="rId10"/>
-    <p:sldId id="271" r:id="rId11"/>
-    <p:sldId id="259" r:id="rId12"/>
-    <p:sldId id="260" r:id="rId13"/>
-    <p:sldId id="261" r:id="rId14"/>
-    <p:sldId id="262" r:id="rId15"/>
-    <p:sldId id="263" r:id="rId16"/>
-    <p:sldId id="264" r:id="rId17"/>
+    <p:sldId id="268" r:id="rId7"/>
+    <p:sldId id="272" r:id="rId8"/>
+    <p:sldId id="269" r:id="rId9"/>
+    <p:sldId id="258" r:id="rId10"/>
+    <p:sldId id="270" r:id="rId11"/>
+    <p:sldId id="271" r:id="rId12"/>
+    <p:sldId id="264" r:id="rId13"/>
   </p:sldIdLst>
   <p:sldSz cx="12192000" cy="6858000"/>
   <p:notesSz cx="6858000" cy="9144000"/>
@@ -212,7 +208,7 @@
           <a:p>
             <a:fld id="{28E553DE-D44A-40CE-992A-E98A6768F984}" type="datetimeFigureOut">
               <a:rPr lang="en-US" smtClean="0"/>
-              <a:t>10/12/2015</a:t>
+              <a:t>10/15/2015</a:t>
             </a:fld>
             <a:endParaRPr lang="en-US"/>
           </a:p>
@@ -703,7 +699,7 @@
           <a:p>
             <a:fld id="{D7E847A7-D0D1-4648-B033-5D0415D93F24}" type="datetimeFigureOut">
               <a:rPr lang="en-US" smtClean="0"/>
-              <a:t>10/12/2015</a:t>
+              <a:t>10/15/2015</a:t>
             </a:fld>
             <a:endParaRPr lang="en-US"/>
           </a:p>
@@ -873,7 +869,7 @@
           <a:p>
             <a:fld id="{D7E847A7-D0D1-4648-B033-5D0415D93F24}" type="datetimeFigureOut">
               <a:rPr lang="en-US" smtClean="0"/>
-              <a:t>10/12/2015</a:t>
+              <a:t>10/15/2015</a:t>
             </a:fld>
             <a:endParaRPr lang="en-US"/>
           </a:p>
@@ -1053,7 +1049,7 @@
           <a:p>
             <a:fld id="{D7E847A7-D0D1-4648-B033-5D0415D93F24}" type="datetimeFigureOut">
               <a:rPr lang="en-US" smtClean="0"/>
-              <a:t>10/12/2015</a:t>
+              <a:t>10/15/2015</a:t>
             </a:fld>
             <a:endParaRPr lang="en-US"/>
           </a:p>
@@ -1223,7 +1219,7 @@
           <a:p>
             <a:fld id="{D7E847A7-D0D1-4648-B033-5D0415D93F24}" type="datetimeFigureOut">
               <a:rPr lang="en-US" smtClean="0"/>
-              <a:t>10/12/2015</a:t>
+              <a:t>10/15/2015</a:t>
             </a:fld>
             <a:endParaRPr lang="en-US"/>
           </a:p>
@@ -1469,7 +1465,7 @@
           <a:p>
             <a:fld id="{D7E847A7-D0D1-4648-B033-5D0415D93F24}" type="datetimeFigureOut">
               <a:rPr lang="en-US" smtClean="0"/>
-              <a:t>10/12/2015</a:t>
+              <a:t>10/15/2015</a:t>
             </a:fld>
             <a:endParaRPr lang="en-US"/>
           </a:p>
@@ -1701,7 +1697,7 @@
           <a:p>
             <a:fld id="{D7E847A7-D0D1-4648-B033-5D0415D93F24}" type="datetimeFigureOut">
               <a:rPr lang="en-US" smtClean="0"/>
-              <a:t>10/12/2015</a:t>
+              <a:t>10/15/2015</a:t>
             </a:fld>
             <a:endParaRPr lang="en-US"/>
           </a:p>
@@ -2068,7 +2064,7 @@
           <a:p>
             <a:fld id="{D7E847A7-D0D1-4648-B033-5D0415D93F24}" type="datetimeFigureOut">
               <a:rPr lang="en-US" smtClean="0"/>
-              <a:t>10/12/2015</a:t>
+              <a:t>10/15/2015</a:t>
             </a:fld>
             <a:endParaRPr lang="en-US"/>
           </a:p>
@@ -2186,7 +2182,7 @@
           <a:p>
             <a:fld id="{D7E847A7-D0D1-4648-B033-5D0415D93F24}" type="datetimeFigureOut">
               <a:rPr lang="en-US" smtClean="0"/>
-              <a:t>10/12/2015</a:t>
+              <a:t>10/15/2015</a:t>
             </a:fld>
             <a:endParaRPr lang="en-US"/>
           </a:p>
@@ -2281,7 +2277,7 @@
           <a:p>
             <a:fld id="{D7E847A7-D0D1-4648-B033-5D0415D93F24}" type="datetimeFigureOut">
               <a:rPr lang="en-US" smtClean="0"/>
-              <a:t>10/12/2015</a:t>
+              <a:t>10/15/2015</a:t>
             </a:fld>
             <a:endParaRPr lang="en-US"/>
           </a:p>
@@ -2558,7 +2554,7 @@
           <a:p>
             <a:fld id="{D7E847A7-D0D1-4648-B033-5D0415D93F24}" type="datetimeFigureOut">
               <a:rPr lang="en-US" smtClean="0"/>
-              <a:t>10/12/2015</a:t>
+              <a:t>10/15/2015</a:t>
             </a:fld>
             <a:endParaRPr lang="en-US"/>
           </a:p>
@@ -2811,7 +2807,7 @@
           <a:p>
             <a:fld id="{D7E847A7-D0D1-4648-B033-5D0415D93F24}" type="datetimeFigureOut">
               <a:rPr lang="en-US" smtClean="0"/>
-              <a:t>10/12/2015</a:t>
+              <a:t>10/15/2015</a:t>
             </a:fld>
             <a:endParaRPr lang="en-US"/>
           </a:p>
@@ -3024,7 +3020,7 @@
           <a:p>
             <a:fld id="{D7E847A7-D0D1-4648-B033-5D0415D93F24}" type="datetimeFigureOut">
               <a:rPr lang="en-US" smtClean="0"/>
-              <a:t>10/12/2015</a:t>
+              <a:t>10/15/2015</a:t>
             </a:fld>
             <a:endParaRPr lang="en-US"/>
           </a:p>
@@ -3522,39 +3518,984 @@
           <a:p>
             <a:r>
               <a:rPr lang="en-US" dirty="0" smtClean="0"/>
-              <a:t>Value restriction when defining </a:t>
-            </a:r>
-            <a:r>
-              <a:rPr lang="en-US" smtClean="0"/>
-              <a:t>a parser</a:t>
+              <a:t>Chaining</a:t>
+            </a:r>
+            <a:r>
+              <a:rPr lang="en-US" smtClean="0"/>
+              <a:t>: examples	</a:t>
+            </a:r>
+            <a:endParaRPr lang="en-US"/>
+          </a:p>
+        </p:txBody>
+      </p:sp>
+      <p:sp>
+        <p:nvSpPr>
+          <p:cNvPr id="3" name="Content Placeholder 2"/>
+          <p:cNvSpPr>
+            <a:spLocks noGrp="1"/>
+          </p:cNvSpPr>
+          <p:nvPr>
+            <p:ph idx="1"/>
+          </p:nvPr>
+        </p:nvSpPr>
+        <p:spPr/>
+        <p:txBody>
+          <a:bodyPr>
+            <a:normAutofit fontScale="77500" lnSpcReduction="20000"/>
+          </a:bodyPr>
+          <a:lstStyle/>
+          <a:p>
+            <a:pPr marL="0" indent="0">
+              <a:buNone/>
+            </a:pPr>
+            <a:r>
+              <a:rPr lang="fr-FR" dirty="0">
+                <a:solidFill>
+                  <a:srgbClr val="0000FF"/>
+                </a:solidFill>
+                <a:highlight>
+                  <a:srgbClr val="FFFFFF"/>
+                </a:highlight>
+                <a:latin typeface="Consolas" panose="020B0609020204030204" pitchFamily="49" charset="0"/>
+              </a:rPr>
+              <a:t>type</a:t>
+            </a:r>
+            <a:r>
+              <a:rPr lang="fr-FR" dirty="0">
+                <a:solidFill>
+                  <a:srgbClr val="000000"/>
+                </a:solidFill>
+                <a:highlight>
+                  <a:srgbClr val="FFFFFF"/>
+                </a:highlight>
+                <a:latin typeface="Consolas" panose="020B0609020204030204" pitchFamily="49" charset="0"/>
+              </a:rPr>
+              <a:t> </a:t>
+            </a:r>
+            <a:r>
+              <a:rPr lang="fr-FR" dirty="0">
+                <a:solidFill>
+                  <a:srgbClr val="4EC9B0"/>
+                </a:solidFill>
+                <a:highlight>
+                  <a:srgbClr val="FFFFFF"/>
+                </a:highlight>
+                <a:latin typeface="Consolas" panose="020B0609020204030204" pitchFamily="49" charset="0"/>
+              </a:rPr>
+              <a:t>P</a:t>
+            </a:r>
+            <a:r>
+              <a:rPr lang="fr-FR" dirty="0">
+                <a:solidFill>
+                  <a:srgbClr val="000000"/>
+                </a:solidFill>
+                <a:highlight>
+                  <a:srgbClr val="FFFFFF"/>
+                </a:highlight>
+                <a:latin typeface="Consolas" panose="020B0609020204030204" pitchFamily="49" charset="0"/>
+              </a:rPr>
+              <a:t>&lt;'t&gt; </a:t>
+            </a:r>
+            <a:r>
+              <a:rPr lang="fr-FR" dirty="0">
+                <a:solidFill>
+                  <a:srgbClr val="DCDCDC"/>
+                </a:solidFill>
+                <a:highlight>
+                  <a:srgbClr val="FFFFFF"/>
+                </a:highlight>
+                <a:latin typeface="Consolas" panose="020B0609020204030204" pitchFamily="49" charset="0"/>
+              </a:rPr>
+              <a:t>=</a:t>
+            </a:r>
+            <a:r>
+              <a:rPr lang="fr-FR" dirty="0">
+                <a:solidFill>
+                  <a:srgbClr val="000000"/>
+                </a:solidFill>
+                <a:highlight>
+                  <a:srgbClr val="FFFFFF"/>
+                </a:highlight>
+                <a:latin typeface="Consolas" panose="020B0609020204030204" pitchFamily="49" charset="0"/>
+              </a:rPr>
+              <a:t> </a:t>
+            </a:r>
+            <a:r>
+              <a:rPr lang="fr-FR" dirty="0" err="1">
+                <a:solidFill>
+                  <a:srgbClr val="4EC9B0"/>
+                </a:solidFill>
+                <a:highlight>
+                  <a:srgbClr val="FFFFFF"/>
+                </a:highlight>
+                <a:latin typeface="Consolas" panose="020B0609020204030204" pitchFamily="49" charset="0"/>
+              </a:rPr>
+              <a:t>Parser</a:t>
+            </a:r>
+            <a:r>
+              <a:rPr lang="fr-FR" dirty="0">
+                <a:solidFill>
+                  <a:srgbClr val="000000"/>
+                </a:solidFill>
+                <a:highlight>
+                  <a:srgbClr val="FFFFFF"/>
+                </a:highlight>
+                <a:latin typeface="Consolas" panose="020B0609020204030204" pitchFamily="49" charset="0"/>
+              </a:rPr>
+              <a:t>&lt;'t, </a:t>
+            </a:r>
+            <a:r>
+              <a:rPr lang="fr-FR" dirty="0">
+                <a:solidFill>
+                  <a:srgbClr val="4EC9B0"/>
+                </a:solidFill>
+                <a:highlight>
+                  <a:srgbClr val="FFFFFF"/>
+                </a:highlight>
+                <a:latin typeface="Consolas" panose="020B0609020204030204" pitchFamily="49" charset="0"/>
+              </a:rPr>
+              <a:t>Unit</a:t>
+            </a:r>
+            <a:r>
+              <a:rPr lang="fr-FR" dirty="0">
+                <a:solidFill>
+                  <a:srgbClr val="000000"/>
+                </a:solidFill>
+                <a:highlight>
+                  <a:srgbClr val="FFFFFF"/>
+                </a:highlight>
+                <a:latin typeface="Consolas" panose="020B0609020204030204" pitchFamily="49" charset="0"/>
+              </a:rPr>
+              <a:t>&gt;</a:t>
+            </a:r>
+          </a:p>
+          <a:p>
+            <a:pPr marL="0" indent="0">
+              <a:buNone/>
+            </a:pPr>
+            <a:endParaRPr lang="en-US" dirty="0">
+              <a:solidFill>
+                <a:srgbClr val="000000"/>
+              </a:solidFill>
+              <a:highlight>
+                <a:srgbClr val="FFFFFF"/>
+              </a:highlight>
+              <a:latin typeface="Consolas" panose="020B0609020204030204" pitchFamily="49" charset="0"/>
+            </a:endParaRPr>
+          </a:p>
+          <a:p>
+            <a:pPr marL="0" indent="0">
+              <a:buNone/>
+            </a:pPr>
+            <a:r>
+              <a:rPr lang="en-US" dirty="0">
+                <a:solidFill>
+                  <a:srgbClr val="0000FF"/>
+                </a:solidFill>
+                <a:highlight>
+                  <a:srgbClr val="FFFFFF"/>
+                </a:highlight>
+                <a:latin typeface="Consolas" panose="020B0609020204030204" pitchFamily="49" charset="0"/>
+              </a:rPr>
+              <a:t>let</a:t>
+            </a:r>
+            <a:r>
+              <a:rPr lang="en-US" dirty="0">
+                <a:solidFill>
+                  <a:srgbClr val="000000"/>
+                </a:solidFill>
+                <a:highlight>
+                  <a:srgbClr val="FFFFFF"/>
+                </a:highlight>
+                <a:latin typeface="Consolas" panose="020B0609020204030204" pitchFamily="49" charset="0"/>
+              </a:rPr>
+              <a:t> </a:t>
+            </a:r>
+            <a:r>
+              <a:rPr lang="en-US" dirty="0" err="1">
+                <a:highlight>
+                  <a:srgbClr val="FFFFFF"/>
+                </a:highlight>
+                <a:latin typeface="Consolas" panose="020B0609020204030204" pitchFamily="49" charset="0"/>
+              </a:rPr>
+              <a:t>pJanuary</a:t>
+            </a:r>
+            <a:r>
+              <a:rPr lang="en-US" dirty="0" smtClean="0">
+                <a:highlight>
+                  <a:srgbClr val="FFFFFF"/>
+                </a:highlight>
+                <a:latin typeface="Consolas" panose="020B0609020204030204" pitchFamily="49" charset="0"/>
+              </a:rPr>
+              <a:t>:</a:t>
+            </a:r>
+            <a:r>
+              <a:rPr lang="fr-FR" dirty="0">
+                <a:solidFill>
+                  <a:srgbClr val="4EC9B0"/>
+                </a:solidFill>
+                <a:highlight>
+                  <a:srgbClr val="FFFFFF"/>
+                </a:highlight>
+                <a:latin typeface="Consolas" panose="020B0609020204030204" pitchFamily="49" charset="0"/>
+              </a:rPr>
+              <a:t> </a:t>
+            </a:r>
+            <a:r>
+              <a:rPr lang="fr-FR" dirty="0" smtClean="0">
+                <a:solidFill>
+                  <a:srgbClr val="4EC9B0"/>
+                </a:solidFill>
+                <a:highlight>
+                  <a:srgbClr val="FFFFFF"/>
+                </a:highlight>
+                <a:latin typeface="Consolas" panose="020B0609020204030204" pitchFamily="49" charset="0"/>
+              </a:rPr>
+              <a:t>P</a:t>
+            </a:r>
+            <a:r>
+              <a:rPr lang="en-US" dirty="0" smtClean="0">
+                <a:solidFill>
+                  <a:srgbClr val="000000"/>
+                </a:solidFill>
+                <a:highlight>
+                  <a:srgbClr val="FFFFFF"/>
+                </a:highlight>
+                <a:latin typeface="Consolas" panose="020B0609020204030204" pitchFamily="49" charset="0"/>
+              </a:rPr>
+              <a:t>&lt;_&gt; </a:t>
+            </a:r>
+            <a:r>
+              <a:rPr lang="en-US" dirty="0">
+                <a:highlight>
+                  <a:srgbClr val="FFFFFF"/>
+                </a:highlight>
+                <a:latin typeface="Consolas" panose="020B0609020204030204" pitchFamily="49" charset="0"/>
+              </a:rPr>
+              <a:t>= </a:t>
+            </a:r>
+            <a:r>
+              <a:rPr lang="en-US" dirty="0" err="1">
+                <a:highlight>
+                  <a:srgbClr val="FFFFFF"/>
+                </a:highlight>
+                <a:latin typeface="Consolas" panose="020B0609020204030204" pitchFamily="49" charset="0"/>
+              </a:rPr>
+              <a:t>pstringCI</a:t>
+            </a:r>
+            <a:r>
+              <a:rPr lang="en-US" dirty="0">
+                <a:highlight>
+                  <a:srgbClr val="FFFFFF"/>
+                </a:highlight>
+                <a:latin typeface="Consolas" panose="020B0609020204030204" pitchFamily="49" charset="0"/>
+              </a:rPr>
+              <a:t> </a:t>
+            </a:r>
+            <a:r>
+              <a:rPr lang="en-US" dirty="0">
+                <a:solidFill>
+                  <a:srgbClr val="A31515"/>
+                </a:solidFill>
+                <a:highlight>
+                  <a:srgbClr val="FFFFFF"/>
+                </a:highlight>
+                <a:latin typeface="Consolas" panose="020B0609020204030204" pitchFamily="49" charset="0"/>
+              </a:rPr>
+              <a:t>"Jan"</a:t>
+            </a:r>
+            <a:endParaRPr lang="en-US" dirty="0">
+              <a:solidFill>
+                <a:srgbClr val="000000"/>
+              </a:solidFill>
+              <a:highlight>
+                <a:srgbClr val="FFFFFF"/>
+              </a:highlight>
+              <a:latin typeface="Consolas" panose="020B0609020204030204" pitchFamily="49" charset="0"/>
+            </a:endParaRPr>
+          </a:p>
+          <a:p>
+            <a:pPr marL="0" indent="0">
+              <a:buNone/>
+            </a:pPr>
+            <a:r>
+              <a:rPr lang="en-US" dirty="0">
+                <a:solidFill>
+                  <a:srgbClr val="0000FF"/>
+                </a:solidFill>
+                <a:highlight>
+                  <a:srgbClr val="FFFFFF"/>
+                </a:highlight>
+                <a:latin typeface="Consolas" panose="020B0609020204030204" pitchFamily="49" charset="0"/>
+              </a:rPr>
+              <a:t>let</a:t>
+            </a:r>
+            <a:r>
+              <a:rPr lang="en-US" dirty="0">
+                <a:solidFill>
+                  <a:srgbClr val="000000"/>
+                </a:solidFill>
+                <a:highlight>
+                  <a:srgbClr val="FFFFFF"/>
+                </a:highlight>
+                <a:latin typeface="Consolas" panose="020B0609020204030204" pitchFamily="49" charset="0"/>
+              </a:rPr>
+              <a:t> </a:t>
+            </a:r>
+            <a:r>
+              <a:rPr lang="en-US" dirty="0" err="1">
+                <a:highlight>
+                  <a:srgbClr val="FFFFFF"/>
+                </a:highlight>
+                <a:latin typeface="Consolas" panose="020B0609020204030204" pitchFamily="49" charset="0"/>
+              </a:rPr>
+              <a:t>pNumber</a:t>
+            </a:r>
+            <a:r>
+              <a:rPr lang="en-US" dirty="0" smtClean="0">
+                <a:highlight>
+                  <a:srgbClr val="FFFFFF"/>
+                </a:highlight>
+                <a:latin typeface="Consolas" panose="020B0609020204030204" pitchFamily="49" charset="0"/>
+              </a:rPr>
+              <a:t>:</a:t>
+            </a:r>
+            <a:r>
+              <a:rPr lang="fr-FR" dirty="0">
+                <a:solidFill>
+                  <a:srgbClr val="4EC9B0"/>
+                </a:solidFill>
+                <a:highlight>
+                  <a:srgbClr val="FFFFFF"/>
+                </a:highlight>
+                <a:latin typeface="Consolas" panose="020B0609020204030204" pitchFamily="49" charset="0"/>
+              </a:rPr>
+              <a:t> </a:t>
+            </a:r>
+            <a:r>
+              <a:rPr lang="fr-FR" dirty="0" smtClean="0">
+                <a:solidFill>
+                  <a:srgbClr val="4EC9B0"/>
+                </a:solidFill>
+                <a:highlight>
+                  <a:srgbClr val="FFFFFF"/>
+                </a:highlight>
+                <a:latin typeface="Consolas" panose="020B0609020204030204" pitchFamily="49" charset="0"/>
+              </a:rPr>
+              <a:t>P</a:t>
+            </a:r>
+            <a:r>
+              <a:rPr lang="en-US" dirty="0" smtClean="0">
+                <a:solidFill>
+                  <a:srgbClr val="000000"/>
+                </a:solidFill>
+                <a:highlight>
+                  <a:srgbClr val="FFFFFF"/>
+                </a:highlight>
+                <a:latin typeface="Consolas" panose="020B0609020204030204" pitchFamily="49" charset="0"/>
+              </a:rPr>
+              <a:t>&lt;_&gt; </a:t>
+            </a:r>
+            <a:r>
+              <a:rPr lang="en-US" dirty="0">
+                <a:highlight>
+                  <a:srgbClr val="FFFFFF"/>
+                </a:highlight>
+                <a:latin typeface="Consolas" panose="020B0609020204030204" pitchFamily="49" charset="0"/>
+              </a:rPr>
+              <a:t>= pint8</a:t>
+            </a:r>
+          </a:p>
+          <a:p>
+            <a:pPr marL="0" indent="0">
+              <a:buNone/>
+            </a:pPr>
+            <a:endParaRPr lang="en-US" dirty="0">
+              <a:solidFill>
+                <a:srgbClr val="000000"/>
+              </a:solidFill>
+              <a:highlight>
+                <a:srgbClr val="FFFFFF"/>
+              </a:highlight>
+              <a:latin typeface="Consolas" panose="020B0609020204030204" pitchFamily="49" charset="0"/>
+            </a:endParaRPr>
+          </a:p>
+          <a:p>
+            <a:pPr marL="0" indent="0">
+              <a:buNone/>
+            </a:pPr>
+            <a:r>
+              <a:rPr lang="en-US" dirty="0">
+                <a:solidFill>
+                  <a:srgbClr val="0000FF"/>
+                </a:solidFill>
+                <a:highlight>
+                  <a:srgbClr val="FFFFFF"/>
+                </a:highlight>
+                <a:latin typeface="Consolas" panose="020B0609020204030204" pitchFamily="49" charset="0"/>
+              </a:rPr>
+              <a:t>let</a:t>
+            </a:r>
+            <a:r>
+              <a:rPr lang="en-US" dirty="0">
+                <a:solidFill>
+                  <a:srgbClr val="000000"/>
+                </a:solidFill>
+                <a:highlight>
+                  <a:srgbClr val="FFFFFF"/>
+                </a:highlight>
+                <a:latin typeface="Consolas" panose="020B0609020204030204" pitchFamily="49" charset="0"/>
+              </a:rPr>
+              <a:t> </a:t>
+            </a:r>
+            <a:r>
+              <a:rPr lang="en-US" dirty="0" err="1">
+                <a:highlight>
+                  <a:srgbClr val="FFFFFF"/>
+                </a:highlight>
+                <a:latin typeface="Consolas" panose="020B0609020204030204" pitchFamily="49" charset="0"/>
+              </a:rPr>
+              <a:t>pMonthJanuary</a:t>
+            </a:r>
+            <a:r>
+              <a:rPr lang="en-US" dirty="0" err="1">
+                <a:solidFill>
+                  <a:srgbClr val="000000"/>
+                </a:solidFill>
+                <a:highlight>
+                  <a:srgbClr val="FFFFFF"/>
+                </a:highlight>
+                <a:latin typeface="Consolas" panose="020B0609020204030204" pitchFamily="49" charset="0"/>
+              </a:rPr>
+              <a:t>:</a:t>
+            </a:r>
+            <a:r>
+              <a:rPr lang="en-US" dirty="0" err="1">
+                <a:solidFill>
+                  <a:srgbClr val="4EC9B0"/>
+                </a:solidFill>
+                <a:highlight>
+                  <a:srgbClr val="FFFFFF"/>
+                </a:highlight>
+                <a:latin typeface="Consolas" panose="020B0609020204030204" pitchFamily="49" charset="0"/>
+              </a:rPr>
+              <a:t>P</a:t>
+            </a:r>
+            <a:r>
+              <a:rPr lang="en-US" dirty="0">
+                <a:solidFill>
+                  <a:srgbClr val="000000"/>
+                </a:solidFill>
+                <a:highlight>
+                  <a:srgbClr val="FFFFFF"/>
+                </a:highlight>
+                <a:latin typeface="Consolas" panose="020B0609020204030204" pitchFamily="49" charset="0"/>
+              </a:rPr>
+              <a:t>&lt;_&gt; </a:t>
+            </a:r>
+            <a:r>
+              <a:rPr lang="en-US" dirty="0">
+                <a:highlight>
+                  <a:srgbClr val="FFFFFF"/>
+                </a:highlight>
+                <a:latin typeface="Consolas" panose="020B0609020204030204" pitchFamily="49" charset="0"/>
+              </a:rPr>
+              <a:t>= </a:t>
+            </a:r>
+            <a:r>
+              <a:rPr lang="en-US" dirty="0" err="1">
+                <a:highlight>
+                  <a:srgbClr val="FFFFFF"/>
+                </a:highlight>
+                <a:latin typeface="Consolas" panose="020B0609020204030204" pitchFamily="49" charset="0"/>
+              </a:rPr>
+              <a:t>pJanuary</a:t>
+            </a:r>
+            <a:r>
+              <a:rPr lang="en-US" dirty="0">
+                <a:highlight>
+                  <a:srgbClr val="FFFFFF"/>
+                </a:highlight>
+                <a:latin typeface="Consolas" panose="020B0609020204030204" pitchFamily="49" charset="0"/>
+              </a:rPr>
+              <a:t> .&gt;&gt; (spaces &gt;&gt;. </a:t>
+            </a:r>
+            <a:r>
+              <a:rPr lang="en-US" dirty="0" err="1">
+                <a:highlight>
+                  <a:srgbClr val="FFFFFF"/>
+                </a:highlight>
+                <a:latin typeface="Consolas" panose="020B0609020204030204" pitchFamily="49" charset="0"/>
+              </a:rPr>
+              <a:t>pNumber</a:t>
+            </a:r>
+            <a:r>
+              <a:rPr lang="en-US" dirty="0" smtClean="0">
+                <a:highlight>
+                  <a:srgbClr val="FFFFFF"/>
+                </a:highlight>
+                <a:latin typeface="Consolas" panose="020B0609020204030204" pitchFamily="49" charset="0"/>
+              </a:rPr>
+              <a:t>)</a:t>
+            </a:r>
+            <a:endParaRPr lang="en-US" dirty="0">
+              <a:highlight>
+                <a:srgbClr val="FFFFFF"/>
+              </a:highlight>
+              <a:latin typeface="Consolas" panose="020B0609020204030204" pitchFamily="49" charset="0"/>
+            </a:endParaRPr>
+          </a:p>
+          <a:p>
+            <a:pPr marL="0" indent="0">
+              <a:buNone/>
+            </a:pPr>
+            <a:r>
+              <a:rPr lang="en-US" dirty="0">
+                <a:solidFill>
+                  <a:srgbClr val="0000FF"/>
+                </a:solidFill>
+                <a:highlight>
+                  <a:srgbClr val="FFFFFF"/>
+                </a:highlight>
+                <a:latin typeface="Consolas" panose="020B0609020204030204" pitchFamily="49" charset="0"/>
+              </a:rPr>
+              <a:t>let</a:t>
+            </a:r>
+            <a:r>
+              <a:rPr lang="en-US" dirty="0">
+                <a:solidFill>
+                  <a:srgbClr val="000000"/>
+                </a:solidFill>
+                <a:highlight>
+                  <a:srgbClr val="FFFFFF"/>
+                </a:highlight>
+                <a:latin typeface="Consolas" panose="020B0609020204030204" pitchFamily="49" charset="0"/>
+              </a:rPr>
+              <a:t> </a:t>
+            </a:r>
+            <a:r>
+              <a:rPr lang="en-US" dirty="0" err="1">
+                <a:highlight>
+                  <a:srgbClr val="FFFFFF"/>
+                </a:highlight>
+                <a:latin typeface="Consolas" panose="020B0609020204030204" pitchFamily="49" charset="0"/>
+              </a:rPr>
+              <a:t>pDay</a:t>
+            </a:r>
+            <a:r>
+              <a:rPr lang="en-US" dirty="0" err="1">
+                <a:solidFill>
+                  <a:srgbClr val="000000"/>
+                </a:solidFill>
+                <a:highlight>
+                  <a:srgbClr val="FFFFFF"/>
+                </a:highlight>
+                <a:latin typeface="Consolas" panose="020B0609020204030204" pitchFamily="49" charset="0"/>
+              </a:rPr>
+              <a:t>:</a:t>
+            </a:r>
+            <a:r>
+              <a:rPr lang="en-US" dirty="0" err="1">
+                <a:solidFill>
+                  <a:srgbClr val="4EC9B0"/>
+                </a:solidFill>
+                <a:highlight>
+                  <a:srgbClr val="FFFFFF"/>
+                </a:highlight>
+                <a:latin typeface="Consolas" panose="020B0609020204030204" pitchFamily="49" charset="0"/>
+              </a:rPr>
+              <a:t>P</a:t>
+            </a:r>
+            <a:r>
+              <a:rPr lang="en-US" dirty="0">
+                <a:solidFill>
+                  <a:srgbClr val="000000"/>
+                </a:solidFill>
+                <a:highlight>
+                  <a:srgbClr val="FFFFFF"/>
+                </a:highlight>
+                <a:latin typeface="Consolas" panose="020B0609020204030204" pitchFamily="49" charset="0"/>
+              </a:rPr>
+              <a:t>&lt;_&gt; </a:t>
+            </a:r>
+            <a:r>
+              <a:rPr lang="en-US" dirty="0">
+                <a:highlight>
+                  <a:srgbClr val="FFFFFF"/>
+                </a:highlight>
+                <a:latin typeface="Consolas" panose="020B0609020204030204" pitchFamily="49" charset="0"/>
+              </a:rPr>
+              <a:t>= (</a:t>
+            </a:r>
+            <a:r>
+              <a:rPr lang="en-US" dirty="0" err="1">
+                <a:highlight>
+                  <a:srgbClr val="FFFFFF"/>
+                </a:highlight>
+                <a:latin typeface="Consolas" panose="020B0609020204030204" pitchFamily="49" charset="0"/>
+              </a:rPr>
+              <a:t>pJanuary</a:t>
+            </a:r>
+            <a:r>
+              <a:rPr lang="en-US" dirty="0">
+                <a:highlight>
+                  <a:srgbClr val="FFFFFF"/>
+                </a:highlight>
+                <a:latin typeface="Consolas" panose="020B0609020204030204" pitchFamily="49" charset="0"/>
+              </a:rPr>
+              <a:t> &gt;&gt;. spaces) &gt;&gt;.</a:t>
+            </a:r>
+            <a:r>
+              <a:rPr lang="en-US" dirty="0" err="1" smtClean="0">
+                <a:highlight>
+                  <a:srgbClr val="FFFFFF"/>
+                </a:highlight>
+                <a:latin typeface="Consolas" panose="020B0609020204030204" pitchFamily="49" charset="0"/>
+              </a:rPr>
+              <a:t>pNumber</a:t>
+            </a:r>
+            <a:endParaRPr lang="en-US" dirty="0">
+              <a:highlight>
+                <a:srgbClr val="FFFFFF"/>
+              </a:highlight>
+              <a:latin typeface="Consolas" panose="020B0609020204030204" pitchFamily="49" charset="0"/>
+            </a:endParaRPr>
+          </a:p>
+          <a:p>
+            <a:pPr marL="0" indent="0">
+              <a:buNone/>
+            </a:pPr>
+            <a:r>
+              <a:rPr lang="en-US" dirty="0">
+                <a:solidFill>
+                  <a:srgbClr val="0000FF"/>
+                </a:solidFill>
+                <a:highlight>
+                  <a:srgbClr val="FFFFFF"/>
+                </a:highlight>
+                <a:latin typeface="Consolas" panose="020B0609020204030204" pitchFamily="49" charset="0"/>
+              </a:rPr>
+              <a:t>let</a:t>
+            </a:r>
+            <a:r>
+              <a:rPr lang="en-US" dirty="0">
+                <a:solidFill>
+                  <a:srgbClr val="000000"/>
+                </a:solidFill>
+                <a:highlight>
+                  <a:srgbClr val="FFFFFF"/>
+                </a:highlight>
+                <a:latin typeface="Consolas" panose="020B0609020204030204" pitchFamily="49" charset="0"/>
+              </a:rPr>
+              <a:t> </a:t>
+            </a:r>
+            <a:r>
+              <a:rPr lang="en-US" dirty="0" err="1">
+                <a:highlight>
+                  <a:srgbClr val="FFFFFF"/>
+                </a:highlight>
+                <a:latin typeface="Consolas" panose="020B0609020204030204" pitchFamily="49" charset="0"/>
+              </a:rPr>
+              <a:t>pJanuaryAndDay</a:t>
+            </a:r>
+            <a:r>
+              <a:rPr lang="en-US" dirty="0" err="1">
+                <a:solidFill>
+                  <a:srgbClr val="000000"/>
+                </a:solidFill>
+                <a:highlight>
+                  <a:srgbClr val="FFFFFF"/>
+                </a:highlight>
+                <a:latin typeface="Consolas" panose="020B0609020204030204" pitchFamily="49" charset="0"/>
+              </a:rPr>
+              <a:t>:</a:t>
+            </a:r>
+            <a:r>
+              <a:rPr lang="en-US" dirty="0" err="1">
+                <a:solidFill>
+                  <a:srgbClr val="4EC9B0"/>
+                </a:solidFill>
+                <a:highlight>
+                  <a:srgbClr val="FFFFFF"/>
+                </a:highlight>
+                <a:latin typeface="Consolas" panose="020B0609020204030204" pitchFamily="49" charset="0"/>
+              </a:rPr>
+              <a:t>P</a:t>
+            </a:r>
+            <a:r>
+              <a:rPr lang="en-US" dirty="0">
+                <a:solidFill>
+                  <a:srgbClr val="000000"/>
+                </a:solidFill>
+                <a:highlight>
+                  <a:srgbClr val="FFFFFF"/>
+                </a:highlight>
+                <a:latin typeface="Consolas" panose="020B0609020204030204" pitchFamily="49" charset="0"/>
+              </a:rPr>
+              <a:t>&lt;_&gt; </a:t>
+            </a:r>
+            <a:r>
+              <a:rPr lang="en-US" dirty="0">
+                <a:highlight>
+                  <a:srgbClr val="FFFFFF"/>
+                </a:highlight>
+                <a:latin typeface="Consolas" panose="020B0609020204030204" pitchFamily="49" charset="0"/>
+              </a:rPr>
+              <a:t>= </a:t>
+            </a:r>
+            <a:r>
+              <a:rPr lang="en-US" dirty="0" err="1">
+                <a:highlight>
+                  <a:srgbClr val="FFFFFF"/>
+                </a:highlight>
+                <a:latin typeface="Consolas" panose="020B0609020204030204" pitchFamily="49" charset="0"/>
+              </a:rPr>
+              <a:t>pJanuary</a:t>
+            </a:r>
+            <a:r>
+              <a:rPr lang="en-US" dirty="0">
+                <a:highlight>
+                  <a:srgbClr val="FFFFFF"/>
+                </a:highlight>
+                <a:latin typeface="Consolas" panose="020B0609020204030204" pitchFamily="49" charset="0"/>
+              </a:rPr>
+              <a:t> .&gt;&gt;. (spaces &gt;&gt;. </a:t>
+            </a:r>
+            <a:r>
+              <a:rPr lang="en-US" dirty="0" err="1">
+                <a:highlight>
+                  <a:srgbClr val="FFFFFF"/>
+                </a:highlight>
+                <a:latin typeface="Consolas" panose="020B0609020204030204" pitchFamily="49" charset="0"/>
+              </a:rPr>
+              <a:t>pNumber</a:t>
+            </a:r>
+            <a:r>
+              <a:rPr lang="en-US" dirty="0">
+                <a:highlight>
+                  <a:srgbClr val="FFFFFF"/>
+                </a:highlight>
+                <a:latin typeface="Consolas" panose="020B0609020204030204" pitchFamily="49" charset="0"/>
+              </a:rPr>
+              <a:t>)</a:t>
+            </a:r>
+          </a:p>
+          <a:p>
+            <a:pPr marL="0" indent="0">
+              <a:buNone/>
+            </a:pPr>
+            <a:endParaRPr lang="en-US" dirty="0">
+              <a:highlight>
+                <a:srgbClr val="FFFFFF"/>
+              </a:highlight>
+              <a:latin typeface="Consolas" panose="020B0609020204030204" pitchFamily="49" charset="0"/>
+            </a:endParaRPr>
+          </a:p>
+          <a:p>
+            <a:pPr marL="0" indent="0">
+              <a:buNone/>
+            </a:pPr>
+            <a:r>
+              <a:rPr lang="en-US" dirty="0">
+                <a:highlight>
+                  <a:srgbClr val="FFFFFF"/>
+                </a:highlight>
+                <a:latin typeface="Consolas" panose="020B0609020204030204" pitchFamily="49" charset="0"/>
+              </a:rPr>
+              <a:t>run </a:t>
+            </a:r>
+            <a:r>
+              <a:rPr lang="en-US" dirty="0" err="1">
+                <a:highlight>
+                  <a:srgbClr val="FFFFFF"/>
+                </a:highlight>
+                <a:latin typeface="Consolas" panose="020B0609020204030204" pitchFamily="49" charset="0"/>
+              </a:rPr>
+              <a:t>pMonthJanuary</a:t>
+            </a:r>
+            <a:r>
+              <a:rPr lang="en-US" dirty="0">
+                <a:highlight>
+                  <a:srgbClr val="FFFFFF"/>
+                </a:highlight>
+                <a:latin typeface="Consolas" panose="020B0609020204030204" pitchFamily="49" charset="0"/>
+              </a:rPr>
+              <a:t> </a:t>
+            </a:r>
+            <a:r>
+              <a:rPr lang="en-US" dirty="0">
+                <a:solidFill>
+                  <a:srgbClr val="A31515"/>
+                </a:solidFill>
+                <a:highlight>
+                  <a:srgbClr val="FFFFFF"/>
+                </a:highlight>
+                <a:latin typeface="Consolas" panose="020B0609020204030204" pitchFamily="49" charset="0"/>
+              </a:rPr>
+              <a:t>"Jan 1</a:t>
+            </a:r>
+            <a:r>
+              <a:rPr lang="en-US" dirty="0" smtClean="0">
+                <a:solidFill>
+                  <a:srgbClr val="A31515"/>
+                </a:solidFill>
+                <a:highlight>
+                  <a:srgbClr val="FFFFFF"/>
+                </a:highlight>
+                <a:latin typeface="Consolas" panose="020B0609020204030204" pitchFamily="49" charset="0"/>
+              </a:rPr>
+              <a:t>"</a:t>
+            </a:r>
+            <a:endParaRPr lang="en-US" dirty="0">
+              <a:solidFill>
+                <a:srgbClr val="000000"/>
+              </a:solidFill>
+              <a:highlight>
+                <a:srgbClr val="FFFFFF"/>
+              </a:highlight>
+              <a:latin typeface="Consolas" panose="020B0609020204030204" pitchFamily="49" charset="0"/>
+            </a:endParaRPr>
+          </a:p>
+          <a:p>
+            <a:pPr marL="0" indent="0">
+              <a:buNone/>
+            </a:pPr>
+            <a:r>
+              <a:rPr lang="en-US" dirty="0">
+                <a:highlight>
+                  <a:srgbClr val="FFFFFF"/>
+                </a:highlight>
+                <a:latin typeface="Consolas" panose="020B0609020204030204" pitchFamily="49" charset="0"/>
+              </a:rPr>
+              <a:t>run </a:t>
+            </a:r>
+            <a:r>
+              <a:rPr lang="en-US" dirty="0" err="1">
+                <a:highlight>
+                  <a:srgbClr val="FFFFFF"/>
+                </a:highlight>
+                <a:latin typeface="Consolas" panose="020B0609020204030204" pitchFamily="49" charset="0"/>
+              </a:rPr>
+              <a:t>pDay</a:t>
+            </a:r>
+            <a:r>
+              <a:rPr lang="en-US" dirty="0">
+                <a:highlight>
+                  <a:srgbClr val="FFFFFF"/>
+                </a:highlight>
+                <a:latin typeface="Consolas" panose="020B0609020204030204" pitchFamily="49" charset="0"/>
+              </a:rPr>
+              <a:t> </a:t>
+            </a:r>
+            <a:r>
+              <a:rPr lang="en-US" dirty="0">
+                <a:solidFill>
+                  <a:srgbClr val="A31515"/>
+                </a:solidFill>
+                <a:highlight>
+                  <a:srgbClr val="FFFFFF"/>
+                </a:highlight>
+                <a:latin typeface="Consolas" panose="020B0609020204030204" pitchFamily="49" charset="0"/>
+              </a:rPr>
+              <a:t>"Jan 2</a:t>
+            </a:r>
+            <a:r>
+              <a:rPr lang="en-US" dirty="0" smtClean="0">
+                <a:solidFill>
+                  <a:srgbClr val="A31515"/>
+                </a:solidFill>
+                <a:highlight>
+                  <a:srgbClr val="FFFFFF"/>
+                </a:highlight>
+                <a:latin typeface="Consolas" panose="020B0609020204030204" pitchFamily="49" charset="0"/>
+              </a:rPr>
+              <a:t>"</a:t>
+            </a:r>
+            <a:endParaRPr lang="en-US" dirty="0">
+              <a:solidFill>
+                <a:srgbClr val="000000"/>
+              </a:solidFill>
+              <a:highlight>
+                <a:srgbClr val="FFFFFF"/>
+              </a:highlight>
+              <a:latin typeface="Consolas" panose="020B0609020204030204" pitchFamily="49" charset="0"/>
+            </a:endParaRPr>
+          </a:p>
+          <a:p>
+            <a:pPr marL="0" indent="0">
+              <a:buNone/>
+            </a:pPr>
+            <a:r>
+              <a:rPr lang="en-US" dirty="0">
+                <a:highlight>
+                  <a:srgbClr val="FFFFFF"/>
+                </a:highlight>
+                <a:latin typeface="Consolas" panose="020B0609020204030204" pitchFamily="49" charset="0"/>
+              </a:rPr>
+              <a:t>run </a:t>
+            </a:r>
+            <a:r>
+              <a:rPr lang="en-US" dirty="0" err="1">
+                <a:highlight>
+                  <a:srgbClr val="FFFFFF"/>
+                </a:highlight>
+                <a:latin typeface="Consolas" panose="020B0609020204030204" pitchFamily="49" charset="0"/>
+              </a:rPr>
+              <a:t>pJanuaryAndDay</a:t>
+            </a:r>
+            <a:r>
+              <a:rPr lang="en-US" dirty="0">
+                <a:highlight>
+                  <a:srgbClr val="FFFFFF"/>
+                </a:highlight>
+                <a:latin typeface="Consolas" panose="020B0609020204030204" pitchFamily="49" charset="0"/>
+              </a:rPr>
+              <a:t> </a:t>
+            </a:r>
+            <a:r>
+              <a:rPr lang="en-US" dirty="0">
+                <a:solidFill>
+                  <a:srgbClr val="A31515"/>
+                </a:solidFill>
+                <a:highlight>
+                  <a:srgbClr val="FFFFFF"/>
+                </a:highlight>
+                <a:latin typeface="Consolas" panose="020B0609020204030204" pitchFamily="49" charset="0"/>
+              </a:rPr>
+              <a:t>"</a:t>
+            </a:r>
+            <a:r>
+              <a:rPr lang="en-US" dirty="0" err="1">
+                <a:solidFill>
+                  <a:srgbClr val="A31515"/>
+                </a:solidFill>
+                <a:highlight>
+                  <a:srgbClr val="FFFFFF"/>
+                </a:highlight>
+                <a:latin typeface="Consolas" panose="020B0609020204030204" pitchFamily="49" charset="0"/>
+              </a:rPr>
+              <a:t>jan</a:t>
+            </a:r>
+            <a:r>
+              <a:rPr lang="en-US" dirty="0">
+                <a:solidFill>
+                  <a:srgbClr val="A31515"/>
+                </a:solidFill>
+                <a:highlight>
+                  <a:srgbClr val="FFFFFF"/>
+                </a:highlight>
+                <a:latin typeface="Consolas" panose="020B0609020204030204" pitchFamily="49" charset="0"/>
+              </a:rPr>
+              <a:t> 3"</a:t>
             </a:r>
             <a:endParaRPr lang="en-US" dirty="0"/>
-          </a:p>
-        </p:txBody>
-      </p:sp>
-      <p:sp>
-        <p:nvSpPr>
-          <p:cNvPr id="3" name="Content Placeholder 2"/>
-          <p:cNvSpPr>
-            <a:spLocks noGrp="1"/>
-          </p:cNvSpPr>
-          <p:nvPr>
-            <p:ph idx="1"/>
-          </p:nvPr>
-        </p:nvSpPr>
-        <p:spPr/>
-        <p:txBody>
-          <a:bodyPr/>
-          <a:lstStyle/>
-          <a:p>
-            <a:endParaRPr lang="en-US"/>
           </a:p>
         </p:txBody>
       </p:sp>
     </p:spTree>
     <p:extLst>
       <p:ext uri="{BB962C8B-B14F-4D97-AF65-F5344CB8AC3E}">
-        <p14:creationId xmlns:p14="http://schemas.microsoft.com/office/powerpoint/2010/main" val="2521852015"/>
+        <p14:creationId xmlns:p14="http://schemas.microsoft.com/office/powerpoint/2010/main" val="4112961380"/>
       </p:ext>
     </p:extLst>
   </p:cSld>
@@ -3598,11 +4539,7 @@
           <a:p>
             <a:r>
               <a:rPr lang="en-US" dirty="0" smtClean="0"/>
-              <a:t>What is </a:t>
-            </a:r>
-            <a:r>
-              <a:rPr lang="en-US" dirty="0" err="1" smtClean="0"/>
-              <a:t>FParsec</a:t>
+              <a:t>Interlude: Value restriction</a:t>
             </a:r>
             <a:endParaRPr lang="en-US" dirty="0"/>
           </a:p>
@@ -3623,14 +4560,22 @@
           <a:bodyPr/>
           <a:lstStyle/>
           <a:p>
-            <a:endParaRPr lang="en-US"/>
+            <a:r>
+              <a:rPr lang="en-US" dirty="0" smtClean="0"/>
+              <a:t>Unfortunately, sometimes, if type annotation is omitted in parser definitions results in compilation error</a:t>
+            </a:r>
+            <a:r>
+              <a:rPr lang="en-US" dirty="0"/>
+              <a:t>: error FS0030: Value restriction.</a:t>
+            </a:r>
+            <a:endParaRPr lang="en-US" dirty="0"/>
           </a:p>
         </p:txBody>
       </p:sp>
     </p:spTree>
     <p:extLst>
       <p:ext uri="{BB962C8B-B14F-4D97-AF65-F5344CB8AC3E}">
-        <p14:creationId xmlns:p14="http://schemas.microsoft.com/office/powerpoint/2010/main" val="2403704732"/>
+        <p14:creationId xmlns:p14="http://schemas.microsoft.com/office/powerpoint/2010/main" val="2521852015"/>
       </p:ext>
     </p:extLst>
   </p:cSld>
@@ -3641,302 +4586,6 @@
 </file>
 
 <file path=ppt/slides/slide12.xml><?xml version="1.0" encoding="utf-8"?>
-<p:sld xmlns:a="http://schemas.openxmlformats.org/drawingml/2006/main" xmlns:r="http://schemas.openxmlformats.org/officeDocument/2006/relationships" xmlns:p="http://schemas.openxmlformats.org/presentationml/2006/main">
-  <p:cSld>
-    <p:spTree>
-      <p:nvGrpSpPr>
-        <p:cNvPr id="1" name=""/>
-        <p:cNvGrpSpPr/>
-        <p:nvPr/>
-      </p:nvGrpSpPr>
-      <p:grpSpPr>
-        <a:xfrm>
-          <a:off x="0" y="0"/>
-          <a:ext cx="0" cy="0"/>
-          <a:chOff x="0" y="0"/>
-          <a:chExt cx="0" cy="0"/>
-        </a:xfrm>
-      </p:grpSpPr>
-      <p:sp>
-        <p:nvSpPr>
-          <p:cNvPr id="2" name="Title 1"/>
-          <p:cNvSpPr>
-            <a:spLocks noGrp="1"/>
-          </p:cNvSpPr>
-          <p:nvPr>
-            <p:ph type="title"/>
-          </p:nvPr>
-        </p:nvSpPr>
-        <p:spPr/>
-        <p:txBody>
-          <a:bodyPr/>
-          <a:lstStyle/>
-          <a:p>
-            <a:r>
-              <a:rPr lang="en-US" dirty="0" smtClean="0"/>
-              <a:t>A very simple example</a:t>
-            </a:r>
-            <a:endParaRPr lang="en-US" dirty="0"/>
-          </a:p>
-        </p:txBody>
-      </p:sp>
-      <p:sp>
-        <p:nvSpPr>
-          <p:cNvPr id="3" name="Content Placeholder 2"/>
-          <p:cNvSpPr>
-            <a:spLocks noGrp="1"/>
-          </p:cNvSpPr>
-          <p:nvPr>
-            <p:ph idx="1"/>
-          </p:nvPr>
-        </p:nvSpPr>
-        <p:spPr/>
-        <p:txBody>
-          <a:bodyPr/>
-          <a:lstStyle/>
-          <a:p>
-            <a:endParaRPr lang="en-US"/>
-          </a:p>
-        </p:txBody>
-      </p:sp>
-    </p:spTree>
-    <p:extLst>
-      <p:ext uri="{BB962C8B-B14F-4D97-AF65-F5344CB8AC3E}">
-        <p14:creationId xmlns:p14="http://schemas.microsoft.com/office/powerpoint/2010/main" val="2260117768"/>
-      </p:ext>
-    </p:extLst>
-  </p:cSld>
-  <p:clrMapOvr>
-    <a:masterClrMapping/>
-  </p:clrMapOvr>
-</p:sld>
-</file>
-
-<file path=ppt/slides/slide13.xml><?xml version="1.0" encoding="utf-8"?>
-<p:sld xmlns:a="http://schemas.openxmlformats.org/drawingml/2006/main" xmlns:r="http://schemas.openxmlformats.org/officeDocument/2006/relationships" xmlns:p="http://schemas.openxmlformats.org/presentationml/2006/main">
-  <p:cSld>
-    <p:spTree>
-      <p:nvGrpSpPr>
-        <p:cNvPr id="1" name=""/>
-        <p:cNvGrpSpPr/>
-        <p:nvPr/>
-      </p:nvGrpSpPr>
-      <p:grpSpPr>
-        <a:xfrm>
-          <a:off x="0" y="0"/>
-          <a:ext cx="0" cy="0"/>
-          <a:chOff x="0" y="0"/>
-          <a:chExt cx="0" cy="0"/>
-        </a:xfrm>
-      </p:grpSpPr>
-      <p:sp>
-        <p:nvSpPr>
-          <p:cNvPr id="2" name="Title 1"/>
-          <p:cNvSpPr>
-            <a:spLocks noGrp="1"/>
-          </p:cNvSpPr>
-          <p:nvPr>
-            <p:ph type="title"/>
-          </p:nvPr>
-        </p:nvSpPr>
-        <p:spPr/>
-        <p:txBody>
-          <a:bodyPr/>
-          <a:lstStyle/>
-          <a:p>
-            <a:r>
-              <a:rPr lang="en-US" dirty="0" smtClean="0"/>
-              <a:t>What is a parser</a:t>
-            </a:r>
-            <a:endParaRPr lang="en-US" dirty="0"/>
-          </a:p>
-        </p:txBody>
-      </p:sp>
-      <p:sp>
-        <p:nvSpPr>
-          <p:cNvPr id="3" name="Content Placeholder 2"/>
-          <p:cNvSpPr>
-            <a:spLocks noGrp="1"/>
-          </p:cNvSpPr>
-          <p:nvPr>
-            <p:ph idx="1"/>
-          </p:nvPr>
-        </p:nvSpPr>
-        <p:spPr/>
-        <p:txBody>
-          <a:bodyPr/>
-          <a:lstStyle/>
-          <a:p>
-            <a:endParaRPr lang="en-US"/>
-          </a:p>
-        </p:txBody>
-      </p:sp>
-    </p:spTree>
-    <p:extLst>
-      <p:ext uri="{BB962C8B-B14F-4D97-AF65-F5344CB8AC3E}">
-        <p14:creationId xmlns:p14="http://schemas.microsoft.com/office/powerpoint/2010/main" val="3719752400"/>
-      </p:ext>
-    </p:extLst>
-  </p:cSld>
-  <p:clrMapOvr>
-    <a:masterClrMapping/>
-  </p:clrMapOvr>
-</p:sld>
-</file>
-
-<file path=ppt/slides/slide14.xml><?xml version="1.0" encoding="utf-8"?>
-<p:sld xmlns:a="http://schemas.openxmlformats.org/drawingml/2006/main" xmlns:r="http://schemas.openxmlformats.org/officeDocument/2006/relationships" xmlns:p="http://schemas.openxmlformats.org/presentationml/2006/main">
-  <p:cSld>
-    <p:spTree>
-      <p:nvGrpSpPr>
-        <p:cNvPr id="1" name=""/>
-        <p:cNvGrpSpPr/>
-        <p:nvPr/>
-      </p:nvGrpSpPr>
-      <p:grpSpPr>
-        <a:xfrm>
-          <a:off x="0" y="0"/>
-          <a:ext cx="0" cy="0"/>
-          <a:chOff x="0" y="0"/>
-          <a:chExt cx="0" cy="0"/>
-        </a:xfrm>
-      </p:grpSpPr>
-      <p:sp>
-        <p:nvSpPr>
-          <p:cNvPr id="2" name="Title 1"/>
-          <p:cNvSpPr>
-            <a:spLocks noGrp="1"/>
-          </p:cNvSpPr>
-          <p:nvPr>
-            <p:ph type="title"/>
-          </p:nvPr>
-        </p:nvSpPr>
-        <p:spPr/>
-        <p:txBody>
-          <a:bodyPr/>
-          <a:lstStyle/>
-          <a:p>
-            <a:r>
-              <a:rPr lang="en-US" dirty="0" smtClean="0"/>
-              <a:t>Building parsers with </a:t>
-            </a:r>
-            <a:r>
-              <a:rPr lang="en-US" dirty="0" err="1" smtClean="0"/>
-              <a:t>combinators</a:t>
-            </a:r>
-            <a:endParaRPr lang="en-US" dirty="0"/>
-          </a:p>
-        </p:txBody>
-      </p:sp>
-      <p:sp>
-        <p:nvSpPr>
-          <p:cNvPr id="3" name="Content Placeholder 2"/>
-          <p:cNvSpPr>
-            <a:spLocks noGrp="1"/>
-          </p:cNvSpPr>
-          <p:nvPr>
-            <p:ph idx="1"/>
-          </p:nvPr>
-        </p:nvSpPr>
-        <p:spPr/>
-        <p:txBody>
-          <a:bodyPr/>
-          <a:lstStyle/>
-          <a:p>
-            <a:endParaRPr lang="en-US"/>
-          </a:p>
-        </p:txBody>
-      </p:sp>
-    </p:spTree>
-    <p:extLst>
-      <p:ext uri="{BB962C8B-B14F-4D97-AF65-F5344CB8AC3E}">
-        <p14:creationId xmlns:p14="http://schemas.microsoft.com/office/powerpoint/2010/main" val="361896754"/>
-      </p:ext>
-    </p:extLst>
-  </p:cSld>
-  <p:clrMapOvr>
-    <a:masterClrMapping/>
-  </p:clrMapOvr>
-</p:sld>
-</file>
-
-<file path=ppt/slides/slide15.xml><?xml version="1.0" encoding="utf-8"?>
-<p:sld xmlns:a="http://schemas.openxmlformats.org/drawingml/2006/main" xmlns:r="http://schemas.openxmlformats.org/officeDocument/2006/relationships" xmlns:p="http://schemas.openxmlformats.org/presentationml/2006/main">
-  <p:cSld>
-    <p:spTree>
-      <p:nvGrpSpPr>
-        <p:cNvPr id="1" name=""/>
-        <p:cNvGrpSpPr/>
-        <p:nvPr/>
-      </p:nvGrpSpPr>
-      <p:grpSpPr>
-        <a:xfrm>
-          <a:off x="0" y="0"/>
-          <a:ext cx="0" cy="0"/>
-          <a:chOff x="0" y="0"/>
-          <a:chExt cx="0" cy="0"/>
-        </a:xfrm>
-      </p:grpSpPr>
-      <p:sp>
-        <p:nvSpPr>
-          <p:cNvPr id="2" name="Title 1"/>
-          <p:cNvSpPr>
-            <a:spLocks noGrp="1"/>
-          </p:cNvSpPr>
-          <p:nvPr>
-            <p:ph type="title"/>
-          </p:nvPr>
-        </p:nvSpPr>
-        <p:spPr/>
-        <p:txBody>
-          <a:bodyPr/>
-          <a:lstStyle/>
-          <a:p>
-            <a:r>
-              <a:rPr lang="en-US" dirty="0" smtClean="0"/>
-              <a:t>Meet the </a:t>
-            </a:r>
-            <a:r>
-              <a:rPr lang="en-US" dirty="0" err="1" smtClean="0"/>
-              <a:t>combinators</a:t>
-            </a:r>
-            <a:endParaRPr lang="en-US" dirty="0"/>
-          </a:p>
-        </p:txBody>
-      </p:sp>
-      <p:sp>
-        <p:nvSpPr>
-          <p:cNvPr id="3" name="Content Placeholder 2"/>
-          <p:cNvSpPr>
-            <a:spLocks noGrp="1"/>
-          </p:cNvSpPr>
-          <p:nvPr>
-            <p:ph idx="1"/>
-          </p:nvPr>
-        </p:nvSpPr>
-        <p:spPr/>
-        <p:txBody>
-          <a:bodyPr/>
-          <a:lstStyle/>
-          <a:p>
-            <a:endParaRPr lang="en-US"/>
-          </a:p>
-        </p:txBody>
-      </p:sp>
-    </p:spTree>
-    <p:extLst>
-      <p:ext uri="{BB962C8B-B14F-4D97-AF65-F5344CB8AC3E}">
-        <p14:creationId xmlns:p14="http://schemas.microsoft.com/office/powerpoint/2010/main" val="2622441693"/>
-      </p:ext>
-    </p:extLst>
-  </p:cSld>
-  <p:clrMapOvr>
-    <a:masterClrMapping/>
-  </p:clrMapOvr>
-</p:sld>
-</file>
-
-<file path=ppt/slides/slide16.xml><?xml version="1.0" encoding="utf-8"?>
 <p:sld xmlns:a="http://schemas.openxmlformats.org/drawingml/2006/main" xmlns:r="http://schemas.openxmlformats.org/officeDocument/2006/relationships" xmlns:p="http://schemas.openxmlformats.org/presentationml/2006/main">
   <p:cSld>
     <p:spTree>
@@ -5406,417 +6055,7 @@
           <a:p>
             <a:r>
               <a:rPr lang="en-US" dirty="0" smtClean="0"/>
-              <a:t>Functions to run a parser</a:t>
-            </a:r>
-            <a:endParaRPr lang="en-US" dirty="0"/>
-          </a:p>
-        </p:txBody>
-      </p:sp>
-      <p:sp>
-        <p:nvSpPr>
-          <p:cNvPr id="3" name="Content Placeholder 2"/>
-          <p:cNvSpPr>
-            <a:spLocks noGrp="1"/>
-          </p:cNvSpPr>
-          <p:nvPr>
-            <p:ph idx="1"/>
-          </p:nvPr>
-        </p:nvSpPr>
-        <p:spPr/>
-        <p:txBody>
-          <a:bodyPr>
-            <a:normAutofit/>
-          </a:bodyPr>
-          <a:lstStyle/>
-          <a:p>
-            <a:r>
-              <a:rPr lang="en-US" dirty="0" err="1" smtClean="0"/>
-              <a:t>runParserOnString</a:t>
-            </a:r>
-            <a:endParaRPr lang="en-US" dirty="0" smtClean="0"/>
-          </a:p>
-          <a:p>
-            <a:r>
-              <a:rPr lang="en-US" dirty="0" err="1" smtClean="0"/>
-              <a:t>runParserOnSubstring</a:t>
-            </a:r>
-            <a:endParaRPr lang="en-US" dirty="0" smtClean="0"/>
-          </a:p>
-          <a:p>
-            <a:r>
-              <a:rPr lang="en-US" dirty="0" err="1" smtClean="0"/>
-              <a:t>runParserOnStream</a:t>
-            </a:r>
-            <a:endParaRPr lang="en-US" dirty="0" smtClean="0"/>
-          </a:p>
-          <a:p>
-            <a:r>
-              <a:rPr lang="en-US" dirty="0" err="1" smtClean="0"/>
-              <a:t>runParserOnFile</a:t>
-            </a:r>
-            <a:endParaRPr lang="en-US" dirty="0" smtClean="0"/>
-          </a:p>
-          <a:p>
-            <a:endParaRPr lang="en-US" dirty="0"/>
-          </a:p>
-          <a:p>
-            <a:pPr marL="0" indent="0">
-              <a:buNone/>
-            </a:pPr>
-            <a:r>
-              <a:rPr lang="en-US" dirty="0">
-                <a:solidFill>
-                  <a:srgbClr val="0000FF"/>
-                </a:solidFill>
-                <a:highlight>
-                  <a:srgbClr val="FFFFFF"/>
-                </a:highlight>
-                <a:latin typeface="Consolas" panose="020B0609020204030204" pitchFamily="49" charset="0"/>
-              </a:rPr>
-              <a:t>type</a:t>
-            </a:r>
-            <a:r>
-              <a:rPr lang="en-US" dirty="0">
-                <a:solidFill>
-                  <a:srgbClr val="000000"/>
-                </a:solidFill>
-                <a:highlight>
-                  <a:srgbClr val="FFFFFF"/>
-                </a:highlight>
-                <a:latin typeface="Consolas" panose="020B0609020204030204" pitchFamily="49" charset="0"/>
-              </a:rPr>
-              <a:t> </a:t>
-            </a:r>
-            <a:r>
-              <a:rPr lang="en-US" dirty="0" err="1">
-                <a:solidFill>
-                  <a:srgbClr val="4EC9B0"/>
-                </a:solidFill>
-                <a:highlight>
-                  <a:srgbClr val="FFFFFF"/>
-                </a:highlight>
-                <a:latin typeface="Consolas" panose="020B0609020204030204" pitchFamily="49" charset="0"/>
-              </a:rPr>
-              <a:t>ParserResult</a:t>
-            </a:r>
-            <a:r>
-              <a:rPr lang="en-US" dirty="0">
-                <a:solidFill>
-                  <a:srgbClr val="000000"/>
-                </a:solidFill>
-                <a:highlight>
-                  <a:srgbClr val="FFFFFF"/>
-                </a:highlight>
-                <a:latin typeface="Consolas" panose="020B0609020204030204" pitchFamily="49" charset="0"/>
-              </a:rPr>
-              <a:t>&lt;'Result,'</a:t>
-            </a:r>
-            <a:r>
-              <a:rPr lang="en-US" dirty="0" err="1">
-                <a:solidFill>
-                  <a:srgbClr val="000000"/>
-                </a:solidFill>
-                <a:highlight>
-                  <a:srgbClr val="FFFFFF"/>
-                </a:highlight>
-                <a:latin typeface="Consolas" panose="020B0609020204030204" pitchFamily="49" charset="0"/>
-              </a:rPr>
-              <a:t>UserState</a:t>
-            </a:r>
-            <a:r>
-              <a:rPr lang="en-US" dirty="0">
-                <a:solidFill>
-                  <a:srgbClr val="000000"/>
-                </a:solidFill>
-                <a:highlight>
-                  <a:srgbClr val="FFFFFF"/>
-                </a:highlight>
-                <a:latin typeface="Consolas" panose="020B0609020204030204" pitchFamily="49" charset="0"/>
-              </a:rPr>
-              <a:t>&gt; </a:t>
-            </a:r>
-            <a:r>
-              <a:rPr lang="en-US" dirty="0">
-                <a:solidFill>
-                  <a:srgbClr val="DCDCDC"/>
-                </a:solidFill>
-                <a:highlight>
-                  <a:srgbClr val="FFFFFF"/>
-                </a:highlight>
-                <a:latin typeface="Consolas" panose="020B0609020204030204" pitchFamily="49" charset="0"/>
-              </a:rPr>
-              <a:t>=</a:t>
-            </a:r>
-            <a:endParaRPr lang="en-US" dirty="0">
-              <a:solidFill>
-                <a:srgbClr val="000000"/>
-              </a:solidFill>
-              <a:highlight>
-                <a:srgbClr val="FFFFFF"/>
-              </a:highlight>
-              <a:latin typeface="Consolas" panose="020B0609020204030204" pitchFamily="49" charset="0"/>
-            </a:endParaRPr>
-          </a:p>
-          <a:p>
-            <a:pPr marL="0" indent="0">
-              <a:buNone/>
-            </a:pPr>
-            <a:r>
-              <a:rPr lang="en-US" dirty="0" smtClean="0">
-                <a:solidFill>
-                  <a:srgbClr val="000000"/>
-                </a:solidFill>
-                <a:highlight>
-                  <a:srgbClr val="FFFFFF"/>
-                </a:highlight>
-                <a:latin typeface="Consolas" panose="020B0609020204030204" pitchFamily="49" charset="0"/>
-              </a:rPr>
-              <a:t>  | </a:t>
-            </a:r>
-            <a:r>
-              <a:rPr lang="en-US" dirty="0">
-                <a:highlight>
-                  <a:srgbClr val="FFFFFF"/>
-                </a:highlight>
-                <a:latin typeface="Consolas" panose="020B0609020204030204" pitchFamily="49" charset="0"/>
-              </a:rPr>
-              <a:t>Success </a:t>
-            </a:r>
-            <a:r>
-              <a:rPr lang="en-US" dirty="0">
-                <a:solidFill>
-                  <a:srgbClr val="0000FF"/>
-                </a:solidFill>
-                <a:highlight>
-                  <a:srgbClr val="FFFFFF"/>
-                </a:highlight>
-                <a:latin typeface="Consolas" panose="020B0609020204030204" pitchFamily="49" charset="0"/>
-              </a:rPr>
-              <a:t>of</a:t>
-            </a:r>
-            <a:r>
-              <a:rPr lang="en-US" dirty="0">
-                <a:solidFill>
-                  <a:srgbClr val="000000"/>
-                </a:solidFill>
-                <a:highlight>
-                  <a:srgbClr val="FFFFFF"/>
-                </a:highlight>
-                <a:latin typeface="Consolas" panose="020B0609020204030204" pitchFamily="49" charset="0"/>
-              </a:rPr>
-              <a:t> 'Result * '</a:t>
-            </a:r>
-            <a:r>
-              <a:rPr lang="en-US" dirty="0" err="1">
-                <a:solidFill>
-                  <a:srgbClr val="000000"/>
-                </a:solidFill>
-                <a:highlight>
-                  <a:srgbClr val="FFFFFF"/>
-                </a:highlight>
-                <a:latin typeface="Consolas" panose="020B0609020204030204" pitchFamily="49" charset="0"/>
-              </a:rPr>
-              <a:t>UserState</a:t>
-            </a:r>
-            <a:r>
-              <a:rPr lang="en-US" dirty="0">
-                <a:solidFill>
-                  <a:srgbClr val="000000"/>
-                </a:solidFill>
-                <a:highlight>
-                  <a:srgbClr val="FFFFFF"/>
-                </a:highlight>
-                <a:latin typeface="Consolas" panose="020B0609020204030204" pitchFamily="49" charset="0"/>
-              </a:rPr>
-              <a:t> * </a:t>
-            </a:r>
-            <a:r>
-              <a:rPr lang="en-US" dirty="0">
-                <a:solidFill>
-                  <a:srgbClr val="4EC9B0"/>
-                </a:solidFill>
-                <a:highlight>
-                  <a:srgbClr val="FFFFFF"/>
-                </a:highlight>
-                <a:latin typeface="Consolas" panose="020B0609020204030204" pitchFamily="49" charset="0"/>
-              </a:rPr>
-              <a:t>Position</a:t>
-            </a:r>
-            <a:endParaRPr lang="en-US" dirty="0">
-              <a:solidFill>
-                <a:srgbClr val="000000"/>
-              </a:solidFill>
-              <a:highlight>
-                <a:srgbClr val="FFFFFF"/>
-              </a:highlight>
-              <a:latin typeface="Consolas" panose="020B0609020204030204" pitchFamily="49" charset="0"/>
-            </a:endParaRPr>
-          </a:p>
-          <a:p>
-            <a:pPr marL="0" indent="0">
-              <a:buNone/>
-            </a:pPr>
-            <a:r>
-              <a:rPr lang="en-US" dirty="0" smtClean="0">
-                <a:solidFill>
-                  <a:srgbClr val="000000"/>
-                </a:solidFill>
-                <a:highlight>
-                  <a:srgbClr val="FFFFFF"/>
-                </a:highlight>
-                <a:latin typeface="Consolas" panose="020B0609020204030204" pitchFamily="49" charset="0"/>
-              </a:rPr>
-              <a:t>  | </a:t>
-            </a:r>
-            <a:r>
-              <a:rPr lang="en-US" dirty="0">
-                <a:highlight>
-                  <a:srgbClr val="FFFFFF"/>
-                </a:highlight>
-                <a:latin typeface="Consolas" panose="020B0609020204030204" pitchFamily="49" charset="0"/>
-              </a:rPr>
-              <a:t>Failure </a:t>
-            </a:r>
-            <a:r>
-              <a:rPr lang="en-US" dirty="0">
-                <a:solidFill>
-                  <a:srgbClr val="0000FF"/>
-                </a:solidFill>
-                <a:highlight>
-                  <a:srgbClr val="FFFFFF"/>
-                </a:highlight>
-                <a:latin typeface="Consolas" panose="020B0609020204030204" pitchFamily="49" charset="0"/>
-              </a:rPr>
-              <a:t>of</a:t>
-            </a:r>
-            <a:r>
-              <a:rPr lang="en-US" dirty="0">
-                <a:solidFill>
-                  <a:srgbClr val="000000"/>
-                </a:solidFill>
-                <a:highlight>
-                  <a:srgbClr val="FFFFFF"/>
-                </a:highlight>
-                <a:latin typeface="Consolas" panose="020B0609020204030204" pitchFamily="49" charset="0"/>
-              </a:rPr>
-              <a:t> </a:t>
-            </a:r>
-            <a:r>
-              <a:rPr lang="en-US" dirty="0">
-                <a:solidFill>
-                  <a:srgbClr val="4EC9B0"/>
-                </a:solidFill>
-                <a:highlight>
-                  <a:srgbClr val="FFFFFF"/>
-                </a:highlight>
-                <a:latin typeface="Consolas" panose="020B0609020204030204" pitchFamily="49" charset="0"/>
-              </a:rPr>
-              <a:t>string</a:t>
-            </a:r>
-            <a:r>
-              <a:rPr lang="en-US" dirty="0">
-                <a:solidFill>
-                  <a:srgbClr val="000000"/>
-                </a:solidFill>
-                <a:highlight>
-                  <a:srgbClr val="FFFFFF"/>
-                </a:highlight>
-                <a:latin typeface="Consolas" panose="020B0609020204030204" pitchFamily="49" charset="0"/>
-              </a:rPr>
-              <a:t> * </a:t>
-            </a:r>
-            <a:r>
-              <a:rPr lang="en-US" dirty="0" err="1">
-                <a:solidFill>
-                  <a:srgbClr val="4EC9B0"/>
-                </a:solidFill>
-                <a:highlight>
-                  <a:srgbClr val="FFFFFF"/>
-                </a:highlight>
-                <a:latin typeface="Consolas" panose="020B0609020204030204" pitchFamily="49" charset="0"/>
-              </a:rPr>
-              <a:t>ParserError</a:t>
-            </a:r>
-            <a:r>
-              <a:rPr lang="en-US" dirty="0">
-                <a:solidFill>
-                  <a:srgbClr val="000000"/>
-                </a:solidFill>
-                <a:highlight>
-                  <a:srgbClr val="FFFFFF"/>
-                </a:highlight>
-                <a:latin typeface="Consolas" panose="020B0609020204030204" pitchFamily="49" charset="0"/>
-              </a:rPr>
-              <a:t> * '</a:t>
-            </a:r>
-            <a:r>
-              <a:rPr lang="en-US" dirty="0" err="1">
-                <a:solidFill>
-                  <a:srgbClr val="000000"/>
-                </a:solidFill>
-                <a:highlight>
-                  <a:srgbClr val="FFFFFF"/>
-                </a:highlight>
-                <a:latin typeface="Consolas" panose="020B0609020204030204" pitchFamily="49" charset="0"/>
-              </a:rPr>
-              <a:t>UserState</a:t>
-            </a:r>
-            <a:endParaRPr lang="en-US" dirty="0"/>
-          </a:p>
-        </p:txBody>
-      </p:sp>
-    </p:spTree>
-    <p:extLst>
-      <p:ext uri="{BB962C8B-B14F-4D97-AF65-F5344CB8AC3E}">
-        <p14:creationId xmlns:p14="http://schemas.microsoft.com/office/powerpoint/2010/main" val="3314648361"/>
-      </p:ext>
-    </p:extLst>
-  </p:cSld>
-  <p:clrMapOvr>
-    <a:masterClrMapping/>
-  </p:clrMapOvr>
-</p:sld>
-</file>
-
-<file path=ppt/slides/slide7.xml><?xml version="1.0" encoding="utf-8"?>
-<p:sld xmlns:a="http://schemas.openxmlformats.org/drawingml/2006/main" xmlns:r="http://schemas.openxmlformats.org/officeDocument/2006/relationships" xmlns:p="http://schemas.openxmlformats.org/presentationml/2006/main">
-  <p:cSld>
-    <p:spTree>
-      <p:nvGrpSpPr>
-        <p:cNvPr id="1" name=""/>
-        <p:cNvGrpSpPr/>
-        <p:nvPr/>
-      </p:nvGrpSpPr>
-      <p:grpSpPr>
-        <a:xfrm>
-          <a:off x="0" y="0"/>
-          <a:ext cx="0" cy="0"/>
-          <a:chOff x="0" y="0"/>
-          <a:chExt cx="0" cy="0"/>
-        </a:xfrm>
-      </p:grpSpPr>
-      <p:sp>
-        <p:nvSpPr>
-          <p:cNvPr id="2" name="Title 1"/>
-          <p:cNvSpPr>
-            <a:spLocks noGrp="1"/>
-          </p:cNvSpPr>
-          <p:nvPr>
-            <p:ph type="title"/>
-          </p:nvPr>
-        </p:nvSpPr>
-        <p:spPr/>
-        <p:txBody>
-          <a:bodyPr/>
-          <a:lstStyle/>
-          <a:p>
-            <a:r>
-              <a:rPr lang="en-US" dirty="0" smtClean="0"/>
-              <a:t>Some basic </a:t>
-            </a:r>
-            <a:r>
-              <a:rPr lang="en-US" dirty="0" smtClean="0"/>
-              <a:t>parsers</a:t>
+              <a:t>Some basic parsers</a:t>
             </a:r>
             <a:endParaRPr lang="en-US" dirty="0"/>
           </a:p>
@@ -6364,7 +6603,1178 @@
 </p:sld>
 </file>
 
+<file path=ppt/slides/slide7.xml><?xml version="1.0" encoding="utf-8"?>
+<p:sld xmlns:a="http://schemas.openxmlformats.org/drawingml/2006/main" xmlns:r="http://schemas.openxmlformats.org/officeDocument/2006/relationships" xmlns:p="http://schemas.openxmlformats.org/presentationml/2006/main">
+  <p:cSld>
+    <p:spTree>
+      <p:nvGrpSpPr>
+        <p:cNvPr id="1" name=""/>
+        <p:cNvGrpSpPr/>
+        <p:nvPr/>
+      </p:nvGrpSpPr>
+      <p:grpSpPr>
+        <a:xfrm>
+          <a:off x="0" y="0"/>
+          <a:ext cx="0" cy="0"/>
+          <a:chOff x="0" y="0"/>
+          <a:chExt cx="0" cy="0"/>
+        </a:xfrm>
+      </p:grpSpPr>
+      <p:sp>
+        <p:nvSpPr>
+          <p:cNvPr id="2" name="Title 1"/>
+          <p:cNvSpPr>
+            <a:spLocks noGrp="1"/>
+          </p:cNvSpPr>
+          <p:nvPr>
+            <p:ph type="title"/>
+          </p:nvPr>
+        </p:nvSpPr>
+        <p:spPr/>
+        <p:txBody>
+          <a:bodyPr/>
+          <a:lstStyle/>
+          <a:p>
+            <a:r>
+              <a:rPr lang="en-US" dirty="0" smtClean="0"/>
+              <a:t>Basic parsers: examples</a:t>
+            </a:r>
+            <a:endParaRPr lang="en-US" dirty="0"/>
+          </a:p>
+        </p:txBody>
+      </p:sp>
+      <p:graphicFrame>
+        <p:nvGraphicFramePr>
+          <p:cNvPr id="4" name="Table 3"/>
+          <p:cNvGraphicFramePr>
+            <a:graphicFrameLocks noGrp="1"/>
+          </p:cNvGraphicFramePr>
+          <p:nvPr>
+            <p:extLst>
+              <p:ext uri="{D42A27DB-BD31-4B8C-83A1-F6EECF244321}">
+                <p14:modId xmlns:p14="http://schemas.microsoft.com/office/powerpoint/2010/main" val="3636299208"/>
+              </p:ext>
+            </p:extLst>
+          </p:nvPr>
+        </p:nvGraphicFramePr>
+        <p:xfrm>
+          <a:off x="838200" y="1768747"/>
+          <a:ext cx="10515600" cy="1780191"/>
+        </p:xfrm>
+        <a:graphic>
+          <a:graphicData uri="http://schemas.openxmlformats.org/drawingml/2006/table">
+            <a:tbl>
+              <a:tblPr firstRow="1" bandRow="1">
+                <a:tableStyleId>{0E3FDE45-AF77-4B5C-9715-49D594BDF05E}</a:tableStyleId>
+              </a:tblPr>
+              <a:tblGrid>
+                <a:gridCol w="3187390"/>
+                <a:gridCol w="7328210"/>
+              </a:tblGrid>
+              <a:tr h="651068">
+                <a:tc>
+                  <a:txBody>
+                    <a:bodyPr/>
+                    <a:lstStyle/>
+                    <a:p>
+                      <a:r>
+                        <a:rPr lang="en-US" b="0" dirty="0" err="1" smtClean="0"/>
+                        <a:t>pstring</a:t>
+                      </a:r>
+                      <a:r>
+                        <a:rPr lang="en-US" b="0" dirty="0" smtClean="0"/>
+                        <a:t> “Jan”</a:t>
+                      </a:r>
+                      <a:endParaRPr lang="en-US" b="0" dirty="0"/>
+                    </a:p>
+                  </a:txBody>
+                  <a:tcPr/>
+                </a:tc>
+                <a:tc>
+                  <a:txBody>
+                    <a:bodyPr/>
+                    <a:lstStyle/>
+                    <a:p>
+                      <a:r>
+                        <a:rPr lang="en-US" b="0" dirty="0" smtClean="0"/>
+                        <a:t>Parses “Jan”</a:t>
+                      </a:r>
+                      <a:endParaRPr lang="en-US" b="0" dirty="0"/>
+                    </a:p>
+                  </a:txBody>
+                  <a:tcPr/>
+                </a:tc>
+              </a:tr>
+              <a:tr h="758283">
+                <a:tc>
+                  <a:txBody>
+                    <a:bodyPr/>
+                    <a:lstStyle/>
+                    <a:p>
+                      <a:r>
+                        <a:rPr lang="en-US" b="0" dirty="0" err="1" smtClean="0"/>
+                        <a:t>pstringCI</a:t>
+                      </a:r>
+                      <a:r>
+                        <a:rPr lang="en-US" b="0" dirty="0" smtClean="0"/>
+                        <a:t> “Jan”</a:t>
+                      </a:r>
+                      <a:endParaRPr lang="en-US" b="0" dirty="0"/>
+                    </a:p>
+                  </a:txBody>
+                  <a:tcPr/>
+                </a:tc>
+                <a:tc>
+                  <a:txBody>
+                    <a:bodyPr/>
+                    <a:lstStyle/>
+                    <a:p>
+                      <a:r>
+                        <a:rPr lang="en-US" b="0" dirty="0" smtClean="0"/>
+                        <a:t>Parsers “Jan”, “</a:t>
+                      </a:r>
+                      <a:r>
+                        <a:rPr lang="en-US" b="0" dirty="0" err="1" smtClean="0"/>
+                        <a:t>jan</a:t>
+                      </a:r>
+                      <a:r>
+                        <a:rPr lang="en-US" b="0" dirty="0" smtClean="0"/>
+                        <a:t>”, “Jan” and so on</a:t>
+                      </a:r>
+                      <a:endParaRPr lang="en-US" b="0" dirty="0"/>
+                    </a:p>
+                  </a:txBody>
+                  <a:tcPr/>
+                </a:tc>
+              </a:tr>
+              <a:tr h="370840">
+                <a:tc>
+                  <a:txBody>
+                    <a:bodyPr/>
+                    <a:lstStyle/>
+                    <a:p>
+                      <a:r>
+                        <a:rPr lang="en-US" b="0" dirty="0" err="1" smtClean="0"/>
+                        <a:t>pchar</a:t>
+                      </a:r>
+                      <a:r>
+                        <a:rPr lang="en-US" b="0" dirty="0" smtClean="0"/>
+                        <a:t> ‘c’</a:t>
+                      </a:r>
+                      <a:endParaRPr lang="en-US" b="0" dirty="0"/>
+                    </a:p>
+                  </a:txBody>
+                  <a:tcPr/>
+                </a:tc>
+                <a:tc>
+                  <a:txBody>
+                    <a:bodyPr/>
+                    <a:lstStyle/>
+                    <a:p>
+                      <a:r>
+                        <a:rPr lang="en-US" b="0" dirty="0" smtClean="0"/>
+                        <a:t>Parses</a:t>
+                      </a:r>
+                      <a:r>
+                        <a:rPr lang="en-US" b="0" baseline="0" dirty="0" smtClean="0"/>
+                        <a:t> “c”</a:t>
+                      </a:r>
+                      <a:endParaRPr lang="en-US" b="0" dirty="0"/>
+                    </a:p>
+                  </a:txBody>
+                  <a:tcPr/>
+                </a:tc>
+              </a:tr>
+            </a:tbl>
+          </a:graphicData>
+        </a:graphic>
+      </p:graphicFrame>
+      <p:sp>
+        <p:nvSpPr>
+          <p:cNvPr id="5" name="TextBox 4"/>
+          <p:cNvSpPr txBox="1"/>
+          <p:nvPr/>
+        </p:nvSpPr>
+        <p:spPr>
+          <a:xfrm>
+            <a:off x="838200" y="4395355"/>
+            <a:ext cx="10515600" cy="1384995"/>
+          </a:xfrm>
+          <a:prstGeom prst="rect">
+            <a:avLst/>
+          </a:prstGeom>
+          <a:noFill/>
+        </p:spPr>
+        <p:txBody>
+          <a:bodyPr wrap="square" rtlCol="0">
+            <a:spAutoFit/>
+          </a:bodyPr>
+          <a:lstStyle/>
+          <a:p>
+            <a:r>
+              <a:rPr lang="en-US" sz="2800" dirty="0" smtClean="0"/>
+              <a:t>&gt; run </a:t>
+            </a:r>
+            <a:r>
+              <a:rPr lang="en-US" sz="2800" dirty="0"/>
+              <a:t>(</a:t>
+            </a:r>
+            <a:r>
+              <a:rPr lang="en-US" sz="2800" dirty="0" err="1"/>
+              <a:t>pstring</a:t>
+            </a:r>
+            <a:r>
+              <a:rPr lang="en-US" sz="2800" dirty="0"/>
+              <a:t> "Jan") "</a:t>
+            </a:r>
+            <a:r>
+              <a:rPr lang="en-US" sz="2800" dirty="0" smtClean="0"/>
+              <a:t>Jan“</a:t>
+            </a:r>
+          </a:p>
+          <a:p>
+            <a:r>
+              <a:rPr lang="en-US" sz="2800" dirty="0" err="1"/>
+              <a:t>val</a:t>
+            </a:r>
+            <a:r>
+              <a:rPr lang="en-US" sz="2800" dirty="0"/>
+              <a:t> run : p:Parser&lt;'a,unit&gt; -&gt; s:string -&gt; 'a</a:t>
+            </a:r>
+          </a:p>
+          <a:p>
+            <a:r>
+              <a:rPr lang="en-US" sz="2800" dirty="0" err="1"/>
+              <a:t>val</a:t>
+            </a:r>
+            <a:r>
+              <a:rPr lang="en-US" sz="2800" dirty="0"/>
+              <a:t> it : string = "Jan"</a:t>
+            </a:r>
+            <a:endParaRPr lang="en-US" sz="2800" dirty="0"/>
+          </a:p>
+        </p:txBody>
+      </p:sp>
+    </p:spTree>
+    <p:extLst>
+      <p:ext uri="{BB962C8B-B14F-4D97-AF65-F5344CB8AC3E}">
+        <p14:creationId xmlns:p14="http://schemas.microsoft.com/office/powerpoint/2010/main" val="3027140944"/>
+      </p:ext>
+    </p:extLst>
+  </p:cSld>
+  <p:clrMapOvr>
+    <a:masterClrMapping/>
+  </p:clrMapOvr>
+</p:sld>
+</file>
+
 <file path=ppt/slides/slide8.xml><?xml version="1.0" encoding="utf-8"?>
+<p:sld xmlns:a="http://schemas.openxmlformats.org/drawingml/2006/main" xmlns:r="http://schemas.openxmlformats.org/officeDocument/2006/relationships" xmlns:p="http://schemas.openxmlformats.org/presentationml/2006/main">
+  <p:cSld>
+    <p:spTree>
+      <p:nvGrpSpPr>
+        <p:cNvPr id="1" name=""/>
+        <p:cNvGrpSpPr/>
+        <p:nvPr/>
+      </p:nvGrpSpPr>
+      <p:grpSpPr>
+        <a:xfrm>
+          <a:off x="0" y="0"/>
+          <a:ext cx="0" cy="0"/>
+          <a:chOff x="0" y="0"/>
+          <a:chExt cx="0" cy="0"/>
+        </a:xfrm>
+      </p:grpSpPr>
+      <p:sp>
+        <p:nvSpPr>
+          <p:cNvPr id="2" name="Title 1"/>
+          <p:cNvSpPr>
+            <a:spLocks noGrp="1"/>
+          </p:cNvSpPr>
+          <p:nvPr>
+            <p:ph type="title"/>
+          </p:nvPr>
+        </p:nvSpPr>
+        <p:spPr/>
+        <p:txBody>
+          <a:bodyPr/>
+          <a:lstStyle/>
+          <a:p>
+            <a:r>
+              <a:rPr lang="en-US" dirty="0" smtClean="0"/>
+              <a:t>Interlude: running parsers</a:t>
+            </a:r>
+            <a:endParaRPr lang="en-US" dirty="0"/>
+          </a:p>
+        </p:txBody>
+      </p:sp>
+      <p:sp>
+        <p:nvSpPr>
+          <p:cNvPr id="3" name="Content Placeholder 2"/>
+          <p:cNvSpPr>
+            <a:spLocks noGrp="1"/>
+          </p:cNvSpPr>
+          <p:nvPr>
+            <p:ph idx="1"/>
+          </p:nvPr>
+        </p:nvSpPr>
+        <p:spPr/>
+        <p:txBody>
+          <a:bodyPr>
+            <a:normAutofit fontScale="92500" lnSpcReduction="20000"/>
+          </a:bodyPr>
+          <a:lstStyle/>
+          <a:p>
+            <a:r>
+              <a:rPr lang="en-US" dirty="0" err="1" smtClean="0"/>
+              <a:t>runParserOnString</a:t>
+            </a:r>
+            <a:r>
+              <a:rPr lang="en-US" dirty="0" smtClean="0"/>
+              <a:t>, </a:t>
+            </a:r>
+            <a:r>
+              <a:rPr lang="en-US" dirty="0" err="1" smtClean="0"/>
+              <a:t>runParserOnSubstring</a:t>
+            </a:r>
+            <a:r>
+              <a:rPr lang="en-US" dirty="0" smtClean="0"/>
+              <a:t>, </a:t>
+            </a:r>
+            <a:r>
+              <a:rPr lang="en-US" dirty="0" err="1" smtClean="0"/>
+              <a:t>runParserOnStream</a:t>
+            </a:r>
+            <a:r>
+              <a:rPr lang="en-US" dirty="0" smtClean="0"/>
+              <a:t>, </a:t>
+            </a:r>
+            <a:r>
+              <a:rPr lang="en-US" dirty="0" err="1" smtClean="0"/>
+              <a:t>runParserOnFile</a:t>
+            </a:r>
+            <a:endParaRPr lang="en-US" dirty="0" smtClean="0"/>
+          </a:p>
+          <a:p>
+            <a:endParaRPr lang="en-US" dirty="0"/>
+          </a:p>
+          <a:p>
+            <a:pPr marL="0" indent="0">
+              <a:buNone/>
+            </a:pPr>
+            <a:r>
+              <a:rPr lang="en-US" sz="2000" dirty="0">
+                <a:solidFill>
+                  <a:srgbClr val="0000FF"/>
+                </a:solidFill>
+                <a:highlight>
+                  <a:srgbClr val="FFFFFF"/>
+                </a:highlight>
+                <a:latin typeface="Consolas" panose="020B0609020204030204" pitchFamily="49" charset="0"/>
+              </a:rPr>
+              <a:t>type</a:t>
+            </a:r>
+            <a:r>
+              <a:rPr lang="en-US" sz="2000" dirty="0">
+                <a:solidFill>
+                  <a:srgbClr val="000000"/>
+                </a:solidFill>
+                <a:highlight>
+                  <a:srgbClr val="FFFFFF"/>
+                </a:highlight>
+                <a:latin typeface="Consolas" panose="020B0609020204030204" pitchFamily="49" charset="0"/>
+              </a:rPr>
+              <a:t> </a:t>
+            </a:r>
+            <a:r>
+              <a:rPr lang="en-US" sz="2000" dirty="0" err="1">
+                <a:solidFill>
+                  <a:srgbClr val="4EC9B0"/>
+                </a:solidFill>
+                <a:highlight>
+                  <a:srgbClr val="FFFFFF"/>
+                </a:highlight>
+                <a:latin typeface="Consolas" panose="020B0609020204030204" pitchFamily="49" charset="0"/>
+              </a:rPr>
+              <a:t>ParserResult</a:t>
+            </a:r>
+            <a:r>
+              <a:rPr lang="en-US" sz="2000" dirty="0">
+                <a:solidFill>
+                  <a:srgbClr val="000000"/>
+                </a:solidFill>
+                <a:highlight>
+                  <a:srgbClr val="FFFFFF"/>
+                </a:highlight>
+                <a:latin typeface="Consolas" panose="020B0609020204030204" pitchFamily="49" charset="0"/>
+              </a:rPr>
+              <a:t>&lt;'Result,'</a:t>
+            </a:r>
+            <a:r>
+              <a:rPr lang="en-US" sz="2000" dirty="0" err="1">
+                <a:solidFill>
+                  <a:srgbClr val="000000"/>
+                </a:solidFill>
+                <a:highlight>
+                  <a:srgbClr val="FFFFFF"/>
+                </a:highlight>
+                <a:latin typeface="Consolas" panose="020B0609020204030204" pitchFamily="49" charset="0"/>
+              </a:rPr>
+              <a:t>UserState</a:t>
+            </a:r>
+            <a:r>
+              <a:rPr lang="en-US" sz="2000" dirty="0">
+                <a:solidFill>
+                  <a:srgbClr val="000000"/>
+                </a:solidFill>
+                <a:highlight>
+                  <a:srgbClr val="FFFFFF"/>
+                </a:highlight>
+                <a:latin typeface="Consolas" panose="020B0609020204030204" pitchFamily="49" charset="0"/>
+              </a:rPr>
+              <a:t>&gt; </a:t>
+            </a:r>
+            <a:r>
+              <a:rPr lang="en-US" sz="2000" dirty="0">
+                <a:solidFill>
+                  <a:srgbClr val="DCDCDC"/>
+                </a:solidFill>
+                <a:highlight>
+                  <a:srgbClr val="FFFFFF"/>
+                </a:highlight>
+                <a:latin typeface="Consolas" panose="020B0609020204030204" pitchFamily="49" charset="0"/>
+              </a:rPr>
+              <a:t>=</a:t>
+            </a:r>
+            <a:endParaRPr lang="en-US" sz="2000" dirty="0">
+              <a:solidFill>
+                <a:srgbClr val="000000"/>
+              </a:solidFill>
+              <a:highlight>
+                <a:srgbClr val="FFFFFF"/>
+              </a:highlight>
+              <a:latin typeface="Consolas" panose="020B0609020204030204" pitchFamily="49" charset="0"/>
+            </a:endParaRPr>
+          </a:p>
+          <a:p>
+            <a:pPr marL="0" indent="0">
+              <a:buNone/>
+            </a:pPr>
+            <a:r>
+              <a:rPr lang="en-US" sz="2000" dirty="0" smtClean="0">
+                <a:solidFill>
+                  <a:srgbClr val="000000"/>
+                </a:solidFill>
+                <a:highlight>
+                  <a:srgbClr val="FFFFFF"/>
+                </a:highlight>
+                <a:latin typeface="Consolas" panose="020B0609020204030204" pitchFamily="49" charset="0"/>
+              </a:rPr>
+              <a:t>  | </a:t>
+            </a:r>
+            <a:r>
+              <a:rPr lang="en-US" sz="2000" dirty="0">
+                <a:highlight>
+                  <a:srgbClr val="FFFFFF"/>
+                </a:highlight>
+                <a:latin typeface="Consolas" panose="020B0609020204030204" pitchFamily="49" charset="0"/>
+              </a:rPr>
+              <a:t>Success </a:t>
+            </a:r>
+            <a:r>
+              <a:rPr lang="en-US" sz="2000" dirty="0">
+                <a:solidFill>
+                  <a:srgbClr val="0000FF"/>
+                </a:solidFill>
+                <a:highlight>
+                  <a:srgbClr val="FFFFFF"/>
+                </a:highlight>
+                <a:latin typeface="Consolas" panose="020B0609020204030204" pitchFamily="49" charset="0"/>
+              </a:rPr>
+              <a:t>of</a:t>
+            </a:r>
+            <a:r>
+              <a:rPr lang="en-US" sz="2000" dirty="0">
+                <a:solidFill>
+                  <a:srgbClr val="000000"/>
+                </a:solidFill>
+                <a:highlight>
+                  <a:srgbClr val="FFFFFF"/>
+                </a:highlight>
+                <a:latin typeface="Consolas" panose="020B0609020204030204" pitchFamily="49" charset="0"/>
+              </a:rPr>
+              <a:t> 'Result * '</a:t>
+            </a:r>
+            <a:r>
+              <a:rPr lang="en-US" sz="2000" dirty="0" err="1">
+                <a:solidFill>
+                  <a:srgbClr val="000000"/>
+                </a:solidFill>
+                <a:highlight>
+                  <a:srgbClr val="FFFFFF"/>
+                </a:highlight>
+                <a:latin typeface="Consolas" panose="020B0609020204030204" pitchFamily="49" charset="0"/>
+              </a:rPr>
+              <a:t>UserState</a:t>
+            </a:r>
+            <a:r>
+              <a:rPr lang="en-US" sz="2000" dirty="0">
+                <a:solidFill>
+                  <a:srgbClr val="000000"/>
+                </a:solidFill>
+                <a:highlight>
+                  <a:srgbClr val="FFFFFF"/>
+                </a:highlight>
+                <a:latin typeface="Consolas" panose="020B0609020204030204" pitchFamily="49" charset="0"/>
+              </a:rPr>
+              <a:t> * </a:t>
+            </a:r>
+            <a:r>
+              <a:rPr lang="en-US" sz="2000" dirty="0">
+                <a:solidFill>
+                  <a:srgbClr val="4EC9B0"/>
+                </a:solidFill>
+                <a:highlight>
+                  <a:srgbClr val="FFFFFF"/>
+                </a:highlight>
+                <a:latin typeface="Consolas" panose="020B0609020204030204" pitchFamily="49" charset="0"/>
+              </a:rPr>
+              <a:t>Position</a:t>
+            </a:r>
+            <a:endParaRPr lang="en-US" sz="2000" dirty="0">
+              <a:solidFill>
+                <a:srgbClr val="000000"/>
+              </a:solidFill>
+              <a:highlight>
+                <a:srgbClr val="FFFFFF"/>
+              </a:highlight>
+              <a:latin typeface="Consolas" panose="020B0609020204030204" pitchFamily="49" charset="0"/>
+            </a:endParaRPr>
+          </a:p>
+          <a:p>
+            <a:pPr marL="0" indent="0">
+              <a:buNone/>
+            </a:pPr>
+            <a:r>
+              <a:rPr lang="en-US" sz="2000" dirty="0" smtClean="0">
+                <a:solidFill>
+                  <a:srgbClr val="000000"/>
+                </a:solidFill>
+                <a:highlight>
+                  <a:srgbClr val="FFFFFF"/>
+                </a:highlight>
+                <a:latin typeface="Consolas" panose="020B0609020204030204" pitchFamily="49" charset="0"/>
+              </a:rPr>
+              <a:t>  | </a:t>
+            </a:r>
+            <a:r>
+              <a:rPr lang="en-US" sz="2000" dirty="0">
+                <a:highlight>
+                  <a:srgbClr val="FFFFFF"/>
+                </a:highlight>
+                <a:latin typeface="Consolas" panose="020B0609020204030204" pitchFamily="49" charset="0"/>
+              </a:rPr>
+              <a:t>Failure </a:t>
+            </a:r>
+            <a:r>
+              <a:rPr lang="en-US" sz="2000" dirty="0">
+                <a:solidFill>
+                  <a:srgbClr val="0000FF"/>
+                </a:solidFill>
+                <a:highlight>
+                  <a:srgbClr val="FFFFFF"/>
+                </a:highlight>
+                <a:latin typeface="Consolas" panose="020B0609020204030204" pitchFamily="49" charset="0"/>
+              </a:rPr>
+              <a:t>of</a:t>
+            </a:r>
+            <a:r>
+              <a:rPr lang="en-US" sz="2000" dirty="0">
+                <a:solidFill>
+                  <a:srgbClr val="000000"/>
+                </a:solidFill>
+                <a:highlight>
+                  <a:srgbClr val="FFFFFF"/>
+                </a:highlight>
+                <a:latin typeface="Consolas" panose="020B0609020204030204" pitchFamily="49" charset="0"/>
+              </a:rPr>
+              <a:t> </a:t>
+            </a:r>
+            <a:r>
+              <a:rPr lang="en-US" sz="2000" dirty="0">
+                <a:solidFill>
+                  <a:srgbClr val="4EC9B0"/>
+                </a:solidFill>
+                <a:highlight>
+                  <a:srgbClr val="FFFFFF"/>
+                </a:highlight>
+                <a:latin typeface="Consolas" panose="020B0609020204030204" pitchFamily="49" charset="0"/>
+              </a:rPr>
+              <a:t>string</a:t>
+            </a:r>
+            <a:r>
+              <a:rPr lang="en-US" sz="2000" dirty="0">
+                <a:solidFill>
+                  <a:srgbClr val="000000"/>
+                </a:solidFill>
+                <a:highlight>
+                  <a:srgbClr val="FFFFFF"/>
+                </a:highlight>
+                <a:latin typeface="Consolas" panose="020B0609020204030204" pitchFamily="49" charset="0"/>
+              </a:rPr>
+              <a:t> * </a:t>
+            </a:r>
+            <a:r>
+              <a:rPr lang="en-US" sz="2000" dirty="0" err="1">
+                <a:solidFill>
+                  <a:srgbClr val="4EC9B0"/>
+                </a:solidFill>
+                <a:highlight>
+                  <a:srgbClr val="FFFFFF"/>
+                </a:highlight>
+                <a:latin typeface="Consolas" panose="020B0609020204030204" pitchFamily="49" charset="0"/>
+              </a:rPr>
+              <a:t>ParserError</a:t>
+            </a:r>
+            <a:r>
+              <a:rPr lang="en-US" sz="2000" dirty="0">
+                <a:solidFill>
+                  <a:srgbClr val="000000"/>
+                </a:solidFill>
+                <a:highlight>
+                  <a:srgbClr val="FFFFFF"/>
+                </a:highlight>
+                <a:latin typeface="Consolas" panose="020B0609020204030204" pitchFamily="49" charset="0"/>
+              </a:rPr>
+              <a:t> * </a:t>
+            </a:r>
+            <a:r>
+              <a:rPr lang="en-US" sz="2000" dirty="0" smtClean="0">
+                <a:solidFill>
+                  <a:srgbClr val="000000"/>
+                </a:solidFill>
+                <a:highlight>
+                  <a:srgbClr val="FFFFFF"/>
+                </a:highlight>
+                <a:latin typeface="Consolas" panose="020B0609020204030204" pitchFamily="49" charset="0"/>
+              </a:rPr>
+              <a:t>'</a:t>
+            </a:r>
+            <a:r>
+              <a:rPr lang="en-US" sz="2000" dirty="0" err="1" smtClean="0">
+                <a:solidFill>
+                  <a:srgbClr val="000000"/>
+                </a:solidFill>
+                <a:highlight>
+                  <a:srgbClr val="FFFFFF"/>
+                </a:highlight>
+                <a:latin typeface="Consolas" panose="020B0609020204030204" pitchFamily="49" charset="0"/>
+              </a:rPr>
+              <a:t>UserState</a:t>
+            </a:r>
+            <a:endParaRPr lang="en-US" sz="2000" dirty="0" smtClean="0">
+              <a:solidFill>
+                <a:srgbClr val="000000"/>
+              </a:solidFill>
+              <a:highlight>
+                <a:srgbClr val="FFFFFF"/>
+              </a:highlight>
+              <a:latin typeface="Consolas" panose="020B0609020204030204" pitchFamily="49" charset="0"/>
+            </a:endParaRPr>
+          </a:p>
+          <a:p>
+            <a:pPr marL="0" indent="0">
+              <a:buNone/>
+            </a:pPr>
+            <a:endParaRPr lang="en-US" sz="2000" dirty="0">
+              <a:solidFill>
+                <a:srgbClr val="000000"/>
+              </a:solidFill>
+              <a:highlight>
+                <a:srgbClr val="FFFFFF"/>
+              </a:highlight>
+              <a:latin typeface="Consolas" panose="020B0609020204030204" pitchFamily="49" charset="0"/>
+            </a:endParaRPr>
+          </a:p>
+          <a:p>
+            <a:pPr marL="0" indent="0">
+              <a:buNone/>
+            </a:pPr>
+            <a:r>
+              <a:rPr lang="en-US" sz="2000" dirty="0">
+                <a:solidFill>
+                  <a:srgbClr val="0000FF"/>
+                </a:solidFill>
+                <a:highlight>
+                  <a:srgbClr val="FFFFFF"/>
+                </a:highlight>
+                <a:latin typeface="Consolas" panose="020B0609020204030204" pitchFamily="49" charset="0"/>
+              </a:rPr>
+              <a:t>let</a:t>
+            </a:r>
+            <a:r>
+              <a:rPr lang="en-US" sz="2000" dirty="0">
+                <a:solidFill>
+                  <a:srgbClr val="000000"/>
+                </a:solidFill>
+                <a:highlight>
+                  <a:srgbClr val="FFFFFF"/>
+                </a:highlight>
+                <a:latin typeface="Consolas" panose="020B0609020204030204" pitchFamily="49" charset="0"/>
+              </a:rPr>
+              <a:t> </a:t>
+            </a:r>
+            <a:r>
+              <a:rPr lang="en-US" sz="2000" dirty="0">
+                <a:highlight>
+                  <a:srgbClr val="FFFFFF"/>
+                </a:highlight>
+                <a:latin typeface="Consolas" panose="020B0609020204030204" pitchFamily="49" charset="0"/>
+              </a:rPr>
+              <a:t>run p</a:t>
+            </a:r>
+            <a:r>
+              <a:rPr lang="en-US" sz="2000" dirty="0">
+                <a:solidFill>
+                  <a:srgbClr val="000000"/>
+                </a:solidFill>
+                <a:highlight>
+                  <a:srgbClr val="FFFFFF"/>
+                </a:highlight>
+                <a:latin typeface="Consolas" panose="020B0609020204030204" pitchFamily="49" charset="0"/>
+              </a:rPr>
+              <a:t> s </a:t>
+            </a:r>
+            <a:r>
+              <a:rPr lang="en-US" sz="2000" dirty="0">
+                <a:highlight>
+                  <a:srgbClr val="FFFFFF"/>
+                </a:highlight>
+                <a:latin typeface="Consolas" panose="020B0609020204030204" pitchFamily="49" charset="0"/>
+              </a:rPr>
+              <a:t>=</a:t>
+            </a:r>
+            <a:r>
+              <a:rPr lang="en-US" sz="2000" dirty="0">
+                <a:solidFill>
+                  <a:srgbClr val="000000"/>
+                </a:solidFill>
+                <a:highlight>
+                  <a:srgbClr val="FFFFFF"/>
+                </a:highlight>
+                <a:latin typeface="Consolas" panose="020B0609020204030204" pitchFamily="49" charset="0"/>
+              </a:rPr>
+              <a:t> </a:t>
+            </a:r>
+          </a:p>
+          <a:p>
+            <a:pPr marL="0" indent="0">
+              <a:buNone/>
+            </a:pPr>
+            <a:r>
+              <a:rPr lang="en-US" sz="2000" dirty="0">
+                <a:solidFill>
+                  <a:srgbClr val="000000"/>
+                </a:solidFill>
+                <a:highlight>
+                  <a:srgbClr val="FFFFFF"/>
+                </a:highlight>
+                <a:latin typeface="Consolas" panose="020B0609020204030204" pitchFamily="49" charset="0"/>
+              </a:rPr>
+              <a:t>    </a:t>
+            </a:r>
+            <a:r>
+              <a:rPr lang="en-US" sz="2000" dirty="0">
+                <a:solidFill>
+                  <a:srgbClr val="0000FF"/>
+                </a:solidFill>
+                <a:highlight>
+                  <a:srgbClr val="FFFFFF"/>
+                </a:highlight>
+                <a:latin typeface="Consolas" panose="020B0609020204030204" pitchFamily="49" charset="0"/>
+              </a:rPr>
+              <a:t>let</a:t>
+            </a:r>
+            <a:r>
+              <a:rPr lang="en-US" sz="2000" dirty="0">
+                <a:solidFill>
+                  <a:srgbClr val="000000"/>
+                </a:solidFill>
+                <a:highlight>
+                  <a:srgbClr val="FFFFFF"/>
+                </a:highlight>
+                <a:latin typeface="Consolas" panose="020B0609020204030204" pitchFamily="49" charset="0"/>
+              </a:rPr>
+              <a:t> unit </a:t>
+            </a:r>
+            <a:r>
+              <a:rPr lang="en-US" sz="2000" dirty="0">
+                <a:highlight>
+                  <a:srgbClr val="FFFFFF"/>
+                </a:highlight>
+                <a:latin typeface="Consolas" panose="020B0609020204030204" pitchFamily="49" charset="0"/>
+              </a:rPr>
+              <a:t>=</a:t>
+            </a:r>
+            <a:r>
+              <a:rPr lang="en-US" sz="2000" dirty="0">
+                <a:solidFill>
+                  <a:srgbClr val="000000"/>
+                </a:solidFill>
+                <a:highlight>
+                  <a:srgbClr val="FFFFFF"/>
+                </a:highlight>
+                <a:latin typeface="Consolas" panose="020B0609020204030204" pitchFamily="49" charset="0"/>
+              </a:rPr>
+              <a:t> ()</a:t>
+            </a:r>
+          </a:p>
+          <a:p>
+            <a:pPr marL="0" indent="0">
+              <a:buNone/>
+            </a:pPr>
+            <a:r>
+              <a:rPr lang="en-US" sz="2000" dirty="0">
+                <a:solidFill>
+                  <a:srgbClr val="000000"/>
+                </a:solidFill>
+                <a:highlight>
+                  <a:srgbClr val="FFFFFF"/>
+                </a:highlight>
+                <a:latin typeface="Consolas" panose="020B0609020204030204" pitchFamily="49" charset="0"/>
+              </a:rPr>
+              <a:t>    </a:t>
+            </a:r>
+            <a:r>
+              <a:rPr lang="en-US" sz="2000" dirty="0">
+                <a:solidFill>
+                  <a:srgbClr val="0000FF"/>
+                </a:solidFill>
+                <a:highlight>
+                  <a:srgbClr val="FFFFFF"/>
+                </a:highlight>
+                <a:latin typeface="Consolas" panose="020B0609020204030204" pitchFamily="49" charset="0"/>
+              </a:rPr>
+              <a:t>let</a:t>
+            </a:r>
+            <a:r>
+              <a:rPr lang="en-US" sz="2000" dirty="0">
+                <a:solidFill>
+                  <a:srgbClr val="000000"/>
+                </a:solidFill>
+                <a:highlight>
+                  <a:srgbClr val="FFFFFF"/>
+                </a:highlight>
+                <a:latin typeface="Consolas" panose="020B0609020204030204" pitchFamily="49" charset="0"/>
+              </a:rPr>
+              <a:t> result </a:t>
+            </a:r>
+            <a:r>
+              <a:rPr lang="en-US" sz="2000" dirty="0">
+                <a:highlight>
+                  <a:srgbClr val="FFFFFF"/>
+                </a:highlight>
+                <a:latin typeface="Consolas" panose="020B0609020204030204" pitchFamily="49" charset="0"/>
+              </a:rPr>
+              <a:t>= </a:t>
+            </a:r>
+            <a:r>
+              <a:rPr lang="en-US" sz="2000" dirty="0" err="1">
+                <a:highlight>
+                  <a:srgbClr val="FFFFFF"/>
+                </a:highlight>
+                <a:latin typeface="Consolas" panose="020B0609020204030204" pitchFamily="49" charset="0"/>
+              </a:rPr>
+              <a:t>runParserOnString</a:t>
+            </a:r>
+            <a:r>
+              <a:rPr lang="en-US" sz="2000" dirty="0">
+                <a:highlight>
+                  <a:srgbClr val="FFFFFF"/>
+                </a:highlight>
+                <a:latin typeface="Consolas" panose="020B0609020204030204" pitchFamily="49" charset="0"/>
+              </a:rPr>
+              <a:t> p </a:t>
+            </a:r>
+            <a:r>
+              <a:rPr lang="en-US" sz="2000" dirty="0">
+                <a:solidFill>
+                  <a:srgbClr val="000000"/>
+                </a:solidFill>
+                <a:highlight>
+                  <a:srgbClr val="FFFFFF"/>
+                </a:highlight>
+                <a:latin typeface="Consolas" panose="020B0609020204030204" pitchFamily="49" charset="0"/>
+              </a:rPr>
+              <a:t>unit </a:t>
+            </a:r>
+            <a:r>
+              <a:rPr lang="en-US" sz="2000" dirty="0">
+                <a:solidFill>
+                  <a:srgbClr val="A31515"/>
+                </a:solidFill>
+                <a:highlight>
+                  <a:srgbClr val="FFFFFF"/>
+                </a:highlight>
+                <a:latin typeface="Consolas" panose="020B0609020204030204" pitchFamily="49" charset="0"/>
+              </a:rPr>
+              <a:t>""</a:t>
+            </a:r>
+            <a:r>
+              <a:rPr lang="en-US" sz="2000" dirty="0">
+                <a:solidFill>
+                  <a:srgbClr val="000000"/>
+                </a:solidFill>
+                <a:highlight>
+                  <a:srgbClr val="FFFFFF"/>
+                </a:highlight>
+                <a:latin typeface="Consolas" panose="020B0609020204030204" pitchFamily="49" charset="0"/>
+              </a:rPr>
+              <a:t> s</a:t>
+            </a:r>
+          </a:p>
+          <a:p>
+            <a:pPr marL="0" indent="0">
+              <a:buNone/>
+            </a:pPr>
+            <a:r>
+              <a:rPr lang="en-US" sz="2000" dirty="0">
+                <a:solidFill>
+                  <a:srgbClr val="000000"/>
+                </a:solidFill>
+                <a:highlight>
+                  <a:srgbClr val="FFFFFF"/>
+                </a:highlight>
+                <a:latin typeface="Consolas" panose="020B0609020204030204" pitchFamily="49" charset="0"/>
+              </a:rPr>
+              <a:t>    </a:t>
+            </a:r>
+            <a:r>
+              <a:rPr lang="en-US" sz="2000" dirty="0">
+                <a:solidFill>
+                  <a:srgbClr val="0000FF"/>
+                </a:solidFill>
+                <a:highlight>
+                  <a:srgbClr val="FFFFFF"/>
+                </a:highlight>
+                <a:latin typeface="Consolas" panose="020B0609020204030204" pitchFamily="49" charset="0"/>
+              </a:rPr>
+              <a:t>match</a:t>
+            </a:r>
+            <a:r>
+              <a:rPr lang="en-US" sz="2000" dirty="0">
+                <a:solidFill>
+                  <a:srgbClr val="000000"/>
+                </a:solidFill>
+                <a:highlight>
+                  <a:srgbClr val="FFFFFF"/>
+                </a:highlight>
+                <a:latin typeface="Consolas" panose="020B0609020204030204" pitchFamily="49" charset="0"/>
+              </a:rPr>
+              <a:t> result </a:t>
+            </a:r>
+            <a:r>
+              <a:rPr lang="en-US" sz="2000" dirty="0">
+                <a:solidFill>
+                  <a:srgbClr val="0000FF"/>
+                </a:solidFill>
+                <a:highlight>
+                  <a:srgbClr val="FFFFFF"/>
+                </a:highlight>
+                <a:latin typeface="Consolas" panose="020B0609020204030204" pitchFamily="49" charset="0"/>
+              </a:rPr>
+              <a:t>with</a:t>
+            </a:r>
+            <a:endParaRPr lang="en-US" sz="2000" dirty="0">
+              <a:solidFill>
+                <a:srgbClr val="000000"/>
+              </a:solidFill>
+              <a:highlight>
+                <a:srgbClr val="FFFFFF"/>
+              </a:highlight>
+              <a:latin typeface="Consolas" panose="020B0609020204030204" pitchFamily="49" charset="0"/>
+            </a:endParaRPr>
+          </a:p>
+          <a:p>
+            <a:pPr marL="0" indent="0">
+              <a:buNone/>
+            </a:pPr>
+            <a:r>
+              <a:rPr lang="en-US" sz="2000" dirty="0">
+                <a:solidFill>
+                  <a:srgbClr val="000000"/>
+                </a:solidFill>
+                <a:highlight>
+                  <a:srgbClr val="FFFFFF"/>
+                </a:highlight>
+                <a:latin typeface="Consolas" panose="020B0609020204030204" pitchFamily="49" charset="0"/>
+              </a:rPr>
+              <a:t>    | </a:t>
+            </a:r>
+            <a:r>
+              <a:rPr lang="en-US" sz="2000" dirty="0">
+                <a:highlight>
+                  <a:srgbClr val="FFFFFF"/>
+                </a:highlight>
+                <a:latin typeface="Consolas" panose="020B0609020204030204" pitchFamily="49" charset="0"/>
+              </a:rPr>
+              <a:t>Success(result</a:t>
+            </a:r>
+            <a:r>
+              <a:rPr lang="en-US" sz="2000" dirty="0">
+                <a:solidFill>
+                  <a:srgbClr val="000000"/>
+                </a:solidFill>
+                <a:highlight>
+                  <a:srgbClr val="FFFFFF"/>
+                </a:highlight>
+                <a:latin typeface="Consolas" panose="020B0609020204030204" pitchFamily="49" charset="0"/>
+              </a:rPr>
+              <a:t>, _, _) </a:t>
+            </a:r>
+            <a:r>
+              <a:rPr lang="en-US" sz="2000" dirty="0">
+                <a:solidFill>
+                  <a:srgbClr val="0000FF"/>
+                </a:solidFill>
+                <a:highlight>
+                  <a:srgbClr val="FFFFFF"/>
+                </a:highlight>
+                <a:latin typeface="Consolas" panose="020B0609020204030204" pitchFamily="49" charset="0"/>
+              </a:rPr>
+              <a:t>-&gt;</a:t>
+            </a:r>
+            <a:r>
+              <a:rPr lang="en-US" sz="2000" dirty="0">
+                <a:solidFill>
+                  <a:srgbClr val="000000"/>
+                </a:solidFill>
+                <a:highlight>
+                  <a:srgbClr val="FFFFFF"/>
+                </a:highlight>
+                <a:latin typeface="Consolas" panose="020B0609020204030204" pitchFamily="49" charset="0"/>
+              </a:rPr>
+              <a:t> result</a:t>
+            </a:r>
+          </a:p>
+          <a:p>
+            <a:pPr marL="0" indent="0">
+              <a:buNone/>
+            </a:pPr>
+            <a:r>
+              <a:rPr lang="en-US" sz="2000" dirty="0">
+                <a:solidFill>
+                  <a:srgbClr val="000000"/>
+                </a:solidFill>
+                <a:highlight>
+                  <a:srgbClr val="FFFFFF"/>
+                </a:highlight>
+                <a:latin typeface="Consolas" panose="020B0609020204030204" pitchFamily="49" charset="0"/>
+              </a:rPr>
+              <a:t>    | </a:t>
+            </a:r>
+            <a:r>
+              <a:rPr lang="en-US" sz="2000" dirty="0">
+                <a:highlight>
+                  <a:srgbClr val="FFFFFF"/>
+                </a:highlight>
+                <a:latin typeface="Consolas" panose="020B0609020204030204" pitchFamily="49" charset="0"/>
+              </a:rPr>
+              <a:t>Failure(</a:t>
+            </a:r>
+            <a:r>
+              <a:rPr lang="en-US" sz="2000" dirty="0" err="1">
+                <a:highlight>
+                  <a:srgbClr val="FFFFFF"/>
+                </a:highlight>
+                <a:latin typeface="Consolas" panose="020B0609020204030204" pitchFamily="49" charset="0"/>
+              </a:rPr>
+              <a:t>errorMessage</a:t>
+            </a:r>
+            <a:r>
+              <a:rPr lang="en-US" sz="2000" dirty="0">
+                <a:solidFill>
+                  <a:srgbClr val="000000"/>
+                </a:solidFill>
+                <a:highlight>
+                  <a:srgbClr val="FFFFFF"/>
+                </a:highlight>
+                <a:latin typeface="Consolas" panose="020B0609020204030204" pitchFamily="49" charset="0"/>
+              </a:rPr>
+              <a:t>, _, _) </a:t>
+            </a:r>
+            <a:r>
+              <a:rPr lang="en-US" sz="2000" dirty="0">
+                <a:solidFill>
+                  <a:srgbClr val="0000FF"/>
+                </a:solidFill>
+                <a:highlight>
+                  <a:srgbClr val="FFFFFF"/>
+                </a:highlight>
+                <a:latin typeface="Consolas" panose="020B0609020204030204" pitchFamily="49" charset="0"/>
+              </a:rPr>
+              <a:t>-&gt;</a:t>
+            </a:r>
+            <a:r>
+              <a:rPr lang="en-US" sz="2000" dirty="0">
+                <a:solidFill>
+                  <a:srgbClr val="000000"/>
+                </a:solidFill>
+                <a:highlight>
+                  <a:srgbClr val="FFFFFF"/>
+                </a:highlight>
+                <a:latin typeface="Consolas" panose="020B0609020204030204" pitchFamily="49" charset="0"/>
+              </a:rPr>
+              <a:t> </a:t>
+            </a:r>
+            <a:r>
+              <a:rPr lang="en-US" sz="2000" dirty="0" err="1">
+                <a:highlight>
+                  <a:srgbClr val="FFFFFF"/>
+                </a:highlight>
+                <a:latin typeface="Consolas" panose="020B0609020204030204" pitchFamily="49" charset="0"/>
+              </a:rPr>
+              <a:t>failwith</a:t>
+            </a:r>
+            <a:r>
+              <a:rPr lang="en-US" sz="2000" dirty="0">
+                <a:highlight>
+                  <a:srgbClr val="FFFFFF"/>
+                </a:highlight>
+                <a:latin typeface="Consolas" panose="020B0609020204030204" pitchFamily="49" charset="0"/>
+              </a:rPr>
+              <a:t> </a:t>
+            </a:r>
+            <a:r>
+              <a:rPr lang="en-US" sz="2000" dirty="0" err="1">
+                <a:solidFill>
+                  <a:srgbClr val="000000"/>
+                </a:solidFill>
+                <a:highlight>
+                  <a:srgbClr val="FFFFFF"/>
+                </a:highlight>
+                <a:latin typeface="Consolas" panose="020B0609020204030204" pitchFamily="49" charset="0"/>
+              </a:rPr>
+              <a:t>errorMessage</a:t>
+            </a:r>
+            <a:endParaRPr lang="en-US" sz="2000" dirty="0"/>
+          </a:p>
+        </p:txBody>
+      </p:sp>
+    </p:spTree>
+    <p:extLst>
+      <p:ext uri="{BB962C8B-B14F-4D97-AF65-F5344CB8AC3E}">
+        <p14:creationId xmlns:p14="http://schemas.microsoft.com/office/powerpoint/2010/main" val="3314648361"/>
+      </p:ext>
+    </p:extLst>
+  </p:cSld>
+  <p:clrMapOvr>
+    <a:masterClrMapping/>
+  </p:clrMapOvr>
+</p:sld>
+</file>
+
+<file path=ppt/slides/slide9.xml><?xml version="1.0" encoding="utf-8"?>
 <p:sld xmlns:a="http://schemas.openxmlformats.org/drawingml/2006/main" xmlns:r="http://schemas.openxmlformats.org/officeDocument/2006/relationships" xmlns:p="http://schemas.openxmlformats.org/presentationml/2006/main">
   <p:cSld>
     <p:spTree>
@@ -6579,78 +7989,6 @@
     <p:extLst>
       <p:ext uri="{BB962C8B-B14F-4D97-AF65-F5344CB8AC3E}">
         <p14:creationId xmlns:p14="http://schemas.microsoft.com/office/powerpoint/2010/main" val="188970137"/>
-      </p:ext>
-    </p:extLst>
-  </p:cSld>
-  <p:clrMapOvr>
-    <a:masterClrMapping/>
-  </p:clrMapOvr>
-</p:sld>
-</file>
-
-<file path=ppt/slides/slide9.xml><?xml version="1.0" encoding="utf-8"?>
-<p:sld xmlns:a="http://schemas.openxmlformats.org/drawingml/2006/main" xmlns:r="http://schemas.openxmlformats.org/officeDocument/2006/relationships" xmlns:p="http://schemas.openxmlformats.org/presentationml/2006/main">
-  <p:cSld>
-    <p:spTree>
-      <p:nvGrpSpPr>
-        <p:cNvPr id="1" name=""/>
-        <p:cNvGrpSpPr/>
-        <p:nvPr/>
-      </p:nvGrpSpPr>
-      <p:grpSpPr>
-        <a:xfrm>
-          <a:off x="0" y="0"/>
-          <a:ext cx="0" cy="0"/>
-          <a:chOff x="0" y="0"/>
-          <a:chExt cx="0" cy="0"/>
-        </a:xfrm>
-      </p:grpSpPr>
-      <p:sp>
-        <p:nvSpPr>
-          <p:cNvPr id="2" name="Title 1"/>
-          <p:cNvSpPr>
-            <a:spLocks noGrp="1"/>
-          </p:cNvSpPr>
-          <p:nvPr>
-            <p:ph type="title"/>
-          </p:nvPr>
-        </p:nvSpPr>
-        <p:spPr/>
-        <p:txBody>
-          <a:bodyPr/>
-          <a:lstStyle/>
-          <a:p>
-            <a:r>
-              <a:rPr lang="en-US" dirty="0" smtClean="0"/>
-              <a:t>Chaining: examples	</a:t>
-            </a:r>
-            <a:endParaRPr lang="en-US" dirty="0"/>
-          </a:p>
-        </p:txBody>
-      </p:sp>
-      <p:sp>
-        <p:nvSpPr>
-          <p:cNvPr id="3" name="Content Placeholder 2"/>
-          <p:cNvSpPr>
-            <a:spLocks noGrp="1"/>
-          </p:cNvSpPr>
-          <p:nvPr>
-            <p:ph idx="1"/>
-          </p:nvPr>
-        </p:nvSpPr>
-        <p:spPr/>
-        <p:txBody>
-          <a:bodyPr/>
-          <a:lstStyle/>
-          <a:p>
-            <a:endParaRPr lang="en-US" dirty="0"/>
-          </a:p>
-        </p:txBody>
-      </p:sp>
-    </p:spTree>
-    <p:extLst>
-      <p:ext uri="{BB962C8B-B14F-4D97-AF65-F5344CB8AC3E}">
-        <p14:creationId xmlns:p14="http://schemas.microsoft.com/office/powerpoint/2010/main" val="4112961380"/>
       </p:ext>
     </p:extLst>
   </p:cSld>

</xml_diff>

<commit_message>
Fixed some mistakes in backtracing code and slides
</commit_message>
<xml_diff>
--- a/Slides/Practical FParsec V2.pptx
+++ b/Slides/Practical FParsec V2.pptx
@@ -220,7 +220,7 @@
           <a:p>
             <a:fld id="{28E553DE-D44A-40CE-992A-E98A6768F984}" type="datetimeFigureOut">
               <a:rPr lang="en-US" smtClean="0"/>
-              <a:t>10/21/2015</a:t>
+              <a:t>10/23/2015</a:t>
             </a:fld>
             <a:endParaRPr lang="en-US"/>
           </a:p>
@@ -711,7 +711,7 @@
           <a:p>
             <a:fld id="{D7E847A7-D0D1-4648-B033-5D0415D93F24}" type="datetimeFigureOut">
               <a:rPr lang="en-US" smtClean="0"/>
-              <a:t>10/21/2015</a:t>
+              <a:t>10/23/2015</a:t>
             </a:fld>
             <a:endParaRPr lang="en-US"/>
           </a:p>
@@ -881,7 +881,7 @@
           <a:p>
             <a:fld id="{D7E847A7-D0D1-4648-B033-5D0415D93F24}" type="datetimeFigureOut">
               <a:rPr lang="en-US" smtClean="0"/>
-              <a:t>10/21/2015</a:t>
+              <a:t>10/23/2015</a:t>
             </a:fld>
             <a:endParaRPr lang="en-US"/>
           </a:p>
@@ -1061,7 +1061,7 @@
           <a:p>
             <a:fld id="{D7E847A7-D0D1-4648-B033-5D0415D93F24}" type="datetimeFigureOut">
               <a:rPr lang="en-US" smtClean="0"/>
-              <a:t>10/21/2015</a:t>
+              <a:t>10/23/2015</a:t>
             </a:fld>
             <a:endParaRPr lang="en-US"/>
           </a:p>
@@ -1231,7 +1231,7 @@
           <a:p>
             <a:fld id="{D7E847A7-D0D1-4648-B033-5D0415D93F24}" type="datetimeFigureOut">
               <a:rPr lang="en-US" smtClean="0"/>
-              <a:t>10/21/2015</a:t>
+              <a:t>10/23/2015</a:t>
             </a:fld>
             <a:endParaRPr lang="en-US"/>
           </a:p>
@@ -1477,7 +1477,7 @@
           <a:p>
             <a:fld id="{D7E847A7-D0D1-4648-B033-5D0415D93F24}" type="datetimeFigureOut">
               <a:rPr lang="en-US" smtClean="0"/>
-              <a:t>10/21/2015</a:t>
+              <a:t>10/23/2015</a:t>
             </a:fld>
             <a:endParaRPr lang="en-US"/>
           </a:p>
@@ -1709,7 +1709,7 @@
           <a:p>
             <a:fld id="{D7E847A7-D0D1-4648-B033-5D0415D93F24}" type="datetimeFigureOut">
               <a:rPr lang="en-US" smtClean="0"/>
-              <a:t>10/21/2015</a:t>
+              <a:t>10/23/2015</a:t>
             </a:fld>
             <a:endParaRPr lang="en-US"/>
           </a:p>
@@ -2076,7 +2076,7 @@
           <a:p>
             <a:fld id="{D7E847A7-D0D1-4648-B033-5D0415D93F24}" type="datetimeFigureOut">
               <a:rPr lang="en-US" smtClean="0"/>
-              <a:t>10/21/2015</a:t>
+              <a:t>10/23/2015</a:t>
             </a:fld>
             <a:endParaRPr lang="en-US"/>
           </a:p>
@@ -2194,7 +2194,7 @@
           <a:p>
             <a:fld id="{D7E847A7-D0D1-4648-B033-5D0415D93F24}" type="datetimeFigureOut">
               <a:rPr lang="en-US" smtClean="0"/>
-              <a:t>10/21/2015</a:t>
+              <a:t>10/23/2015</a:t>
             </a:fld>
             <a:endParaRPr lang="en-US"/>
           </a:p>
@@ -2289,7 +2289,7 @@
           <a:p>
             <a:fld id="{D7E847A7-D0D1-4648-B033-5D0415D93F24}" type="datetimeFigureOut">
               <a:rPr lang="en-US" smtClean="0"/>
-              <a:t>10/21/2015</a:t>
+              <a:t>10/23/2015</a:t>
             </a:fld>
             <a:endParaRPr lang="en-US"/>
           </a:p>
@@ -2566,7 +2566,7 @@
           <a:p>
             <a:fld id="{D7E847A7-D0D1-4648-B033-5D0415D93F24}" type="datetimeFigureOut">
               <a:rPr lang="en-US" smtClean="0"/>
-              <a:t>10/21/2015</a:t>
+              <a:t>10/23/2015</a:t>
             </a:fld>
             <a:endParaRPr lang="en-US"/>
           </a:p>
@@ -2819,7 +2819,7 @@
           <a:p>
             <a:fld id="{D7E847A7-D0D1-4648-B033-5D0415D93F24}" type="datetimeFigureOut">
               <a:rPr lang="en-US" smtClean="0"/>
-              <a:t>10/21/2015</a:t>
+              <a:t>10/23/2015</a:t>
             </a:fld>
             <a:endParaRPr lang="en-US"/>
           </a:p>
@@ -3032,7 +3032,7 @@
           <a:p>
             <a:fld id="{D7E847A7-D0D1-4648-B033-5D0415D93F24}" type="datetimeFigureOut">
               <a:rPr lang="en-US" smtClean="0"/>
-              <a:t>10/21/2015</a:t>
+              <a:t>10/23/2015</a:t>
             </a:fld>
             <a:endParaRPr lang="en-US"/>
           </a:p>
@@ -6371,13 +6371,34 @@
               <a:t>    </a:t>
             </a:r>
             <a:r>
+              <a:rPr lang="en-US" dirty="0" smtClean="0">
+                <a:solidFill>
+                  <a:srgbClr val="000000"/>
+                </a:solidFill>
+                <a:highlight>
+                  <a:srgbClr val="FFFFFF"/>
+                </a:highlight>
+                <a:latin typeface="Consolas" panose="020B0609020204030204" pitchFamily="49" charset="0"/>
+              </a:rPr>
+              <a:t>(attempt </a:t>
+            </a:r>
+            <a:r>
+              <a:rPr lang="en-US" dirty="0" smtClean="0">
+                <a:highlight>
+                  <a:srgbClr val="FFFFFF"/>
+                </a:highlight>
+                <a:latin typeface="Consolas" panose="020B0609020204030204" pitchFamily="49" charset="0"/>
+              </a:rPr>
+              <a:t>p1) </a:t>
+            </a:r>
+            <a:r>
               <a:rPr lang="en-US" dirty="0">
                 <a:highlight>
                   <a:srgbClr val="FFFFFF"/>
                 </a:highlight>
                 <a:latin typeface="Consolas" panose="020B0609020204030204" pitchFamily="49" charset="0"/>
               </a:rPr>
-              <a:t>p1 &lt;|&gt; (attempt p2</a:t>
+              <a:t>&lt;|&gt; </a:t>
             </a:r>
             <a:r>
               <a:rPr lang="en-US" dirty="0" smtClean="0">
@@ -6386,8 +6407,14 @@
                 </a:highlight>
                 <a:latin typeface="Consolas" panose="020B0609020204030204" pitchFamily="49" charset="0"/>
               </a:rPr>
-              <a:t>)</a:t>
-            </a:r>
+              <a:t>p2</a:t>
+            </a:r>
+            <a:endParaRPr lang="en-US" dirty="0" smtClean="0">
+              <a:highlight>
+                <a:srgbClr val="FFFFFF"/>
+              </a:highlight>
+              <a:latin typeface="Consolas" panose="020B0609020204030204" pitchFamily="49" charset="0"/>
+            </a:endParaRPr>
           </a:p>
           <a:p>
             <a:pPr marL="0" indent="0">
@@ -6647,16 +6674,25 @@
               <a:t> </a:t>
             </a:r>
             <a:r>
-              <a:rPr lang="en-US" sz="2200" dirty="0" err="1">
-                <a:highlight>
-                  <a:srgbClr val="FFFFFF"/>
-                </a:highlight>
-                <a:latin typeface="Consolas" panose="020B0609020204030204" pitchFamily="49" charset="0"/>
-              </a:rPr>
-              <a:t>pMonthAndDay:</a:t>
-            </a:r>
-            <a:r>
-              <a:rPr lang="en-US" sz="2200" dirty="0" err="1">
+              <a:rPr lang="en-US" sz="2000" smtClean="0">
+                <a:highlight>
+                  <a:srgbClr val="FFFFFF"/>
+                </a:highlight>
+                <a:latin typeface="Consolas" panose="020B0609020204030204" pitchFamily="49" charset="0"/>
+              </a:rPr>
+              <a:t>pDayAndMonth</a:t>
+            </a:r>
+            <a:r>
+              <a:rPr lang="en-US" sz="2200" smtClean="0">
+                <a:highlight>
+                  <a:srgbClr val="FFFFFF"/>
+                </a:highlight>
+                <a:latin typeface="Consolas" panose="020B0609020204030204" pitchFamily="49" charset="0"/>
+              </a:rPr>
+              <a:t>:</a:t>
+            </a:r>
+            <a:r>
+              <a:rPr lang="en-US" sz="2200" smtClean="0">
                 <a:solidFill>
                   <a:srgbClr val="4EC9B0"/>
                 </a:solidFill>
@@ -6668,7 +6704,7 @@
               <a:t>P</a:t>
             </a:r>
             <a:r>
-              <a:rPr lang="en-US" sz="2200" dirty="0">
+              <a:rPr lang="en-US" sz="2200" dirty="0" smtClean="0">
                 <a:solidFill>
                   <a:srgbClr val="000000"/>
                 </a:solidFill>
@@ -6718,22 +6754,91 @@
               <a:t>    </a:t>
             </a:r>
             <a:r>
+              <a:rPr lang="en-US" sz="2400" dirty="0">
+                <a:solidFill>
+                  <a:srgbClr val="0000FF"/>
+                </a:solidFill>
+                <a:highlight>
+                  <a:srgbClr val="FFFFFF"/>
+                </a:highlight>
+                <a:latin typeface="Consolas" panose="020B0609020204030204" pitchFamily="49" charset="0"/>
+              </a:rPr>
+              <a:t>let</a:t>
+            </a:r>
+            <a:r>
+              <a:rPr lang="en-US" sz="2400" dirty="0">
+                <a:solidFill>
+                  <a:srgbClr val="000000"/>
+                </a:solidFill>
+                <a:highlight>
+                  <a:srgbClr val="FFFFFF"/>
+                </a:highlight>
+                <a:latin typeface="Consolas" panose="020B0609020204030204" pitchFamily="49" charset="0"/>
+              </a:rPr>
+              <a:t> </a:t>
+            </a:r>
+            <a:r>
+              <a:rPr lang="en-US" sz="2400" dirty="0">
+                <a:highlight>
+                  <a:srgbClr val="FFFFFF"/>
+                </a:highlight>
+                <a:latin typeface="Consolas" panose="020B0609020204030204" pitchFamily="49" charset="0"/>
+              </a:rPr>
+              <a:t>md </a:t>
+            </a:r>
+            <a:r>
+              <a:rPr lang="en-US" sz="2400" dirty="0" err="1">
+                <a:solidFill>
+                  <a:srgbClr val="000000"/>
+                </a:solidFill>
+                <a:highlight>
+                  <a:srgbClr val="FFFFFF"/>
+                </a:highlight>
+                <a:latin typeface="Consolas" panose="020B0609020204030204" pitchFamily="49" charset="0"/>
+              </a:rPr>
+              <a:t>monthname</a:t>
+            </a:r>
+            <a:r>
+              <a:rPr lang="en-US" sz="2400" dirty="0">
+                <a:solidFill>
+                  <a:srgbClr val="000000"/>
+                </a:solidFill>
+                <a:highlight>
+                  <a:srgbClr val="FFFFFF"/>
+                </a:highlight>
+                <a:latin typeface="Consolas" panose="020B0609020204030204" pitchFamily="49" charset="0"/>
+              </a:rPr>
+              <a:t> </a:t>
+            </a:r>
+            <a:r>
+              <a:rPr lang="en-US" sz="2200" dirty="0" smtClean="0">
+                <a:highlight>
+                  <a:srgbClr val="FFFFFF"/>
+                </a:highlight>
+                <a:latin typeface="Consolas" panose="020B0609020204030204" pitchFamily="49" charset="0"/>
+              </a:rPr>
+              <a:t>= pint8 </a:t>
+            </a:r>
+            <a:r>
               <a:rPr lang="en-US" sz="2200" dirty="0">
-                <a:solidFill>
-                  <a:srgbClr val="0000FF"/>
-                </a:solidFill>
-                <a:highlight>
-                  <a:srgbClr val="FFFFFF"/>
-                </a:highlight>
-                <a:latin typeface="Consolas" panose="020B0609020204030204" pitchFamily="49" charset="0"/>
-              </a:rPr>
-              <a:t>let</a:t>
+                <a:highlight>
+                  <a:srgbClr val="FFFFFF"/>
+                </a:highlight>
+                <a:latin typeface="Consolas" panose="020B0609020204030204" pitchFamily="49" charset="0"/>
+              </a:rPr>
+              <a:t>.&gt;&gt;. (spaces &gt;&gt;. </a:t>
+            </a:r>
+            <a:r>
+              <a:rPr lang="en-US" sz="2200" dirty="0" err="1">
+                <a:highlight>
+                  <a:srgbClr val="FFFFFF"/>
+                </a:highlight>
+                <a:latin typeface="Consolas" panose="020B0609020204030204" pitchFamily="49" charset="0"/>
+              </a:rPr>
+              <a:t>pstringCI</a:t>
             </a:r>
             <a:r>
               <a:rPr lang="en-US" sz="2200" dirty="0">
-                <a:solidFill>
-                  <a:srgbClr val="000000"/>
-                </a:solidFill>
                 <a:highlight>
                   <a:srgbClr val="FFFFFF"/>
                 </a:highlight>
@@ -6742,98 +6847,29 @@
               <a:t> </a:t>
             </a:r>
             <a:r>
+              <a:rPr lang="en-US" sz="2200" dirty="0" err="1">
+                <a:highlight>
+                  <a:srgbClr val="FFFFFF"/>
+                </a:highlight>
+                <a:latin typeface="Consolas" panose="020B0609020204030204" pitchFamily="49" charset="0"/>
+              </a:rPr>
+              <a:t>monthname</a:t>
+            </a:r>
+            <a:r>
               <a:rPr lang="en-US" sz="2200" dirty="0">
                 <a:highlight>
                   <a:srgbClr val="FFFFFF"/>
                 </a:highlight>
                 <a:latin typeface="Consolas" panose="020B0609020204030204" pitchFamily="49" charset="0"/>
               </a:rPr>
-              <a:t>md </a:t>
-            </a:r>
-            <a:r>
-              <a:rPr lang="en-US" sz="2200" dirty="0" err="1">
-                <a:solidFill>
-                  <a:srgbClr val="000000"/>
-                </a:solidFill>
-                <a:highlight>
-                  <a:srgbClr val="FFFFFF"/>
-                </a:highlight>
-                <a:latin typeface="Consolas" panose="020B0609020204030204" pitchFamily="49" charset="0"/>
-              </a:rPr>
-              <a:t>monthname</a:t>
-            </a:r>
-            <a:r>
-              <a:rPr lang="en-US" sz="2200" dirty="0">
-                <a:solidFill>
-                  <a:srgbClr val="000000"/>
-                </a:solidFill>
-                <a:highlight>
-                  <a:srgbClr val="FFFFFF"/>
-                </a:highlight>
-                <a:latin typeface="Consolas" panose="020B0609020204030204" pitchFamily="49" charset="0"/>
-              </a:rPr>
-              <a:t> </a:t>
-            </a:r>
-            <a:r>
-              <a:rPr lang="en-US" sz="2200" dirty="0">
-                <a:highlight>
-                  <a:srgbClr val="FFFFFF"/>
-                </a:highlight>
-                <a:latin typeface="Consolas" panose="020B0609020204030204" pitchFamily="49" charset="0"/>
-              </a:rPr>
-              <a:t>= </a:t>
-            </a:r>
-            <a:r>
-              <a:rPr lang="en-US" sz="2200" dirty="0" err="1">
-                <a:highlight>
-                  <a:srgbClr val="FFFFFF"/>
-                </a:highlight>
-                <a:latin typeface="Consolas" panose="020B0609020204030204" pitchFamily="49" charset="0"/>
-              </a:rPr>
-              <a:t>pstringCI</a:t>
-            </a:r>
-            <a:r>
-              <a:rPr lang="en-US" sz="2200" dirty="0">
-                <a:highlight>
-                  <a:srgbClr val="FFFFFF"/>
-                </a:highlight>
-                <a:latin typeface="Consolas" panose="020B0609020204030204" pitchFamily="49" charset="0"/>
-              </a:rPr>
-              <a:t> </a:t>
-            </a:r>
-            <a:r>
-              <a:rPr lang="en-US" sz="2200" dirty="0" err="1">
-                <a:solidFill>
-                  <a:srgbClr val="000000"/>
-                </a:solidFill>
-                <a:highlight>
-                  <a:srgbClr val="FFFFFF"/>
-                </a:highlight>
-                <a:latin typeface="Consolas" panose="020B0609020204030204" pitchFamily="49" charset="0"/>
-              </a:rPr>
-              <a:t>monthname</a:t>
-            </a:r>
-            <a:r>
-              <a:rPr lang="en-US" sz="2200" dirty="0">
-                <a:solidFill>
-                  <a:srgbClr val="000000"/>
-                </a:solidFill>
-                <a:highlight>
-                  <a:srgbClr val="FFFFFF"/>
-                </a:highlight>
-                <a:latin typeface="Consolas" panose="020B0609020204030204" pitchFamily="49" charset="0"/>
-              </a:rPr>
-              <a:t> </a:t>
-            </a:r>
-            <a:r>
-              <a:rPr lang="en-US" sz="2200" dirty="0">
-                <a:highlight>
-                  <a:srgbClr val="FFFFFF"/>
-                </a:highlight>
-                <a:latin typeface="Consolas" panose="020B0609020204030204" pitchFamily="49" charset="0"/>
-              </a:rPr>
-              <a:t>.&gt;&gt;. (spaces &gt;&gt;. pint8)</a:t>
-            </a:r>
+              <a:t>)</a:t>
+            </a:r>
+            <a:endParaRPr lang="en-US" sz="2200" dirty="0">
+              <a:highlight>
+                <a:srgbClr val="FFFFFF"/>
+              </a:highlight>
+              <a:latin typeface="Consolas" panose="020B0609020204030204" pitchFamily="49" charset="0"/>
+            </a:endParaRPr>
           </a:p>
           <a:p>
             <a:pPr marL="0" indent="0">
@@ -7345,7 +7381,7 @@
               <a:buNone/>
             </a:pPr>
             <a:r>
-              <a:rPr lang="en-US" sz="2200" dirty="0" smtClean="0">
+              <a:rPr lang="en-US" sz="2400" dirty="0">
                 <a:highlight>
                   <a:srgbClr val="FFFFFF"/>
                 </a:highlight>
@@ -7354,16 +7390,16 @@
               <a:t>run </a:t>
             </a:r>
             <a:r>
-              <a:rPr lang="en-US" sz="2200" dirty="0" err="1">
-                <a:highlight>
-                  <a:srgbClr val="FFFFFF"/>
-                </a:highlight>
-                <a:latin typeface="Consolas" panose="020B0609020204030204" pitchFamily="49" charset="0"/>
-              </a:rPr>
-              <a:t>pMonthAndDay</a:t>
-            </a:r>
-            <a:r>
-              <a:rPr lang="en-US" sz="2200" dirty="0">
+              <a:rPr lang="en-US" sz="2400" dirty="0" err="1">
+                <a:highlight>
+                  <a:srgbClr val="FFFFFF"/>
+                </a:highlight>
+                <a:latin typeface="Consolas" panose="020B0609020204030204" pitchFamily="49" charset="0"/>
+              </a:rPr>
+              <a:t>pDayAndMonth</a:t>
+            </a:r>
+            <a:r>
+              <a:rPr lang="en-US" sz="2400" dirty="0">
                 <a:highlight>
                   <a:srgbClr val="FFFFFF"/>
                 </a:highlight>
@@ -7372,7 +7408,7 @@
               <a:t> </a:t>
             </a:r>
             <a:r>
-              <a:rPr lang="en-US" sz="2200" dirty="0">
+              <a:rPr lang="en-US" sz="2400" dirty="0">
                 <a:solidFill>
                   <a:srgbClr val="A31515"/>
                 </a:solidFill>
@@ -7381,7 +7417,7 @@
                 </a:highlight>
                 <a:latin typeface="Consolas" panose="020B0609020204030204" pitchFamily="49" charset="0"/>
               </a:rPr>
-              <a:t>"Mar 21"</a:t>
+              <a:t>"21 march"</a:t>
             </a:r>
             <a:endParaRPr lang="en-US" sz="2200" dirty="0"/>
           </a:p>

</xml_diff>

<commit_message>
Simple expression parser BNF
</commit_message>
<xml_diff>
--- a/Slides/Practical FParsec V2.pptx
+++ b/Slides/Practical FParsec V2.pptx
@@ -5,7 +5,7 @@
     <p:sldMasterId id="2147483648" r:id="rId1"/>
   </p:sldMasterIdLst>
   <p:notesMasterIdLst>
-    <p:notesMasterId r:id="rId26"/>
+    <p:notesMasterId r:id="rId31"/>
   </p:notesMasterIdLst>
   <p:sldIdLst>
     <p:sldId id="256" r:id="rId2"/>
@@ -26,12 +26,17 @@
     <p:sldId id="284" r:id="rId17"/>
     <p:sldId id="285" r:id="rId18"/>
     <p:sldId id="275" r:id="rId19"/>
-    <p:sldId id="282" r:id="rId20"/>
-    <p:sldId id="276" r:id="rId21"/>
-    <p:sldId id="278" r:id="rId22"/>
-    <p:sldId id="277" r:id="rId23"/>
-    <p:sldId id="280" r:id="rId24"/>
-    <p:sldId id="281" r:id="rId25"/>
+    <p:sldId id="287" r:id="rId20"/>
+    <p:sldId id="286" r:id="rId21"/>
+    <p:sldId id="288" r:id="rId22"/>
+    <p:sldId id="289" r:id="rId23"/>
+    <p:sldId id="290" r:id="rId24"/>
+    <p:sldId id="282" r:id="rId25"/>
+    <p:sldId id="276" r:id="rId26"/>
+    <p:sldId id="278" r:id="rId27"/>
+    <p:sldId id="277" r:id="rId28"/>
+    <p:sldId id="280" r:id="rId29"/>
+    <p:sldId id="281" r:id="rId30"/>
   </p:sldIdLst>
   <p:sldSz cx="12192000" cy="6858000"/>
   <p:notesSz cx="6858000" cy="9144000"/>
@@ -220,7 +225,7 @@
           <a:p>
             <a:fld id="{28E553DE-D44A-40CE-992A-E98A6768F984}" type="datetimeFigureOut">
               <a:rPr lang="en-US" smtClean="0"/>
-              <a:t>10/23/2015</a:t>
+              <a:t>10/27/2015</a:t>
             </a:fld>
             <a:endParaRPr lang="en-US"/>
           </a:p>
@@ -711,7 +716,7 @@
           <a:p>
             <a:fld id="{D7E847A7-D0D1-4648-B033-5D0415D93F24}" type="datetimeFigureOut">
               <a:rPr lang="en-US" smtClean="0"/>
-              <a:t>10/23/2015</a:t>
+              <a:t>10/27/2015</a:t>
             </a:fld>
             <a:endParaRPr lang="en-US"/>
           </a:p>
@@ -881,7 +886,7 @@
           <a:p>
             <a:fld id="{D7E847A7-D0D1-4648-B033-5D0415D93F24}" type="datetimeFigureOut">
               <a:rPr lang="en-US" smtClean="0"/>
-              <a:t>10/23/2015</a:t>
+              <a:t>10/27/2015</a:t>
             </a:fld>
             <a:endParaRPr lang="en-US"/>
           </a:p>
@@ -1061,7 +1066,7 @@
           <a:p>
             <a:fld id="{D7E847A7-D0D1-4648-B033-5D0415D93F24}" type="datetimeFigureOut">
               <a:rPr lang="en-US" smtClean="0"/>
-              <a:t>10/23/2015</a:t>
+              <a:t>10/27/2015</a:t>
             </a:fld>
             <a:endParaRPr lang="en-US"/>
           </a:p>
@@ -1231,7 +1236,7 @@
           <a:p>
             <a:fld id="{D7E847A7-D0D1-4648-B033-5D0415D93F24}" type="datetimeFigureOut">
               <a:rPr lang="en-US" smtClean="0"/>
-              <a:t>10/23/2015</a:t>
+              <a:t>10/27/2015</a:t>
             </a:fld>
             <a:endParaRPr lang="en-US"/>
           </a:p>
@@ -1477,7 +1482,7 @@
           <a:p>
             <a:fld id="{D7E847A7-D0D1-4648-B033-5D0415D93F24}" type="datetimeFigureOut">
               <a:rPr lang="en-US" smtClean="0"/>
-              <a:t>10/23/2015</a:t>
+              <a:t>10/27/2015</a:t>
             </a:fld>
             <a:endParaRPr lang="en-US"/>
           </a:p>
@@ -1709,7 +1714,7 @@
           <a:p>
             <a:fld id="{D7E847A7-D0D1-4648-B033-5D0415D93F24}" type="datetimeFigureOut">
               <a:rPr lang="en-US" smtClean="0"/>
-              <a:t>10/23/2015</a:t>
+              <a:t>10/27/2015</a:t>
             </a:fld>
             <a:endParaRPr lang="en-US"/>
           </a:p>
@@ -2076,7 +2081,7 @@
           <a:p>
             <a:fld id="{D7E847A7-D0D1-4648-B033-5D0415D93F24}" type="datetimeFigureOut">
               <a:rPr lang="en-US" smtClean="0"/>
-              <a:t>10/23/2015</a:t>
+              <a:t>10/27/2015</a:t>
             </a:fld>
             <a:endParaRPr lang="en-US"/>
           </a:p>
@@ -2194,7 +2199,7 @@
           <a:p>
             <a:fld id="{D7E847A7-D0D1-4648-B033-5D0415D93F24}" type="datetimeFigureOut">
               <a:rPr lang="en-US" smtClean="0"/>
-              <a:t>10/23/2015</a:t>
+              <a:t>10/27/2015</a:t>
             </a:fld>
             <a:endParaRPr lang="en-US"/>
           </a:p>
@@ -2289,7 +2294,7 @@
           <a:p>
             <a:fld id="{D7E847A7-D0D1-4648-B033-5D0415D93F24}" type="datetimeFigureOut">
               <a:rPr lang="en-US" smtClean="0"/>
-              <a:t>10/23/2015</a:t>
+              <a:t>10/27/2015</a:t>
             </a:fld>
             <a:endParaRPr lang="en-US"/>
           </a:p>
@@ -2566,7 +2571,7 @@
           <a:p>
             <a:fld id="{D7E847A7-D0D1-4648-B033-5D0415D93F24}" type="datetimeFigureOut">
               <a:rPr lang="en-US" smtClean="0"/>
-              <a:t>10/23/2015</a:t>
+              <a:t>10/27/2015</a:t>
             </a:fld>
             <a:endParaRPr lang="en-US"/>
           </a:p>
@@ -2819,7 +2824,7 @@
           <a:p>
             <a:fld id="{D7E847A7-D0D1-4648-B033-5D0415D93F24}" type="datetimeFigureOut">
               <a:rPr lang="en-US" smtClean="0"/>
-              <a:t>10/23/2015</a:t>
+              <a:t>10/27/2015</a:t>
             </a:fld>
             <a:endParaRPr lang="en-US"/>
           </a:p>
@@ -3032,7 +3037,7 @@
           <a:p>
             <a:fld id="{D7E847A7-D0D1-4648-B033-5D0415D93F24}" type="datetimeFigureOut">
               <a:rPr lang="en-US" smtClean="0"/>
-              <a:t>10/23/2015</a:t>
+              <a:t>10/27/2015</a:t>
             </a:fld>
             <a:endParaRPr lang="en-US"/>
           </a:p>
@@ -6059,8 +6064,13 @@
           <a:p>
             <a:r>
               <a:rPr lang="en-US" dirty="0" smtClean="0"/>
-              <a:t>Backtracking only works, if the parsers fails without consuming any input (also referred to in the documentation as “failing without changing parser state)</a:t>
-            </a:r>
+              <a:t>Backtracking only works, if the parsers fails without consuming any input (also referred to in the documentation as “failing without changing parser </a:t>
+            </a:r>
+            <a:r>
+              <a:rPr lang="en-US" dirty="0" smtClean="0"/>
+              <a:t>state”)</a:t>
+            </a:r>
+            <a:endParaRPr lang="en-US" dirty="0" smtClean="0"/>
           </a:p>
           <a:p>
             <a:r>
@@ -6409,12 +6419,6 @@
               </a:rPr>
               <a:t>p2</a:t>
             </a:r>
-            <a:endParaRPr lang="en-US" dirty="0" smtClean="0">
-              <a:highlight>
-                <a:srgbClr val="FFFFFF"/>
-              </a:highlight>
-              <a:latin typeface="Consolas" panose="020B0609020204030204" pitchFamily="49" charset="0"/>
-            </a:endParaRPr>
           </a:p>
           <a:p>
             <a:pPr marL="0" indent="0">
@@ -6864,12 +6868,6 @@
               </a:rPr>
               <a:t>)</a:t>
             </a:r>
-            <a:endParaRPr lang="en-US" sz="2200" dirty="0">
-              <a:highlight>
-                <a:srgbClr val="FFFFFF"/>
-              </a:highlight>
-              <a:latin typeface="Consolas" panose="020B0609020204030204" pitchFamily="49" charset="0"/>
-            </a:endParaRPr>
           </a:p>
           <a:p>
             <a:pPr marL="0" indent="0">
@@ -7614,7 +7612,7 @@
           <a:p>
             <a:r>
               <a:rPr lang="en-US" dirty="0" smtClean="0"/>
-              <a:t>Optimized and convenience combinatory functions</a:t>
+              <a:t>Example: simple expression parser</a:t>
             </a:r>
             <a:endParaRPr lang="en-US" dirty="0"/>
           </a:p>
@@ -7622,12 +7620,12 @@
       </p:sp>
       <p:sp>
         <p:nvSpPr>
-          <p:cNvPr id="3" name="Content Placeholder 2"/>
+          <p:cNvPr id="3" name="Text Placeholder 2"/>
           <p:cNvSpPr>
             <a:spLocks noGrp="1"/>
           </p:cNvSpPr>
           <p:nvPr>
-            <p:ph idx="1"/>
+            <p:ph type="body" idx="1"/>
           </p:nvPr>
         </p:nvSpPr>
         <p:spPr/>
@@ -7642,7 +7640,7 @@
     </p:spTree>
     <p:extLst>
       <p:ext uri="{BB962C8B-B14F-4D97-AF65-F5344CB8AC3E}">
-        <p14:creationId xmlns:p14="http://schemas.microsoft.com/office/powerpoint/2010/main" val="176734398"/>
+        <p14:creationId xmlns:p14="http://schemas.microsoft.com/office/powerpoint/2010/main" val="192580022"/>
       </p:ext>
     </p:extLst>
   </p:cSld>
@@ -7770,7 +7768,7 @@
           <a:p>
             <a:r>
               <a:rPr lang="en-US" dirty="0" smtClean="0"/>
-              <a:t>Example: parsing simple expression</a:t>
+              <a:t>Simple expression syntax</a:t>
             </a:r>
             <a:endParaRPr lang="en-US" dirty="0"/>
           </a:p>
@@ -7788,17 +7786,104 @@
         </p:nvSpPr>
         <p:spPr/>
         <p:txBody>
-          <a:bodyPr/>
-          <a:lstStyle/>
-          <a:p>
-            <a:endParaRPr lang="en-US"/>
+          <a:bodyPr>
+            <a:normAutofit lnSpcReduction="10000"/>
+          </a:bodyPr>
+          <a:lstStyle/>
+          <a:p>
+            <a:r>
+              <a:rPr lang="en-US" dirty="0" smtClean="0"/>
+              <a:t>We define simple expression as a arithmetic expression that is build up form </a:t>
+            </a:r>
+          </a:p>
+          <a:p>
+            <a:pPr lvl="1"/>
+            <a:r>
+              <a:rPr lang="en-US" dirty="0"/>
+              <a:t>N</a:t>
+            </a:r>
+            <a:r>
+              <a:rPr lang="en-US" dirty="0" smtClean="0"/>
+              <a:t>umeric values, </a:t>
+            </a:r>
+          </a:p>
+          <a:p>
+            <a:pPr lvl="1"/>
+            <a:r>
+              <a:rPr lang="en-US" dirty="0"/>
+              <a:t>V</a:t>
+            </a:r>
+            <a:r>
+              <a:rPr lang="en-US" dirty="0" smtClean="0"/>
+              <a:t>ariables, </a:t>
+            </a:r>
+          </a:p>
+          <a:p>
+            <a:pPr lvl="1"/>
+            <a:r>
+              <a:rPr lang="en-US" dirty="0" smtClean="0"/>
+              <a:t>Binary operations of</a:t>
+            </a:r>
+          </a:p>
+          <a:p>
+            <a:pPr lvl="2"/>
+            <a:r>
+              <a:rPr lang="en-US" dirty="0" smtClean="0"/>
+              <a:t>Addition</a:t>
+            </a:r>
+          </a:p>
+          <a:p>
+            <a:pPr lvl="2"/>
+            <a:r>
+              <a:rPr lang="en-US" dirty="0" smtClean="0"/>
+              <a:t>Subtraction</a:t>
+            </a:r>
+          </a:p>
+          <a:p>
+            <a:pPr lvl="2"/>
+            <a:r>
+              <a:rPr lang="en-US" dirty="0" smtClean="0"/>
+              <a:t>Multiplication</a:t>
+            </a:r>
+          </a:p>
+          <a:p>
+            <a:pPr lvl="2"/>
+            <a:r>
+              <a:rPr lang="en-US" dirty="0" smtClean="0"/>
+              <a:t>Division</a:t>
+            </a:r>
+          </a:p>
+          <a:p>
+            <a:pPr lvl="2"/>
+            <a:r>
+              <a:rPr lang="en-US" dirty="0" smtClean="0"/>
+              <a:t>Exponentiation</a:t>
+            </a:r>
+          </a:p>
+          <a:p>
+            <a:pPr lvl="1"/>
+            <a:r>
+              <a:rPr lang="en-US" dirty="0" smtClean="0"/>
+              <a:t>Unary operation of </a:t>
+            </a:r>
+          </a:p>
+          <a:p>
+            <a:pPr lvl="2"/>
+            <a:r>
+              <a:rPr lang="en-US" dirty="0" smtClean="0"/>
+              <a:t>Minus</a:t>
+            </a:r>
+          </a:p>
+          <a:p>
+            <a:pPr lvl="2"/>
+            <a:endParaRPr lang="en-US" dirty="0"/>
           </a:p>
         </p:txBody>
       </p:sp>
     </p:spTree>
     <p:extLst>
       <p:ext uri="{BB962C8B-B14F-4D97-AF65-F5344CB8AC3E}">
-        <p14:creationId xmlns:p14="http://schemas.microsoft.com/office/powerpoint/2010/main" val="4208169242"/>
+        <p14:creationId xmlns:p14="http://schemas.microsoft.com/office/powerpoint/2010/main" val="3487543781"/>
       </p:ext>
     </p:extLst>
   </p:cSld>
@@ -7842,7 +7927,7 @@
           <a:p>
             <a:r>
               <a:rPr lang="en-US" dirty="0" smtClean="0"/>
-              <a:t>Interlude: customizing error messages</a:t>
+              <a:t>Examples of simple expressions	</a:t>
             </a:r>
             <a:endParaRPr lang="en-US" dirty="0"/>
           </a:p>
@@ -7863,14 +7948,66 @@
           <a:bodyPr/>
           <a:lstStyle/>
           <a:p>
-            <a:endParaRPr lang="en-US"/>
+            <a:r>
+              <a:rPr lang="en-US" dirty="0" smtClean="0"/>
+              <a:t>5, 1.56, -45</a:t>
+            </a:r>
+          </a:p>
+          <a:p>
+            <a:r>
+              <a:rPr lang="en-US" dirty="0" smtClean="0"/>
+              <a:t>X, y, x234</a:t>
+            </a:r>
+          </a:p>
+          <a:p>
+            <a:r>
+              <a:rPr lang="en-US" dirty="0" smtClean="0"/>
+              <a:t>x + y</a:t>
+            </a:r>
+          </a:p>
+          <a:p>
+            <a:r>
+              <a:rPr lang="en-US" dirty="0" smtClean="0"/>
+              <a:t>(x + y) / (x – z)</a:t>
+            </a:r>
+          </a:p>
+          <a:p>
+            <a:r>
+              <a:rPr lang="en-US" dirty="0" smtClean="0"/>
+              <a:t>4.56*(</a:t>
+            </a:r>
+            <a:r>
+              <a:rPr lang="en-US" dirty="0" err="1" smtClean="0"/>
+              <a:t>x^n</a:t>
+            </a:r>
+            <a:r>
+              <a:rPr lang="en-US" dirty="0" smtClean="0"/>
+              <a:t> + </a:t>
+            </a:r>
+            <a:r>
+              <a:rPr lang="en-US" dirty="0" err="1" smtClean="0"/>
+              <a:t>y^n</a:t>
+            </a:r>
+            <a:r>
+              <a:rPr lang="en-US" dirty="0" smtClean="0"/>
+              <a:t> + </a:t>
+            </a:r>
+            <a:r>
+              <a:rPr lang="en-US" dirty="0" err="1" smtClean="0"/>
+              <a:t>z^n</a:t>
+            </a:r>
+            <a:r>
+              <a:rPr lang="en-US" dirty="0" smtClean="0"/>
+              <a:t>)^2</a:t>
+            </a:r>
+            <a:endParaRPr lang="en-US" dirty="0"/>
           </a:p>
         </p:txBody>
       </p:sp>
     </p:spTree>
     <p:extLst>
       <p:ext uri="{BB962C8B-B14F-4D97-AF65-F5344CB8AC3E}">
-        <p14:creationId xmlns:p14="http://schemas.microsoft.com/office/powerpoint/2010/main" val="3429963252"/>
+        <p14:creationId xmlns:p14="http://schemas.microsoft.com/office/powerpoint/2010/main" val="2288589905"/>
       </p:ext>
     </p:extLst>
   </p:cSld>
@@ -7914,7 +8051,7 @@
           <a:p>
             <a:r>
               <a:rPr lang="en-US" dirty="0" smtClean="0"/>
-              <a:t>Interlude: tracing</a:t>
+              <a:t>More syntax</a:t>
             </a:r>
             <a:endParaRPr lang="en-US" dirty="0"/>
           </a:p>
@@ -7935,14 +8072,89 @@
           <a:bodyPr/>
           <a:lstStyle/>
           <a:p>
-            <a:endParaRPr lang="en-US"/>
+            <a:r>
+              <a:rPr lang="en-US" dirty="0" smtClean="0"/>
+              <a:t>White space doesn’t matter</a:t>
+            </a:r>
+          </a:p>
+          <a:p>
+            <a:pPr lvl="1"/>
+            <a:r>
+              <a:rPr lang="en-US" dirty="0" smtClean="0"/>
+              <a:t>(x + y)</a:t>
+            </a:r>
+          </a:p>
+          <a:p>
+            <a:pPr lvl="1"/>
+            <a:r>
+              <a:rPr lang="en-US" dirty="0" smtClean="0"/>
+              <a:t>(     x         + y     )</a:t>
+            </a:r>
+          </a:p>
+          <a:p>
+            <a:pPr lvl="1"/>
+            <a:r>
+              <a:rPr lang="en-US" dirty="0" smtClean="0"/>
+              <a:t>(</a:t>
+            </a:r>
+          </a:p>
+          <a:p>
+            <a:pPr marL="457200" lvl="1" indent="0">
+              <a:buNone/>
+            </a:pPr>
+            <a:r>
+              <a:rPr lang="en-US" dirty="0"/>
+              <a:t> </a:t>
+            </a:r>
+            <a:r>
+              <a:rPr lang="en-US" dirty="0" smtClean="0"/>
+              <a:t>     x </a:t>
+            </a:r>
+          </a:p>
+          <a:p>
+            <a:pPr marL="457200" lvl="1" indent="0">
+              <a:buNone/>
+            </a:pPr>
+            <a:r>
+              <a:rPr lang="en-US" dirty="0"/>
+              <a:t> </a:t>
+            </a:r>
+            <a:r>
+              <a:rPr lang="en-US" dirty="0" smtClean="0"/>
+              <a:t>          + y )</a:t>
+            </a:r>
+          </a:p>
+          <a:p>
+            <a:pPr lvl="1"/>
+            <a:r>
+              <a:rPr lang="en-US" dirty="0" smtClean="0"/>
+              <a:t>Are all equal to each other</a:t>
+            </a:r>
+          </a:p>
+          <a:p>
+            <a:pPr lvl="1"/>
+            <a:endParaRPr lang="en-US" dirty="0" smtClean="0"/>
+          </a:p>
+          <a:p>
+            <a:pPr lvl="1"/>
+            <a:r>
+              <a:rPr lang="en-US" dirty="0" smtClean="0"/>
+              <a:t>Parenthesis matters for nesting, but</a:t>
+            </a:r>
+          </a:p>
+          <a:p>
+            <a:pPr lvl="1"/>
+            <a:r>
+              <a:rPr lang="en-US" dirty="0" smtClean="0"/>
+              <a:t>x, (x), ((x)),… are all the same</a:t>
+            </a:r>
           </a:p>
         </p:txBody>
       </p:sp>
     </p:spTree>
     <p:extLst>
       <p:ext uri="{BB962C8B-B14F-4D97-AF65-F5344CB8AC3E}">
-        <p14:creationId xmlns:p14="http://schemas.microsoft.com/office/powerpoint/2010/main" val="619278624"/>
+        <p14:creationId xmlns:p14="http://schemas.microsoft.com/office/powerpoint/2010/main" val="295255082"/>
       </p:ext>
     </p:extLst>
   </p:cSld>
@@ -7979,6 +8191,730 @@
             <p:ph type="title"/>
           </p:nvPr>
         </p:nvSpPr>
+        <p:spPr>
+          <a:xfrm>
+            <a:off x="423530" y="343860"/>
+            <a:ext cx="10515600" cy="1229759"/>
+          </a:xfrm>
+        </p:spPr>
+        <p:txBody>
+          <a:bodyPr>
+            <a:normAutofit fontScale="90000"/>
+          </a:bodyPr>
+          <a:lstStyle/>
+          <a:p>
+            <a:r>
+              <a:rPr lang="en-US" dirty="0" smtClean="0"/>
+              <a:t>Formalizing the syntax </a:t>
+            </a:r>
+            <a:r>
+              <a:rPr lang="en-US" dirty="0"/>
+              <a:t>BNF (Backus-Naur Form</a:t>
+            </a:r>
+            <a:r>
+              <a:rPr lang="en-US" dirty="0" smtClean="0"/>
+              <a:t>)</a:t>
+            </a:r>
+            <a:endParaRPr lang="en-US" dirty="0"/>
+          </a:p>
+        </p:txBody>
+      </p:sp>
+      <p:sp>
+        <p:nvSpPr>
+          <p:cNvPr id="3" name="Content Placeholder 2"/>
+          <p:cNvSpPr>
+            <a:spLocks noGrp="1"/>
+          </p:cNvSpPr>
+          <p:nvPr>
+            <p:ph idx="1"/>
+          </p:nvPr>
+        </p:nvSpPr>
+        <p:spPr>
+          <a:xfrm>
+            <a:off x="290945" y="1765005"/>
+            <a:ext cx="11793682" cy="4731488"/>
+          </a:xfrm>
+        </p:spPr>
+        <p:txBody>
+          <a:bodyPr>
+            <a:normAutofit fontScale="92500"/>
+          </a:bodyPr>
+          <a:lstStyle/>
+          <a:p>
+            <a:pPr marL="0" indent="0">
+              <a:lnSpc>
+                <a:spcPct val="150000"/>
+              </a:lnSpc>
+              <a:buNone/>
+            </a:pPr>
+            <a:r>
+              <a:rPr lang="en-US" sz="2600" dirty="0" smtClean="0">
+                <a:latin typeface="Consolas" panose="020B0609020204030204" pitchFamily="49" charset="0"/>
+                <a:cs typeface="Consolas" panose="020B0609020204030204" pitchFamily="49" charset="0"/>
+              </a:rPr>
+              <a:t>&lt;</a:t>
+            </a:r>
+            <a:r>
+              <a:rPr lang="en-US" sz="2600" dirty="0" err="1" smtClean="0">
+                <a:latin typeface="Consolas" panose="020B0609020204030204" pitchFamily="49" charset="0"/>
+                <a:cs typeface="Consolas" panose="020B0609020204030204" pitchFamily="49" charset="0"/>
+              </a:rPr>
+              <a:t>var</a:t>
+            </a:r>
+            <a:r>
+              <a:rPr lang="en-US" sz="2600" dirty="0" smtClean="0">
+                <a:latin typeface="Consolas" panose="020B0609020204030204" pitchFamily="49" charset="0"/>
+                <a:cs typeface="Consolas" panose="020B0609020204030204" pitchFamily="49" charset="0"/>
+              </a:rPr>
+              <a:t>&gt; ::= &lt;letter&gt; { &lt;</a:t>
+            </a:r>
+            <a:r>
+              <a:rPr lang="en-US" sz="2600" dirty="0">
+                <a:latin typeface="Consolas" panose="020B0609020204030204" pitchFamily="49" charset="0"/>
+                <a:cs typeface="Consolas" panose="020B0609020204030204" pitchFamily="49" charset="0"/>
+              </a:rPr>
+              <a:t>digit&gt; | &lt;letter</a:t>
+            </a:r>
+            <a:r>
+              <a:rPr lang="en-US" sz="2600" dirty="0" smtClean="0">
+                <a:latin typeface="Consolas" panose="020B0609020204030204" pitchFamily="49" charset="0"/>
+                <a:cs typeface="Consolas" panose="020B0609020204030204" pitchFamily="49" charset="0"/>
+              </a:rPr>
+              <a:t>&gt; }</a:t>
+            </a:r>
+            <a:endParaRPr lang="en-US" sz="2600" dirty="0">
+              <a:latin typeface="Consolas" panose="020B0609020204030204" pitchFamily="49" charset="0"/>
+              <a:cs typeface="Consolas" panose="020B0609020204030204" pitchFamily="49" charset="0"/>
+            </a:endParaRPr>
+          </a:p>
+          <a:p>
+            <a:pPr marL="0" indent="0">
+              <a:lnSpc>
+                <a:spcPct val="150000"/>
+              </a:lnSpc>
+              <a:buNone/>
+            </a:pPr>
+            <a:r>
+              <a:rPr lang="en-US" sz="2600" dirty="0" smtClean="0">
+                <a:latin typeface="Consolas" panose="020B0609020204030204" pitchFamily="49" charset="0"/>
+                <a:cs typeface="Consolas" panose="020B0609020204030204" pitchFamily="49" charset="0"/>
+              </a:rPr>
+              <a:t>&lt;</a:t>
+            </a:r>
+            <a:r>
+              <a:rPr lang="en-US" sz="2600" dirty="0" err="1" smtClean="0">
+                <a:latin typeface="Consolas" panose="020B0609020204030204" pitchFamily="49" charset="0"/>
+                <a:cs typeface="Consolas" panose="020B0609020204030204" pitchFamily="49" charset="0"/>
+              </a:rPr>
+              <a:t>ws</a:t>
+            </a:r>
+            <a:r>
+              <a:rPr lang="en-US" sz="2600" dirty="0" smtClean="0">
+                <a:latin typeface="Consolas" panose="020B0609020204030204" pitchFamily="49" charset="0"/>
+                <a:cs typeface="Consolas" panose="020B0609020204030204" pitchFamily="49" charset="0"/>
+              </a:rPr>
+              <a:t>&gt; ::= space | newline | linefeed | tab</a:t>
+            </a:r>
+          </a:p>
+          <a:p>
+            <a:pPr marL="0" indent="0">
+              <a:lnSpc>
+                <a:spcPct val="150000"/>
+              </a:lnSpc>
+              <a:buNone/>
+            </a:pPr>
+            <a:r>
+              <a:rPr lang="en-US" sz="2600" dirty="0" smtClean="0">
+                <a:latin typeface="Consolas" panose="020B0609020204030204" pitchFamily="49" charset="0"/>
+                <a:cs typeface="Consolas" panose="020B0609020204030204" pitchFamily="49" charset="0"/>
+              </a:rPr>
+              <a:t>&lt;op&gt; ::= + | - | * | \ | ^</a:t>
+            </a:r>
+          </a:p>
+          <a:p>
+            <a:pPr marL="0" indent="0">
+              <a:lnSpc>
+                <a:spcPct val="150000"/>
+              </a:lnSpc>
+              <a:buNone/>
+            </a:pPr>
+            <a:r>
+              <a:rPr lang="en-US" sz="2600" dirty="0">
+                <a:latin typeface="Consolas" panose="020B0609020204030204" pitchFamily="49" charset="0"/>
+                <a:cs typeface="Consolas" panose="020B0609020204030204" pitchFamily="49" charset="0"/>
+              </a:rPr>
+              <a:t>&lt;</a:t>
+            </a:r>
+            <a:r>
+              <a:rPr lang="en-US" sz="2600" dirty="0" err="1" smtClean="0">
+                <a:latin typeface="Consolas" panose="020B0609020204030204" pitchFamily="49" charset="0"/>
+                <a:cs typeface="Consolas" panose="020B0609020204030204" pitchFamily="49" charset="0"/>
+              </a:rPr>
+              <a:t>bracketed_expr</a:t>
+            </a:r>
+            <a:r>
+              <a:rPr lang="en-US" sz="2600" dirty="0" smtClean="0">
+                <a:latin typeface="Consolas" panose="020B0609020204030204" pitchFamily="49" charset="0"/>
+                <a:cs typeface="Consolas" panose="020B0609020204030204" pitchFamily="49" charset="0"/>
+              </a:rPr>
+              <a:t>&gt; :: = ( [&lt;</a:t>
+            </a:r>
+            <a:r>
+              <a:rPr lang="en-US" sz="2600" dirty="0" err="1" smtClean="0">
+                <a:latin typeface="Consolas" panose="020B0609020204030204" pitchFamily="49" charset="0"/>
+                <a:cs typeface="Consolas" panose="020B0609020204030204" pitchFamily="49" charset="0"/>
+              </a:rPr>
+              <a:t>ws</a:t>
+            </a:r>
+            <a:r>
+              <a:rPr lang="en-US" sz="2600" dirty="0" smtClean="0">
+                <a:latin typeface="Consolas" panose="020B0609020204030204" pitchFamily="49" charset="0"/>
+                <a:cs typeface="Consolas" panose="020B0609020204030204" pitchFamily="49" charset="0"/>
+              </a:rPr>
+              <a:t>&gt;] &lt;expr&gt; [&lt;</a:t>
+            </a:r>
+            <a:r>
+              <a:rPr lang="en-US" sz="2600" dirty="0" err="1" smtClean="0">
+                <a:latin typeface="Consolas" panose="020B0609020204030204" pitchFamily="49" charset="0"/>
+                <a:cs typeface="Consolas" panose="020B0609020204030204" pitchFamily="49" charset="0"/>
+              </a:rPr>
+              <a:t>ws</a:t>
+            </a:r>
+            <a:r>
+              <a:rPr lang="en-US" sz="2600" dirty="0" smtClean="0">
+                <a:latin typeface="Consolas" panose="020B0609020204030204" pitchFamily="49" charset="0"/>
+                <a:cs typeface="Consolas" panose="020B0609020204030204" pitchFamily="49" charset="0"/>
+              </a:rPr>
+              <a:t>&gt;] ) </a:t>
+            </a:r>
+          </a:p>
+          <a:p>
+            <a:pPr marL="0" indent="0">
+              <a:lnSpc>
+                <a:spcPct val="150000"/>
+              </a:lnSpc>
+              <a:buNone/>
+            </a:pPr>
+            <a:r>
+              <a:rPr lang="en-US" sz="2600" dirty="0" smtClean="0">
+                <a:latin typeface="Consolas" panose="020B0609020204030204" pitchFamily="49" charset="0"/>
+                <a:cs typeface="Consolas" panose="020B0609020204030204" pitchFamily="49" charset="0"/>
+              </a:rPr>
+              <a:t>&lt;</a:t>
+            </a:r>
+            <a:r>
+              <a:rPr lang="en-US" sz="2600" dirty="0" err="1" smtClean="0">
+                <a:latin typeface="Consolas" panose="020B0609020204030204" pitchFamily="49" charset="0"/>
+                <a:cs typeface="Consolas" panose="020B0609020204030204" pitchFamily="49" charset="0"/>
+              </a:rPr>
+              <a:t>left_term</a:t>
+            </a:r>
+            <a:r>
+              <a:rPr lang="en-US" sz="2600" dirty="0" smtClean="0">
+                <a:latin typeface="Consolas" panose="020B0609020204030204" pitchFamily="49" charset="0"/>
+                <a:cs typeface="Consolas" panose="020B0609020204030204" pitchFamily="49" charset="0"/>
+              </a:rPr>
+              <a:t>&gt; ::= &lt;number&gt; | &lt;variable&gt; | &lt;</a:t>
+            </a:r>
+            <a:r>
+              <a:rPr lang="en-US" sz="2600" dirty="0" err="1" smtClean="0">
+                <a:latin typeface="Consolas" panose="020B0609020204030204" pitchFamily="49" charset="0"/>
+                <a:cs typeface="Consolas" panose="020B0609020204030204" pitchFamily="49" charset="0"/>
+              </a:rPr>
+              <a:t>bracketed_expr</a:t>
+            </a:r>
+            <a:r>
+              <a:rPr lang="en-US" sz="2600" dirty="0" smtClean="0">
+                <a:latin typeface="Consolas" panose="020B0609020204030204" pitchFamily="49" charset="0"/>
+                <a:cs typeface="Consolas" panose="020B0609020204030204" pitchFamily="49" charset="0"/>
+              </a:rPr>
+              <a:t>&gt;</a:t>
+            </a:r>
+          </a:p>
+          <a:p>
+            <a:pPr marL="0" indent="0">
+              <a:lnSpc>
+                <a:spcPct val="150000"/>
+              </a:lnSpc>
+              <a:buNone/>
+            </a:pPr>
+            <a:r>
+              <a:rPr lang="en-US" sz="2600" dirty="0" smtClean="0">
+                <a:latin typeface="Consolas" panose="020B0609020204030204" pitchFamily="49" charset="0"/>
+                <a:cs typeface="Consolas" panose="020B0609020204030204" pitchFamily="49" charset="0"/>
+              </a:rPr>
+              <a:t>&lt;</a:t>
+            </a:r>
+            <a:r>
+              <a:rPr lang="en-US" sz="2600" dirty="0" err="1" smtClean="0">
+                <a:latin typeface="Consolas" panose="020B0609020204030204" pitchFamily="49" charset="0"/>
+                <a:cs typeface="Consolas" panose="020B0609020204030204" pitchFamily="49" charset="0"/>
+              </a:rPr>
+              <a:t>binary_op</a:t>
+            </a:r>
+            <a:r>
+              <a:rPr lang="en-US" sz="2600" dirty="0" smtClean="0">
+                <a:latin typeface="Consolas" panose="020B0609020204030204" pitchFamily="49" charset="0"/>
+                <a:cs typeface="Consolas" panose="020B0609020204030204" pitchFamily="49" charset="0"/>
+              </a:rPr>
+              <a:t>&gt; ::= &lt;</a:t>
+            </a:r>
+            <a:r>
+              <a:rPr lang="en-US" sz="2600" dirty="0" err="1" smtClean="0">
+                <a:latin typeface="Consolas" panose="020B0609020204030204" pitchFamily="49" charset="0"/>
+                <a:cs typeface="Consolas" panose="020B0609020204030204" pitchFamily="49" charset="0"/>
+              </a:rPr>
+              <a:t>left_term</a:t>
+            </a:r>
+            <a:r>
+              <a:rPr lang="en-US" sz="2600" dirty="0" smtClean="0">
+                <a:latin typeface="Consolas" panose="020B0609020204030204" pitchFamily="49" charset="0"/>
+                <a:cs typeface="Consolas" panose="020B0609020204030204" pitchFamily="49" charset="0"/>
+              </a:rPr>
+              <a:t>&gt; [&lt;</a:t>
+            </a:r>
+            <a:r>
+              <a:rPr lang="en-US" sz="2600" dirty="0" err="1" smtClean="0">
+                <a:latin typeface="Consolas" panose="020B0609020204030204" pitchFamily="49" charset="0"/>
+                <a:cs typeface="Consolas" panose="020B0609020204030204" pitchFamily="49" charset="0"/>
+              </a:rPr>
+              <a:t>ws</a:t>
+            </a:r>
+            <a:r>
+              <a:rPr lang="en-US" sz="2600" dirty="0" smtClean="0">
+                <a:latin typeface="Consolas" panose="020B0609020204030204" pitchFamily="49" charset="0"/>
+                <a:cs typeface="Consolas" panose="020B0609020204030204" pitchFamily="49" charset="0"/>
+              </a:rPr>
+              <a:t>&gt;] &lt;op&gt; [&lt;</a:t>
+            </a:r>
+            <a:r>
+              <a:rPr lang="en-US" sz="2600" dirty="0" err="1">
+                <a:latin typeface="Consolas" panose="020B0609020204030204" pitchFamily="49" charset="0"/>
+                <a:cs typeface="Consolas" panose="020B0609020204030204" pitchFamily="49" charset="0"/>
+              </a:rPr>
+              <a:t>ws</a:t>
+            </a:r>
+            <a:r>
+              <a:rPr lang="en-US" sz="2600" dirty="0" smtClean="0">
+                <a:latin typeface="Consolas" panose="020B0609020204030204" pitchFamily="49" charset="0"/>
+                <a:cs typeface="Consolas" panose="020B0609020204030204" pitchFamily="49" charset="0"/>
+              </a:rPr>
+              <a:t>&gt;] &lt;expr&gt;</a:t>
+            </a:r>
+          </a:p>
+          <a:p>
+            <a:pPr marL="0" indent="0">
+              <a:lnSpc>
+                <a:spcPct val="150000"/>
+              </a:lnSpc>
+              <a:buNone/>
+            </a:pPr>
+            <a:r>
+              <a:rPr lang="en-US" sz="2600" dirty="0" smtClean="0">
+                <a:latin typeface="Consolas" panose="020B0609020204030204" pitchFamily="49" charset="0"/>
+                <a:cs typeface="Consolas" panose="020B0609020204030204" pitchFamily="49" charset="0"/>
+              </a:rPr>
+              <a:t>&lt;expr&gt; ::= &lt;</a:t>
+            </a:r>
+            <a:r>
+              <a:rPr lang="en-US" sz="2600" dirty="0" err="1" smtClean="0">
+                <a:latin typeface="Consolas" panose="020B0609020204030204" pitchFamily="49" charset="0"/>
+                <a:cs typeface="Consolas" panose="020B0609020204030204" pitchFamily="49" charset="0"/>
+              </a:rPr>
+              <a:t>binary_op</a:t>
+            </a:r>
+            <a:r>
+              <a:rPr lang="en-US" sz="2600" dirty="0" smtClean="0">
+                <a:latin typeface="Consolas" panose="020B0609020204030204" pitchFamily="49" charset="0"/>
+                <a:cs typeface="Consolas" panose="020B0609020204030204" pitchFamily="49" charset="0"/>
+              </a:rPr>
+              <a:t>&gt; | &lt;</a:t>
+            </a:r>
+            <a:r>
+              <a:rPr lang="en-US" sz="2600" dirty="0">
+                <a:latin typeface="Consolas" panose="020B0609020204030204" pitchFamily="49" charset="0"/>
+                <a:cs typeface="Consolas" panose="020B0609020204030204" pitchFamily="49" charset="0"/>
+              </a:rPr>
+              <a:t> </a:t>
+            </a:r>
+            <a:r>
+              <a:rPr lang="en-US" sz="2600" dirty="0" err="1">
+                <a:latin typeface="Consolas" panose="020B0609020204030204" pitchFamily="49" charset="0"/>
+                <a:cs typeface="Consolas" panose="020B0609020204030204" pitchFamily="49" charset="0"/>
+              </a:rPr>
+              <a:t>bracketed_expr</a:t>
+            </a:r>
+            <a:r>
+              <a:rPr lang="en-US" sz="2600" dirty="0">
+                <a:latin typeface="Consolas" panose="020B0609020204030204" pitchFamily="49" charset="0"/>
+                <a:cs typeface="Consolas" panose="020B0609020204030204" pitchFamily="49" charset="0"/>
+              </a:rPr>
+              <a:t> </a:t>
+            </a:r>
+            <a:r>
+              <a:rPr lang="en-US" sz="2600" dirty="0" smtClean="0">
+                <a:latin typeface="Consolas" panose="020B0609020204030204" pitchFamily="49" charset="0"/>
+                <a:cs typeface="Consolas" panose="020B0609020204030204" pitchFamily="49" charset="0"/>
+              </a:rPr>
+              <a:t>&gt; | &lt;</a:t>
+            </a:r>
+            <a:r>
+              <a:rPr lang="en-US" sz="2600" dirty="0" err="1" smtClean="0">
+                <a:latin typeface="Consolas" panose="020B0609020204030204" pitchFamily="49" charset="0"/>
+                <a:cs typeface="Consolas" panose="020B0609020204030204" pitchFamily="49" charset="0"/>
+              </a:rPr>
+              <a:t>var</a:t>
+            </a:r>
+            <a:r>
+              <a:rPr lang="en-US" sz="2600" dirty="0" smtClean="0">
+                <a:latin typeface="Consolas" panose="020B0609020204030204" pitchFamily="49" charset="0"/>
+                <a:cs typeface="Consolas" panose="020B0609020204030204" pitchFamily="49" charset="0"/>
+              </a:rPr>
+              <a:t>&gt; | &lt;number&gt;</a:t>
+            </a:r>
+            <a:endParaRPr lang="en-US" sz="2600" dirty="0">
+              <a:latin typeface="Consolas" panose="020B0609020204030204" pitchFamily="49" charset="0"/>
+              <a:cs typeface="Consolas" panose="020B0609020204030204" pitchFamily="49" charset="0"/>
+            </a:endParaRPr>
+          </a:p>
+        </p:txBody>
+      </p:sp>
+    </p:spTree>
+    <p:extLst>
+      <p:ext uri="{BB962C8B-B14F-4D97-AF65-F5344CB8AC3E}">
+        <p14:creationId xmlns:p14="http://schemas.microsoft.com/office/powerpoint/2010/main" val="3928373200"/>
+      </p:ext>
+    </p:extLst>
+  </p:cSld>
+  <p:clrMapOvr>
+    <a:masterClrMapping/>
+  </p:clrMapOvr>
+</p:sld>
+</file>
+
+<file path=ppt/slides/slide24.xml><?xml version="1.0" encoding="utf-8"?>
+<p:sld xmlns:a="http://schemas.openxmlformats.org/drawingml/2006/main" xmlns:r="http://schemas.openxmlformats.org/officeDocument/2006/relationships" xmlns:p="http://schemas.openxmlformats.org/presentationml/2006/main">
+  <p:cSld>
+    <p:spTree>
+      <p:nvGrpSpPr>
+        <p:cNvPr id="1" name=""/>
+        <p:cNvGrpSpPr/>
+        <p:nvPr/>
+      </p:nvGrpSpPr>
+      <p:grpSpPr>
+        <a:xfrm>
+          <a:off x="0" y="0"/>
+          <a:ext cx="0" cy="0"/>
+          <a:chOff x="0" y="0"/>
+          <a:chExt cx="0" cy="0"/>
+        </a:xfrm>
+      </p:grpSpPr>
+      <p:sp>
+        <p:nvSpPr>
+          <p:cNvPr id="2" name="Title 1"/>
+          <p:cNvSpPr>
+            <a:spLocks noGrp="1"/>
+          </p:cNvSpPr>
+          <p:nvPr>
+            <p:ph type="title"/>
+          </p:nvPr>
+        </p:nvSpPr>
+        <p:spPr/>
+        <p:txBody>
+          <a:bodyPr/>
+          <a:lstStyle/>
+          <a:p>
+            <a:r>
+              <a:rPr lang="en-US" dirty="0" smtClean="0"/>
+              <a:t>Optimized and convenience </a:t>
+            </a:r>
+            <a:r>
+              <a:rPr lang="en-US" dirty="0" err="1" smtClean="0"/>
+              <a:t>combinator</a:t>
+            </a:r>
+            <a:r>
+              <a:rPr lang="en-US" dirty="0" smtClean="0"/>
+              <a:t> functions</a:t>
+            </a:r>
+            <a:endParaRPr lang="en-US" dirty="0"/>
+          </a:p>
+        </p:txBody>
+      </p:sp>
+      <p:sp>
+        <p:nvSpPr>
+          <p:cNvPr id="3" name="Content Placeholder 2"/>
+          <p:cNvSpPr>
+            <a:spLocks noGrp="1"/>
+          </p:cNvSpPr>
+          <p:nvPr>
+            <p:ph idx="1"/>
+          </p:nvPr>
+        </p:nvSpPr>
+        <p:spPr/>
+        <p:txBody>
+          <a:bodyPr/>
+          <a:lstStyle/>
+          <a:p>
+            <a:endParaRPr lang="en-US"/>
+          </a:p>
+        </p:txBody>
+      </p:sp>
+    </p:spTree>
+    <p:extLst>
+      <p:ext uri="{BB962C8B-B14F-4D97-AF65-F5344CB8AC3E}">
+        <p14:creationId xmlns:p14="http://schemas.microsoft.com/office/powerpoint/2010/main" val="176734398"/>
+      </p:ext>
+    </p:extLst>
+  </p:cSld>
+  <p:clrMapOvr>
+    <a:masterClrMapping/>
+  </p:clrMapOvr>
+</p:sld>
+</file>
+
+<file path=ppt/slides/slide25.xml><?xml version="1.0" encoding="utf-8"?>
+<p:sld xmlns:a="http://schemas.openxmlformats.org/drawingml/2006/main" xmlns:r="http://schemas.openxmlformats.org/officeDocument/2006/relationships" xmlns:p="http://schemas.openxmlformats.org/presentationml/2006/main">
+  <p:cSld>
+    <p:spTree>
+      <p:nvGrpSpPr>
+        <p:cNvPr id="1" name=""/>
+        <p:cNvGrpSpPr/>
+        <p:nvPr/>
+      </p:nvGrpSpPr>
+      <p:grpSpPr>
+        <a:xfrm>
+          <a:off x="0" y="0"/>
+          <a:ext cx="0" cy="0"/>
+          <a:chOff x="0" y="0"/>
+          <a:chExt cx="0" cy="0"/>
+        </a:xfrm>
+      </p:grpSpPr>
+      <p:sp>
+        <p:nvSpPr>
+          <p:cNvPr id="2" name="Title 1"/>
+          <p:cNvSpPr>
+            <a:spLocks noGrp="1"/>
+          </p:cNvSpPr>
+          <p:nvPr>
+            <p:ph type="title"/>
+          </p:nvPr>
+        </p:nvSpPr>
+        <p:spPr/>
+        <p:txBody>
+          <a:bodyPr/>
+          <a:lstStyle/>
+          <a:p>
+            <a:r>
+              <a:rPr lang="en-US" dirty="0" smtClean="0"/>
+              <a:t>Example: parsing simple expression</a:t>
+            </a:r>
+            <a:endParaRPr lang="en-US" dirty="0"/>
+          </a:p>
+        </p:txBody>
+      </p:sp>
+      <p:sp>
+        <p:nvSpPr>
+          <p:cNvPr id="3" name="Content Placeholder 2"/>
+          <p:cNvSpPr>
+            <a:spLocks noGrp="1"/>
+          </p:cNvSpPr>
+          <p:nvPr>
+            <p:ph idx="1"/>
+          </p:nvPr>
+        </p:nvSpPr>
+        <p:spPr/>
+        <p:txBody>
+          <a:bodyPr/>
+          <a:lstStyle/>
+          <a:p>
+            <a:endParaRPr lang="en-US"/>
+          </a:p>
+        </p:txBody>
+      </p:sp>
+    </p:spTree>
+    <p:extLst>
+      <p:ext uri="{BB962C8B-B14F-4D97-AF65-F5344CB8AC3E}">
+        <p14:creationId xmlns:p14="http://schemas.microsoft.com/office/powerpoint/2010/main" val="4208169242"/>
+      </p:ext>
+    </p:extLst>
+  </p:cSld>
+  <p:clrMapOvr>
+    <a:masterClrMapping/>
+  </p:clrMapOvr>
+</p:sld>
+</file>
+
+<file path=ppt/slides/slide26.xml><?xml version="1.0" encoding="utf-8"?>
+<p:sld xmlns:a="http://schemas.openxmlformats.org/drawingml/2006/main" xmlns:r="http://schemas.openxmlformats.org/officeDocument/2006/relationships" xmlns:p="http://schemas.openxmlformats.org/presentationml/2006/main">
+  <p:cSld>
+    <p:spTree>
+      <p:nvGrpSpPr>
+        <p:cNvPr id="1" name=""/>
+        <p:cNvGrpSpPr/>
+        <p:nvPr/>
+      </p:nvGrpSpPr>
+      <p:grpSpPr>
+        <a:xfrm>
+          <a:off x="0" y="0"/>
+          <a:ext cx="0" cy="0"/>
+          <a:chOff x="0" y="0"/>
+          <a:chExt cx="0" cy="0"/>
+        </a:xfrm>
+      </p:grpSpPr>
+      <p:sp>
+        <p:nvSpPr>
+          <p:cNvPr id="2" name="Title 1"/>
+          <p:cNvSpPr>
+            <a:spLocks noGrp="1"/>
+          </p:cNvSpPr>
+          <p:nvPr>
+            <p:ph type="title"/>
+          </p:nvPr>
+        </p:nvSpPr>
+        <p:spPr/>
+        <p:txBody>
+          <a:bodyPr/>
+          <a:lstStyle/>
+          <a:p>
+            <a:r>
+              <a:rPr lang="en-US" dirty="0" smtClean="0"/>
+              <a:t>Interlude: customizing error messages</a:t>
+            </a:r>
+            <a:endParaRPr lang="en-US" dirty="0"/>
+          </a:p>
+        </p:txBody>
+      </p:sp>
+      <p:sp>
+        <p:nvSpPr>
+          <p:cNvPr id="3" name="Content Placeholder 2"/>
+          <p:cNvSpPr>
+            <a:spLocks noGrp="1"/>
+          </p:cNvSpPr>
+          <p:nvPr>
+            <p:ph idx="1"/>
+          </p:nvPr>
+        </p:nvSpPr>
+        <p:spPr/>
+        <p:txBody>
+          <a:bodyPr/>
+          <a:lstStyle/>
+          <a:p>
+            <a:endParaRPr lang="en-US"/>
+          </a:p>
+        </p:txBody>
+      </p:sp>
+    </p:spTree>
+    <p:extLst>
+      <p:ext uri="{BB962C8B-B14F-4D97-AF65-F5344CB8AC3E}">
+        <p14:creationId xmlns:p14="http://schemas.microsoft.com/office/powerpoint/2010/main" val="3429963252"/>
+      </p:ext>
+    </p:extLst>
+  </p:cSld>
+  <p:clrMapOvr>
+    <a:masterClrMapping/>
+  </p:clrMapOvr>
+</p:sld>
+</file>
+
+<file path=ppt/slides/slide27.xml><?xml version="1.0" encoding="utf-8"?>
+<p:sld xmlns:a="http://schemas.openxmlformats.org/drawingml/2006/main" xmlns:r="http://schemas.openxmlformats.org/officeDocument/2006/relationships" xmlns:p="http://schemas.openxmlformats.org/presentationml/2006/main">
+  <p:cSld>
+    <p:spTree>
+      <p:nvGrpSpPr>
+        <p:cNvPr id="1" name=""/>
+        <p:cNvGrpSpPr/>
+        <p:nvPr/>
+      </p:nvGrpSpPr>
+      <p:grpSpPr>
+        <a:xfrm>
+          <a:off x="0" y="0"/>
+          <a:ext cx="0" cy="0"/>
+          <a:chOff x="0" y="0"/>
+          <a:chExt cx="0" cy="0"/>
+        </a:xfrm>
+      </p:grpSpPr>
+      <p:sp>
+        <p:nvSpPr>
+          <p:cNvPr id="2" name="Title 1"/>
+          <p:cNvSpPr>
+            <a:spLocks noGrp="1"/>
+          </p:cNvSpPr>
+          <p:nvPr>
+            <p:ph type="title"/>
+          </p:nvPr>
+        </p:nvSpPr>
+        <p:spPr/>
+        <p:txBody>
+          <a:bodyPr/>
+          <a:lstStyle/>
+          <a:p>
+            <a:r>
+              <a:rPr lang="en-US" dirty="0" smtClean="0"/>
+              <a:t>Interlude: tracing</a:t>
+            </a:r>
+            <a:endParaRPr lang="en-US" dirty="0"/>
+          </a:p>
+        </p:txBody>
+      </p:sp>
+      <p:sp>
+        <p:nvSpPr>
+          <p:cNvPr id="3" name="Content Placeholder 2"/>
+          <p:cNvSpPr>
+            <a:spLocks noGrp="1"/>
+          </p:cNvSpPr>
+          <p:nvPr>
+            <p:ph idx="1"/>
+          </p:nvPr>
+        </p:nvSpPr>
+        <p:spPr/>
+        <p:txBody>
+          <a:bodyPr/>
+          <a:lstStyle/>
+          <a:p>
+            <a:endParaRPr lang="en-US"/>
+          </a:p>
+        </p:txBody>
+      </p:sp>
+    </p:spTree>
+    <p:extLst>
+      <p:ext uri="{BB962C8B-B14F-4D97-AF65-F5344CB8AC3E}">
+        <p14:creationId xmlns:p14="http://schemas.microsoft.com/office/powerpoint/2010/main" val="619278624"/>
+      </p:ext>
+    </p:extLst>
+  </p:cSld>
+  <p:clrMapOvr>
+    <a:masterClrMapping/>
+  </p:clrMapOvr>
+</p:sld>
+</file>
+
+<file path=ppt/slides/slide28.xml><?xml version="1.0" encoding="utf-8"?>
+<p:sld xmlns:a="http://schemas.openxmlformats.org/drawingml/2006/main" xmlns:r="http://schemas.openxmlformats.org/officeDocument/2006/relationships" xmlns:p="http://schemas.openxmlformats.org/presentationml/2006/main">
+  <p:cSld>
+    <p:spTree>
+      <p:nvGrpSpPr>
+        <p:cNvPr id="1" name=""/>
+        <p:cNvGrpSpPr/>
+        <p:nvPr/>
+      </p:nvGrpSpPr>
+      <p:grpSpPr>
+        <a:xfrm>
+          <a:off x="0" y="0"/>
+          <a:ext cx="0" cy="0"/>
+          <a:chOff x="0" y="0"/>
+          <a:chExt cx="0" cy="0"/>
+        </a:xfrm>
+      </p:grpSpPr>
+      <p:sp>
+        <p:nvSpPr>
+          <p:cNvPr id="2" name="Title 1"/>
+          <p:cNvSpPr>
+            <a:spLocks noGrp="1"/>
+          </p:cNvSpPr>
+          <p:nvPr>
+            <p:ph type="title"/>
+          </p:nvPr>
+        </p:nvSpPr>
         <p:spPr/>
         <p:txBody>
           <a:bodyPr/>
@@ -8024,7 +8960,7 @@
 </p:sld>
 </file>
 
-<file path=ppt/slides/slide24.xml><?xml version="1.0" encoding="utf-8"?>
+<file path=ppt/slides/slide29.xml><?xml version="1.0" encoding="utf-8"?>
 <p:sld xmlns:a="http://schemas.openxmlformats.org/drawingml/2006/main" xmlns:r="http://schemas.openxmlformats.org/officeDocument/2006/relationships" xmlns:p="http://schemas.openxmlformats.org/presentationml/2006/main">
   <p:cSld>
     <p:spTree>

</xml_diff>